<commit_message>
docs: add RD - consolidated page url
</commit_message>
<xml_diff>
--- a/line-markers/docs/requirements_definition.pptx
+++ b/line-markers/docs/requirements_definition.pptx
@@ -5,10 +5,11 @@
     <p:sldMasterId id="2147483660" r:id="rId1"/>
   </p:sldMasterIdLst>
   <p:notesMasterIdLst>
-    <p:notesMasterId r:id="rId3"/>
+    <p:notesMasterId r:id="rId4"/>
   </p:notesMasterIdLst>
   <p:sldIdLst>
     <p:sldId id="257" r:id="rId2"/>
+    <p:sldId id="258" r:id="rId3"/>
   </p:sldIdLst>
   <p:sldSz cx="9144000" cy="6858000" type="screen4x3"/>
   <p:notesSz cx="6858000" cy="9144000"/>
@@ -107,6 +108,11 @@
       </a:defRPr>
     </a:lvl9pPr>
   </p:defaultTextStyle>
+  <p:extLst>
+    <p:ext uri="{EFAFB233-063F-42B5-8137-9DF3F51BA10A}">
+      <p15:sldGuideLst xmlns:p15="http://schemas.microsoft.com/office/powerpoint/2012/main"/>
+    </p:ext>
+  </p:extLst>
 </p:presentation>
 </file>
 
@@ -192,7 +198,7 @@
           <a:p>
             <a:fld id="{59CC0C07-EF41-2A45-AB7B-6DDD38BD2356}" type="datetimeFigureOut">
               <a:rPr kumimoji="1" lang="ja-JP" altLang="en-US" smtClean="0"/>
-              <a:t>2018/10/20</a:t>
+              <a:t>2018/10/21</a:t>
             </a:fld>
             <a:endParaRPr kumimoji="1" lang="ja-JP" altLang="en-US"/>
           </a:p>
@@ -597,7 +603,7 @@
           <a:p>
             <a:fld id="{B47B6F5B-CD8F-5F4B-9DDA-6618F802EDE5}" type="datetime1">
               <a:rPr kumimoji="1" lang="ja-JP" altLang="en-US" smtClean="0"/>
-              <a:t>2018/10/20</a:t>
+              <a:t>2018/10/21</a:t>
             </a:fld>
             <a:endParaRPr kumimoji="1" lang="ja-JP" altLang="en-US"/>
           </a:p>
@@ -775,7 +781,7 @@
           <a:p>
             <a:fld id="{A2B3B09D-2F29-2F41-BEF5-D6F1454FA527}" type="datetime1">
               <a:rPr kumimoji="1" lang="ja-JP" altLang="en-US" smtClean="0"/>
-              <a:t>2018/10/20</a:t>
+              <a:t>2018/10/21</a:t>
             </a:fld>
             <a:endParaRPr kumimoji="1" lang="ja-JP" altLang="en-US"/>
           </a:p>
@@ -963,7 +969,7 @@
           <a:p>
             <a:fld id="{3BC60FA1-7D6F-F641-B7C0-FD86AA4C9CF9}" type="datetime1">
               <a:rPr kumimoji="1" lang="ja-JP" altLang="en-US" smtClean="0"/>
-              <a:t>2018/10/20</a:t>
+              <a:t>2018/10/21</a:t>
             </a:fld>
             <a:endParaRPr kumimoji="1" lang="ja-JP" altLang="en-US"/>
           </a:p>
@@ -1053,7 +1059,7 @@
         </p:nvSpPr>
         <p:spPr>
           <a:xfrm>
-            <a:off x="628650" y="365127"/>
+            <a:off x="628650" y="116632"/>
             <a:ext cx="7886700" cy="549274"/>
           </a:xfrm>
         </p:spPr>
@@ -1087,7 +1093,7 @@
         </p:nvSpPr>
         <p:spPr>
           <a:xfrm>
-            <a:off x="628650" y="1056191"/>
+            <a:off x="628650" y="764704"/>
             <a:ext cx="7886700" cy="4351338"/>
           </a:xfrm>
         </p:spPr>
@@ -1156,14 +1162,19 @@
             <p:ph type="dt" sz="half" idx="10"/>
           </p:nvPr>
         </p:nvSpPr>
-        <p:spPr/>
+        <p:spPr>
+          <a:xfrm>
+            <a:off x="628650" y="6597352"/>
+            <a:ext cx="2057400" cy="221109"/>
+          </a:xfrm>
+        </p:spPr>
         <p:txBody>
           <a:bodyPr/>
           <a:lstStyle/>
           <a:p>
             <a:fld id="{B026633C-E544-DA45-A705-B44A7B402973}" type="datetime1">
               <a:rPr kumimoji="1" lang="ja-JP" altLang="en-US" smtClean="0"/>
-              <a:t>2018/10/20</a:t>
+              <a:t>2018/10/21</a:t>
             </a:fld>
             <a:endParaRPr kumimoji="1" lang="ja-JP" altLang="en-US"/>
           </a:p>
@@ -1179,7 +1190,12 @@
             <p:ph type="ftr" sz="quarter" idx="11"/>
           </p:nvPr>
         </p:nvSpPr>
-        <p:spPr/>
+        <p:spPr>
+          <a:xfrm>
+            <a:off x="3028950" y="6597352"/>
+            <a:ext cx="3086100" cy="221109"/>
+          </a:xfrm>
+        </p:spPr>
         <p:txBody>
           <a:bodyPr/>
           <a:lstStyle/>
@@ -1198,7 +1214,12 @@
             <p:ph type="sldNum" sz="quarter" idx="12"/>
           </p:nvPr>
         </p:nvSpPr>
-        <p:spPr/>
+        <p:spPr>
+          <a:xfrm>
+            <a:off x="6457950" y="6597352"/>
+            <a:ext cx="2057400" cy="221109"/>
+          </a:xfrm>
+        </p:spPr>
         <p:txBody>
           <a:bodyPr/>
           <a:lstStyle/>
@@ -1444,7 +1465,7 @@
           <a:p>
             <a:fld id="{75BCBF7F-B084-4047-BE6A-A729B2BDFEA8}" type="datetime1">
               <a:rPr kumimoji="1" lang="ja-JP" altLang="en-US" smtClean="0"/>
-              <a:t>2018/10/20</a:t>
+              <a:t>2018/10/21</a:t>
             </a:fld>
             <a:endParaRPr kumimoji="1" lang="ja-JP" altLang="en-US"/>
           </a:p>
@@ -1692,7 +1713,7 @@
           <a:p>
             <a:fld id="{C09D9B14-0B76-1840-A7BD-474CF72A4B65}" type="datetime1">
               <a:rPr kumimoji="1" lang="ja-JP" altLang="en-US" smtClean="0"/>
-              <a:t>2018/10/20</a:t>
+              <a:t>2018/10/21</a:t>
             </a:fld>
             <a:endParaRPr kumimoji="1" lang="ja-JP" altLang="en-US"/>
           </a:p>
@@ -2149,7 +2170,7 @@
           <a:p>
             <a:fld id="{320912EB-1735-9847-96B4-6EB5297105CD}" type="datetime1">
               <a:rPr kumimoji="1" lang="ja-JP" altLang="en-US" smtClean="0"/>
-              <a:t>2018/10/20</a:t>
+              <a:t>2018/10/21</a:t>
             </a:fld>
             <a:endParaRPr kumimoji="1" lang="ja-JP" altLang="en-US"/>
           </a:p>
@@ -2267,7 +2288,7 @@
           <a:p>
             <a:fld id="{2D32CB35-C3D9-2F49-9060-8479F2F563F4}" type="datetime1">
               <a:rPr kumimoji="1" lang="ja-JP" altLang="en-US" smtClean="0"/>
-              <a:t>2018/10/20</a:t>
+              <a:t>2018/10/21</a:t>
             </a:fld>
             <a:endParaRPr kumimoji="1" lang="ja-JP" altLang="en-US"/>
           </a:p>
@@ -2362,7 +2383,7 @@
           <a:p>
             <a:fld id="{09215C7D-F122-204F-A13A-95E3EF730427}" type="datetime1">
               <a:rPr kumimoji="1" lang="ja-JP" altLang="en-US" smtClean="0"/>
-              <a:t>2018/10/20</a:t>
+              <a:t>2018/10/21</a:t>
             </a:fld>
             <a:endParaRPr kumimoji="1" lang="ja-JP" altLang="en-US"/>
           </a:p>
@@ -2684,7 +2705,7 @@
           <a:p>
             <a:fld id="{7CE742CC-AB04-394F-95DC-4916A50FDBEE}" type="datetime1">
               <a:rPr kumimoji="1" lang="ja-JP" altLang="en-US" smtClean="0"/>
-              <a:t>2018/10/20</a:t>
+              <a:t>2018/10/21</a:t>
             </a:fld>
             <a:endParaRPr kumimoji="1" lang="ja-JP" altLang="en-US"/>
           </a:p>
@@ -2978,7 +2999,7 @@
           <a:p>
             <a:fld id="{8A8D9395-7356-D64B-8F25-F14BADA3CCE8}" type="datetime1">
               <a:rPr kumimoji="1" lang="ja-JP" altLang="en-US" smtClean="0"/>
-              <a:t>2018/10/20</a:t>
+              <a:t>2018/10/21</a:t>
             </a:fld>
             <a:endParaRPr kumimoji="1" lang="ja-JP" altLang="en-US"/>
           </a:p>
@@ -3199,7 +3220,7 @@
           <a:p>
             <a:fld id="{83103C3F-A96D-1340-80CB-81ACC68C7E6A}" type="datetime1">
               <a:rPr kumimoji="1" lang="ja-JP" altLang="en-US" smtClean="0"/>
-              <a:t>2018/10/20</a:t>
+              <a:t>2018/10/21</a:t>
             </a:fld>
             <a:endParaRPr kumimoji="1" lang="ja-JP" altLang="en-US"/>
           </a:p>
@@ -3628,7 +3649,15 @@
           <a:p>
             <a:r>
               <a:rPr kumimoji="1" lang="en-US" altLang="ja-JP" dirty="0"/>
-              <a:t>Action Flow - Overview</a:t>
+              <a:t>Action Flow v0.2 – </a:t>
+            </a:r>
+            <a:r>
+              <a:rPr kumimoji="1" lang="en-US" altLang="ja-JP" dirty="0" err="1"/>
+              <a:t>Conslidated</a:t>
+            </a:r>
+            <a:r>
+              <a:rPr kumimoji="1" lang="en-US" altLang="ja-JP" dirty="0"/>
+              <a:t> Page URL</a:t>
             </a:r>
             <a:endParaRPr kumimoji="1" lang="ja-JP" altLang="en-US"/>
           </a:p>
@@ -3649,9 +3678,2870 @@
           <p:nvPr>
             <p:extLst>
               <p:ext uri="{D42A27DB-BD31-4B8C-83A1-F6EECF244321}">
-                <p14:modId xmlns:p14="http://schemas.microsoft.com/office/powerpoint/2010/main" val="2437660585"/>
+                <p14:modId xmlns:p14="http://schemas.microsoft.com/office/powerpoint/2010/main" val="3909514829"/>
               </p:ext>
             </p:extLst>
+          </p:nvPr>
+        </p:nvGraphicFramePr>
+        <p:xfrm>
+          <a:off x="395536" y="1196752"/>
+          <a:ext cx="8208912" cy="5400600"/>
+        </p:xfrm>
+        <a:graphic>
+          <a:graphicData uri="http://schemas.openxmlformats.org/drawingml/2006/table">
+            <a:tbl>
+              <a:tblPr firstRow="1" bandRow="1">
+                <a:tableStyleId>{5C22544A-7EE6-4342-B048-85BDC9FD1C3A}</a:tableStyleId>
+              </a:tblPr>
+              <a:tblGrid>
+                <a:gridCol w="784910">
+                  <a:extLst>
+                    <a:ext uri="{9D8B030D-6E8A-4147-A177-3AD203B41FA5}">
+                      <a16:colId xmlns:a16="http://schemas.microsoft.com/office/drawing/2014/main" val="590586601"/>
+                    </a:ext>
+                  </a:extLst>
+                </a:gridCol>
+                <a:gridCol w="7424002">
+                  <a:extLst>
+                    <a:ext uri="{9D8B030D-6E8A-4147-A177-3AD203B41FA5}">
+                      <a16:colId xmlns:a16="http://schemas.microsoft.com/office/drawing/2014/main" val="1758684054"/>
+                    </a:ext>
+                  </a:extLst>
+                </a:gridCol>
+              </a:tblGrid>
+              <a:tr h="1800200">
+                <a:tc>
+                  <a:txBody>
+                    <a:bodyPr/>
+                    <a:lstStyle/>
+                    <a:p>
+                      <a:pPr algn="ctr"/>
+                      <a:r>
+                        <a:rPr kumimoji="1" lang="en-US" altLang="ja-JP" sz="1400" b="0" dirty="0">
+                          <a:solidFill>
+                            <a:schemeClr val="bg1"/>
+                          </a:solidFill>
+                          <a:latin typeface="+mn-lt"/>
+                          <a:ea typeface="+mj-ea"/>
+                        </a:rPr>
+                        <a:t>Action</a:t>
+                      </a:r>
+                      <a:endParaRPr kumimoji="1" lang="ja-JP" altLang="en-US" sz="1400" b="0">
+                        <a:solidFill>
+                          <a:schemeClr val="bg1"/>
+                        </a:solidFill>
+                        <a:latin typeface="+mn-lt"/>
+                        <a:ea typeface="+mj-ea"/>
+                      </a:endParaRPr>
+                    </a:p>
+                  </a:txBody>
+                  <a:tcPr anchor="ctr">
+                    <a:lnL w="12700" cap="flat" cmpd="sng" algn="ctr">
+                      <a:solidFill>
+                        <a:schemeClr val="bg1">
+                          <a:lumMod val="75000"/>
+                        </a:schemeClr>
+                      </a:solidFill>
+                      <a:prstDash val="solid"/>
+                      <a:round/>
+                      <a:headEnd type="none" w="med" len="med"/>
+                      <a:tailEnd type="none" w="med" len="med"/>
+                    </a:lnL>
+                    <a:lnR w="12700" cap="flat" cmpd="sng" algn="ctr">
+                      <a:solidFill>
+                        <a:schemeClr val="bg1">
+                          <a:lumMod val="75000"/>
+                        </a:schemeClr>
+                      </a:solidFill>
+                      <a:prstDash val="solid"/>
+                      <a:round/>
+                      <a:headEnd type="none" w="med" len="med"/>
+                      <a:tailEnd type="none" w="med" len="med"/>
+                    </a:lnR>
+                    <a:lnT w="12700" cap="flat" cmpd="sng" algn="ctr">
+                      <a:solidFill>
+                        <a:schemeClr val="bg1">
+                          <a:lumMod val="75000"/>
+                        </a:schemeClr>
+                      </a:solidFill>
+                      <a:prstDash val="solid"/>
+                      <a:round/>
+                      <a:headEnd type="none" w="med" len="med"/>
+                      <a:tailEnd type="none" w="med" len="med"/>
+                    </a:lnT>
+                    <a:lnB w="12700" cap="flat" cmpd="sng" algn="ctr">
+                      <a:solidFill>
+                        <a:schemeClr val="bg1">
+                          <a:lumMod val="75000"/>
+                        </a:schemeClr>
+                      </a:solidFill>
+                      <a:prstDash val="solid"/>
+                      <a:round/>
+                      <a:headEnd type="none" w="med" len="med"/>
+                      <a:tailEnd type="none" w="med" len="med"/>
+                    </a:lnB>
+                    <a:lnTlToBr w="12700" cmpd="sng">
+                      <a:noFill/>
+                      <a:prstDash val="solid"/>
+                    </a:lnTlToBr>
+                    <a:lnBlToTr w="12700" cmpd="sng">
+                      <a:noFill/>
+                      <a:prstDash val="solid"/>
+                    </a:lnBlToTr>
+                    <a:solidFill>
+                      <a:schemeClr val="accent1"/>
+                    </a:solidFill>
+                  </a:tcPr>
+                </a:tc>
+                <a:tc>
+                  <a:txBody>
+                    <a:bodyPr/>
+                    <a:lstStyle/>
+                    <a:p>
+                      <a:endParaRPr kumimoji="1" lang="ja-JP" altLang="en-US" sz="1400" b="0">
+                        <a:latin typeface="+mj-ea"/>
+                        <a:ea typeface="+mj-ea"/>
+                      </a:endParaRPr>
+                    </a:p>
+                  </a:txBody>
+                  <a:tcPr>
+                    <a:lnL w="12700" cap="flat" cmpd="sng" algn="ctr">
+                      <a:solidFill>
+                        <a:schemeClr val="bg1">
+                          <a:lumMod val="75000"/>
+                        </a:schemeClr>
+                      </a:solidFill>
+                      <a:prstDash val="solid"/>
+                      <a:round/>
+                      <a:headEnd type="none" w="med" len="med"/>
+                      <a:tailEnd type="none" w="med" len="med"/>
+                    </a:lnL>
+                    <a:lnR w="12700" cap="flat" cmpd="sng" algn="ctr">
+                      <a:solidFill>
+                        <a:schemeClr val="bg1">
+                          <a:lumMod val="75000"/>
+                        </a:schemeClr>
+                      </a:solidFill>
+                      <a:prstDash val="solid"/>
+                      <a:round/>
+                      <a:headEnd type="none" w="med" len="med"/>
+                      <a:tailEnd type="none" w="med" len="med"/>
+                    </a:lnR>
+                    <a:lnT w="12700" cap="flat" cmpd="sng" algn="ctr">
+                      <a:solidFill>
+                        <a:schemeClr val="bg1">
+                          <a:lumMod val="75000"/>
+                        </a:schemeClr>
+                      </a:solidFill>
+                      <a:prstDash val="solid"/>
+                      <a:round/>
+                      <a:headEnd type="none" w="med" len="med"/>
+                      <a:tailEnd type="none" w="med" len="med"/>
+                    </a:lnT>
+                    <a:lnB w="12700" cap="flat" cmpd="sng" algn="ctr">
+                      <a:solidFill>
+                        <a:schemeClr val="bg1">
+                          <a:lumMod val="75000"/>
+                        </a:schemeClr>
+                      </a:solidFill>
+                      <a:prstDash val="solid"/>
+                      <a:round/>
+                      <a:headEnd type="none" w="med" len="med"/>
+                      <a:tailEnd type="none" w="med" len="med"/>
+                    </a:lnB>
+                    <a:lnTlToBr w="12700" cmpd="sng">
+                      <a:noFill/>
+                      <a:prstDash val="solid"/>
+                    </a:lnTlToBr>
+                    <a:lnBlToTr w="12700" cmpd="sng">
+                      <a:noFill/>
+                      <a:prstDash val="solid"/>
+                    </a:lnBlToTr>
+                    <a:noFill/>
+                  </a:tcPr>
+                </a:tc>
+                <a:extLst>
+                  <a:ext uri="{0D108BD9-81ED-4DB2-BD59-A6C34878D82A}">
+                    <a16:rowId xmlns:a16="http://schemas.microsoft.com/office/drawing/2014/main" val="891734404"/>
+                  </a:ext>
+                </a:extLst>
+              </a:tr>
+              <a:tr h="1800200">
+                <a:tc>
+                  <a:txBody>
+                    <a:bodyPr/>
+                    <a:lstStyle/>
+                    <a:p>
+                      <a:pPr algn="ctr"/>
+                      <a:r>
+                        <a:rPr kumimoji="1" lang="en-US" altLang="ja-JP" sz="1400" b="0" dirty="0">
+                          <a:solidFill>
+                            <a:schemeClr val="bg1"/>
+                          </a:solidFill>
+                          <a:latin typeface="+mn-lt"/>
+                          <a:ea typeface="+mj-ea"/>
+                        </a:rPr>
+                        <a:t>Work</a:t>
+                      </a:r>
+                    </a:p>
+                    <a:p>
+                      <a:pPr algn="ctr"/>
+                      <a:r>
+                        <a:rPr kumimoji="1" lang="en-US" altLang="ja-JP" sz="1400" b="0" dirty="0">
+                          <a:solidFill>
+                            <a:schemeClr val="bg1"/>
+                          </a:solidFill>
+                          <a:latin typeface="+mn-lt"/>
+                          <a:ea typeface="+mj-ea"/>
+                        </a:rPr>
+                        <a:t>Data</a:t>
+                      </a:r>
+                      <a:endParaRPr kumimoji="1" lang="ja-JP" altLang="en-US" sz="1400" b="0">
+                        <a:solidFill>
+                          <a:schemeClr val="bg1"/>
+                        </a:solidFill>
+                        <a:latin typeface="+mn-lt"/>
+                        <a:ea typeface="+mj-ea"/>
+                      </a:endParaRPr>
+                    </a:p>
+                  </a:txBody>
+                  <a:tcPr anchor="ctr">
+                    <a:lnL w="12700" cap="flat" cmpd="sng" algn="ctr">
+                      <a:solidFill>
+                        <a:schemeClr val="bg1">
+                          <a:lumMod val="75000"/>
+                        </a:schemeClr>
+                      </a:solidFill>
+                      <a:prstDash val="solid"/>
+                      <a:round/>
+                      <a:headEnd type="none" w="med" len="med"/>
+                      <a:tailEnd type="none" w="med" len="med"/>
+                    </a:lnL>
+                    <a:lnR w="12700" cap="flat" cmpd="sng" algn="ctr">
+                      <a:solidFill>
+                        <a:schemeClr val="bg1">
+                          <a:lumMod val="75000"/>
+                        </a:schemeClr>
+                      </a:solidFill>
+                      <a:prstDash val="solid"/>
+                      <a:round/>
+                      <a:headEnd type="none" w="med" len="med"/>
+                      <a:tailEnd type="none" w="med" len="med"/>
+                    </a:lnR>
+                    <a:lnT w="12700" cap="flat" cmpd="sng" algn="ctr">
+                      <a:solidFill>
+                        <a:schemeClr val="bg1">
+                          <a:lumMod val="75000"/>
+                        </a:schemeClr>
+                      </a:solidFill>
+                      <a:prstDash val="solid"/>
+                      <a:round/>
+                      <a:headEnd type="none" w="med" len="med"/>
+                      <a:tailEnd type="none" w="med" len="med"/>
+                    </a:lnT>
+                    <a:lnB w="12700" cap="flat" cmpd="sng" algn="ctr">
+                      <a:solidFill>
+                        <a:schemeClr val="bg1">
+                          <a:lumMod val="75000"/>
+                        </a:schemeClr>
+                      </a:solidFill>
+                      <a:prstDash val="solid"/>
+                      <a:round/>
+                      <a:headEnd type="none" w="med" len="med"/>
+                      <a:tailEnd type="none" w="med" len="med"/>
+                    </a:lnB>
+                    <a:lnTlToBr w="12700" cmpd="sng">
+                      <a:noFill/>
+                      <a:prstDash val="solid"/>
+                    </a:lnTlToBr>
+                    <a:lnBlToTr w="12700" cmpd="sng">
+                      <a:noFill/>
+                      <a:prstDash val="solid"/>
+                    </a:lnBlToTr>
+                    <a:solidFill>
+                      <a:schemeClr val="accent1"/>
+                    </a:solidFill>
+                  </a:tcPr>
+                </a:tc>
+                <a:tc>
+                  <a:txBody>
+                    <a:bodyPr/>
+                    <a:lstStyle/>
+                    <a:p>
+                      <a:endParaRPr kumimoji="1" lang="ja-JP" altLang="en-US" sz="1400" b="0">
+                        <a:latin typeface="+mj-ea"/>
+                        <a:ea typeface="+mj-ea"/>
+                      </a:endParaRPr>
+                    </a:p>
+                  </a:txBody>
+                  <a:tcPr>
+                    <a:lnL w="12700" cap="flat" cmpd="sng" algn="ctr">
+                      <a:solidFill>
+                        <a:schemeClr val="bg1">
+                          <a:lumMod val="75000"/>
+                        </a:schemeClr>
+                      </a:solidFill>
+                      <a:prstDash val="solid"/>
+                      <a:round/>
+                      <a:headEnd type="none" w="med" len="med"/>
+                      <a:tailEnd type="none" w="med" len="med"/>
+                    </a:lnL>
+                    <a:lnR w="12700" cap="flat" cmpd="sng" algn="ctr">
+                      <a:solidFill>
+                        <a:schemeClr val="bg1">
+                          <a:lumMod val="75000"/>
+                        </a:schemeClr>
+                      </a:solidFill>
+                      <a:prstDash val="solid"/>
+                      <a:round/>
+                      <a:headEnd type="none" w="med" len="med"/>
+                      <a:tailEnd type="none" w="med" len="med"/>
+                    </a:lnR>
+                    <a:lnT w="12700" cap="flat" cmpd="sng" algn="ctr">
+                      <a:solidFill>
+                        <a:schemeClr val="bg1">
+                          <a:lumMod val="75000"/>
+                        </a:schemeClr>
+                      </a:solidFill>
+                      <a:prstDash val="solid"/>
+                      <a:round/>
+                      <a:headEnd type="none" w="med" len="med"/>
+                      <a:tailEnd type="none" w="med" len="med"/>
+                    </a:lnT>
+                    <a:lnB w="12700" cap="flat" cmpd="sng" algn="ctr">
+                      <a:solidFill>
+                        <a:schemeClr val="bg1">
+                          <a:lumMod val="75000"/>
+                        </a:schemeClr>
+                      </a:solidFill>
+                      <a:prstDash val="solid"/>
+                      <a:round/>
+                      <a:headEnd type="none" w="med" len="med"/>
+                      <a:tailEnd type="none" w="med" len="med"/>
+                    </a:lnB>
+                    <a:lnTlToBr w="12700" cmpd="sng">
+                      <a:noFill/>
+                      <a:prstDash val="solid"/>
+                    </a:lnTlToBr>
+                    <a:lnBlToTr w="12700" cmpd="sng">
+                      <a:noFill/>
+                      <a:prstDash val="solid"/>
+                    </a:lnBlToTr>
+                    <a:noFill/>
+                  </a:tcPr>
+                </a:tc>
+                <a:extLst>
+                  <a:ext uri="{0D108BD9-81ED-4DB2-BD59-A6C34878D82A}">
+                    <a16:rowId xmlns:a16="http://schemas.microsoft.com/office/drawing/2014/main" val="3257264826"/>
+                  </a:ext>
+                </a:extLst>
+              </a:tr>
+              <a:tr h="1800200">
+                <a:tc>
+                  <a:txBody>
+                    <a:bodyPr/>
+                    <a:lstStyle/>
+                    <a:p>
+                      <a:pPr algn="ctr"/>
+                      <a:r>
+                        <a:rPr kumimoji="1" lang="en-US" altLang="ja-JP" sz="1400" b="0" dirty="0">
+                          <a:solidFill>
+                            <a:schemeClr val="bg1"/>
+                          </a:solidFill>
+                          <a:latin typeface="+mn-lt"/>
+                          <a:ea typeface="+mj-ea"/>
+                        </a:rPr>
+                        <a:t>DB</a:t>
+                      </a:r>
+                      <a:endParaRPr kumimoji="1" lang="ja-JP" altLang="en-US" sz="1400" b="0">
+                        <a:solidFill>
+                          <a:schemeClr val="bg1"/>
+                        </a:solidFill>
+                        <a:latin typeface="+mn-lt"/>
+                        <a:ea typeface="+mj-ea"/>
+                      </a:endParaRPr>
+                    </a:p>
+                  </a:txBody>
+                  <a:tcPr anchor="ctr">
+                    <a:lnL w="12700" cap="flat" cmpd="sng" algn="ctr">
+                      <a:solidFill>
+                        <a:schemeClr val="bg1">
+                          <a:lumMod val="75000"/>
+                        </a:schemeClr>
+                      </a:solidFill>
+                      <a:prstDash val="solid"/>
+                      <a:round/>
+                      <a:headEnd type="none" w="med" len="med"/>
+                      <a:tailEnd type="none" w="med" len="med"/>
+                    </a:lnL>
+                    <a:lnR w="12700" cap="flat" cmpd="sng" algn="ctr">
+                      <a:solidFill>
+                        <a:schemeClr val="bg1">
+                          <a:lumMod val="75000"/>
+                        </a:schemeClr>
+                      </a:solidFill>
+                      <a:prstDash val="solid"/>
+                      <a:round/>
+                      <a:headEnd type="none" w="med" len="med"/>
+                      <a:tailEnd type="none" w="med" len="med"/>
+                    </a:lnR>
+                    <a:lnT w="12700" cap="flat" cmpd="sng" algn="ctr">
+                      <a:solidFill>
+                        <a:schemeClr val="bg1">
+                          <a:lumMod val="75000"/>
+                        </a:schemeClr>
+                      </a:solidFill>
+                      <a:prstDash val="solid"/>
+                      <a:round/>
+                      <a:headEnd type="none" w="med" len="med"/>
+                      <a:tailEnd type="none" w="med" len="med"/>
+                    </a:lnT>
+                    <a:lnB w="12700" cap="flat" cmpd="sng" algn="ctr">
+                      <a:solidFill>
+                        <a:schemeClr val="bg1">
+                          <a:lumMod val="75000"/>
+                        </a:schemeClr>
+                      </a:solidFill>
+                      <a:prstDash val="solid"/>
+                      <a:round/>
+                      <a:headEnd type="none" w="med" len="med"/>
+                      <a:tailEnd type="none" w="med" len="med"/>
+                    </a:lnB>
+                    <a:lnTlToBr w="12700" cmpd="sng">
+                      <a:noFill/>
+                      <a:prstDash val="solid"/>
+                    </a:lnTlToBr>
+                    <a:lnBlToTr w="12700" cmpd="sng">
+                      <a:noFill/>
+                      <a:prstDash val="solid"/>
+                    </a:lnBlToTr>
+                    <a:solidFill>
+                      <a:schemeClr val="accent1"/>
+                    </a:solidFill>
+                  </a:tcPr>
+                </a:tc>
+                <a:tc>
+                  <a:txBody>
+                    <a:bodyPr/>
+                    <a:lstStyle/>
+                    <a:p>
+                      <a:endParaRPr kumimoji="1" lang="ja-JP" altLang="en-US" sz="1400" b="0">
+                        <a:latin typeface="+mj-ea"/>
+                        <a:ea typeface="+mj-ea"/>
+                      </a:endParaRPr>
+                    </a:p>
+                  </a:txBody>
+                  <a:tcPr>
+                    <a:lnL w="12700" cap="flat" cmpd="sng" algn="ctr">
+                      <a:solidFill>
+                        <a:schemeClr val="bg1">
+                          <a:lumMod val="75000"/>
+                        </a:schemeClr>
+                      </a:solidFill>
+                      <a:prstDash val="solid"/>
+                      <a:round/>
+                      <a:headEnd type="none" w="med" len="med"/>
+                      <a:tailEnd type="none" w="med" len="med"/>
+                    </a:lnL>
+                    <a:lnR w="12700" cap="flat" cmpd="sng" algn="ctr">
+                      <a:solidFill>
+                        <a:schemeClr val="bg1">
+                          <a:lumMod val="75000"/>
+                        </a:schemeClr>
+                      </a:solidFill>
+                      <a:prstDash val="solid"/>
+                      <a:round/>
+                      <a:headEnd type="none" w="med" len="med"/>
+                      <a:tailEnd type="none" w="med" len="med"/>
+                    </a:lnR>
+                    <a:lnT w="12700" cap="flat" cmpd="sng" algn="ctr">
+                      <a:solidFill>
+                        <a:schemeClr val="bg1">
+                          <a:lumMod val="75000"/>
+                        </a:schemeClr>
+                      </a:solidFill>
+                      <a:prstDash val="solid"/>
+                      <a:round/>
+                      <a:headEnd type="none" w="med" len="med"/>
+                      <a:tailEnd type="none" w="med" len="med"/>
+                    </a:lnT>
+                    <a:lnB w="12700" cap="flat" cmpd="sng" algn="ctr">
+                      <a:solidFill>
+                        <a:schemeClr val="bg1">
+                          <a:lumMod val="75000"/>
+                        </a:schemeClr>
+                      </a:solidFill>
+                      <a:prstDash val="solid"/>
+                      <a:round/>
+                      <a:headEnd type="none" w="med" len="med"/>
+                      <a:tailEnd type="none" w="med" len="med"/>
+                    </a:lnB>
+                    <a:lnTlToBr w="12700" cmpd="sng">
+                      <a:noFill/>
+                      <a:prstDash val="solid"/>
+                    </a:lnTlToBr>
+                    <a:lnBlToTr w="12700" cmpd="sng">
+                      <a:noFill/>
+                      <a:prstDash val="solid"/>
+                    </a:lnBlToTr>
+                    <a:noFill/>
+                  </a:tcPr>
+                </a:tc>
+                <a:extLst>
+                  <a:ext uri="{0D108BD9-81ED-4DB2-BD59-A6C34878D82A}">
+                    <a16:rowId xmlns:a16="http://schemas.microsoft.com/office/drawing/2014/main" val="3480396594"/>
+                  </a:ext>
+                </a:extLst>
+              </a:tr>
+            </a:tbl>
+          </a:graphicData>
+        </a:graphic>
+      </p:graphicFrame>
+      <p:sp>
+        <p:nvSpPr>
+          <p:cNvPr id="9" name="正方形/長方形 8">
+            <a:extLst>
+              <a:ext uri="{FF2B5EF4-FFF2-40B4-BE49-F238E27FC236}">
+                <a16:creationId xmlns:a16="http://schemas.microsoft.com/office/drawing/2014/main" id="{91024AA6-39E6-7342-95BA-4ED1A88B5B87}"/>
+              </a:ext>
+            </a:extLst>
+          </p:cNvPr>
+          <p:cNvSpPr/>
+          <p:nvPr/>
+        </p:nvSpPr>
+        <p:spPr>
+          <a:xfrm>
+            <a:off x="1314550" y="1742790"/>
+            <a:ext cx="720080" cy="720080"/>
+          </a:xfrm>
+          <a:prstGeom prst="rect">
+            <a:avLst/>
+          </a:prstGeom>
+          <a:solidFill>
+            <a:schemeClr val="accent1">
+              <a:lumMod val="20000"/>
+              <a:lumOff val="80000"/>
+            </a:schemeClr>
+          </a:solidFill>
+          <a:ln>
+            <a:solidFill>
+              <a:schemeClr val="tx1">
+                <a:lumMod val="75000"/>
+                <a:lumOff val="25000"/>
+              </a:schemeClr>
+            </a:solidFill>
+          </a:ln>
+        </p:spPr>
+        <p:style>
+          <a:lnRef idx="2">
+            <a:schemeClr val="accent1">
+              <a:shade val="50000"/>
+            </a:schemeClr>
+          </a:lnRef>
+          <a:fillRef idx="1">
+            <a:schemeClr val="accent1"/>
+          </a:fillRef>
+          <a:effectRef idx="0">
+            <a:schemeClr val="accent1"/>
+          </a:effectRef>
+          <a:fontRef idx="minor">
+            <a:schemeClr val="lt1"/>
+          </a:fontRef>
+        </p:style>
+        <p:txBody>
+          <a:bodyPr wrap="none" lIns="36000" tIns="36000" rIns="36000" bIns="36000" rtlCol="0" anchor="ctr"/>
+          <a:lstStyle/>
+          <a:p>
+            <a:pPr algn="ctr"/>
+            <a:r>
+              <a:rPr kumimoji="1" lang="en-US" altLang="ja-JP" sz="1200" dirty="0">
+                <a:solidFill>
+                  <a:schemeClr val="tx1">
+                    <a:lumMod val="75000"/>
+                    <a:lumOff val="25000"/>
+                  </a:schemeClr>
+                </a:solidFill>
+              </a:rPr>
+              <a:t>Add</a:t>
+            </a:r>
+          </a:p>
+          <a:p>
+            <a:pPr algn="ctr"/>
+            <a:r>
+              <a:rPr lang="en-US" altLang="ja-JP" sz="1200" dirty="0">
+                <a:solidFill>
+                  <a:schemeClr val="tx1">
+                    <a:lumMod val="75000"/>
+                    <a:lumOff val="25000"/>
+                  </a:schemeClr>
+                </a:solidFill>
+              </a:rPr>
+              <a:t>scraping</a:t>
+            </a:r>
+          </a:p>
+          <a:p>
+            <a:pPr algn="ctr"/>
+            <a:r>
+              <a:rPr lang="en-US" altLang="ja-JP" sz="1200" dirty="0">
+                <a:solidFill>
+                  <a:schemeClr val="tx1">
+                    <a:lumMod val="75000"/>
+                    <a:lumOff val="25000"/>
+                  </a:schemeClr>
+                </a:solidFill>
+              </a:rPr>
+              <a:t>page</a:t>
+            </a:r>
+            <a:r>
+              <a:rPr kumimoji="1" lang="en-US" altLang="ja-JP" sz="1200" dirty="0">
+                <a:solidFill>
+                  <a:schemeClr val="tx1">
+                    <a:lumMod val="75000"/>
+                    <a:lumOff val="25000"/>
+                  </a:schemeClr>
+                </a:solidFill>
+              </a:rPr>
+              <a:t> URL</a:t>
+            </a:r>
+            <a:endParaRPr kumimoji="1" lang="ja-JP" altLang="en-US" sz="1200">
+              <a:solidFill>
+                <a:schemeClr val="tx1">
+                  <a:lumMod val="75000"/>
+                  <a:lumOff val="25000"/>
+                </a:schemeClr>
+              </a:solidFill>
+            </a:endParaRPr>
+          </a:p>
+        </p:txBody>
+      </p:sp>
+      <p:sp>
+        <p:nvSpPr>
+          <p:cNvPr id="10" name="スライド番号プレースホルダー 9">
+            <a:extLst>
+              <a:ext uri="{FF2B5EF4-FFF2-40B4-BE49-F238E27FC236}">
+                <a16:creationId xmlns:a16="http://schemas.microsoft.com/office/drawing/2014/main" id="{29F667D8-015C-6F4A-8E99-C4CE6E974748}"/>
+              </a:ext>
+            </a:extLst>
+          </p:cNvPr>
+          <p:cNvSpPr>
+            <a:spLocks noGrp="1"/>
+          </p:cNvSpPr>
+          <p:nvPr>
+            <p:ph type="sldNum" sz="quarter" idx="12"/>
+          </p:nvPr>
+        </p:nvSpPr>
+        <p:spPr/>
+        <p:txBody>
+          <a:bodyPr/>
+          <a:lstStyle/>
+          <a:p>
+            <a:fld id="{D0280A10-6354-6240-932A-EFE3B18031F6}" type="slidenum">
+              <a:rPr kumimoji="1" lang="ja-JP" altLang="en-US" smtClean="0"/>
+              <a:t>1</a:t>
+            </a:fld>
+            <a:endParaRPr kumimoji="1" lang="ja-JP" altLang="en-US"/>
+          </a:p>
+        </p:txBody>
+      </p:sp>
+      <p:sp>
+        <p:nvSpPr>
+          <p:cNvPr id="11" name="正方形/長方形 10">
+            <a:extLst>
+              <a:ext uri="{FF2B5EF4-FFF2-40B4-BE49-F238E27FC236}">
+                <a16:creationId xmlns:a16="http://schemas.microsoft.com/office/drawing/2014/main" id="{12291909-7DC3-9D4A-8D39-BB74E14C2B19}"/>
+              </a:ext>
+            </a:extLst>
+          </p:cNvPr>
+          <p:cNvSpPr/>
+          <p:nvPr/>
+        </p:nvSpPr>
+        <p:spPr>
+          <a:xfrm>
+            <a:off x="2322661" y="1742790"/>
+            <a:ext cx="991023" cy="720080"/>
+          </a:xfrm>
+          <a:prstGeom prst="rect">
+            <a:avLst/>
+          </a:prstGeom>
+          <a:solidFill>
+            <a:schemeClr val="accent1">
+              <a:lumMod val="20000"/>
+              <a:lumOff val="80000"/>
+            </a:schemeClr>
+          </a:solidFill>
+          <a:ln>
+            <a:solidFill>
+              <a:schemeClr val="tx1">
+                <a:lumMod val="75000"/>
+                <a:lumOff val="25000"/>
+              </a:schemeClr>
+            </a:solidFill>
+          </a:ln>
+        </p:spPr>
+        <p:style>
+          <a:lnRef idx="2">
+            <a:schemeClr val="accent1">
+              <a:shade val="50000"/>
+            </a:schemeClr>
+          </a:lnRef>
+          <a:fillRef idx="1">
+            <a:schemeClr val="accent1"/>
+          </a:fillRef>
+          <a:effectRef idx="0">
+            <a:schemeClr val="accent1"/>
+          </a:effectRef>
+          <a:fontRef idx="minor">
+            <a:schemeClr val="lt1"/>
+          </a:fontRef>
+        </p:style>
+        <p:txBody>
+          <a:bodyPr wrap="none" lIns="36000" tIns="36000" rIns="36000" bIns="36000" rtlCol="0" anchor="ctr"/>
+          <a:lstStyle/>
+          <a:p>
+            <a:pPr algn="ctr"/>
+            <a:r>
+              <a:rPr kumimoji="1" lang="en-US" altLang="ja-JP" sz="1200" dirty="0">
+                <a:solidFill>
+                  <a:schemeClr val="tx1">
+                    <a:lumMod val="75000"/>
+                    <a:lumOff val="25000"/>
+                  </a:schemeClr>
+                </a:solidFill>
+              </a:rPr>
+              <a:t>Get</a:t>
+            </a:r>
+          </a:p>
+          <a:p>
+            <a:pPr algn="ctr"/>
+            <a:r>
+              <a:rPr lang="en-US" altLang="ja-JP" sz="1200" dirty="0">
+                <a:solidFill>
+                  <a:schemeClr val="tx1">
+                    <a:lumMod val="75000"/>
+                    <a:lumOff val="25000"/>
+                  </a:schemeClr>
+                </a:solidFill>
+              </a:rPr>
+              <a:t>scraping page</a:t>
+            </a:r>
+          </a:p>
+          <a:p>
+            <a:pPr algn="ctr"/>
+            <a:r>
+              <a:rPr lang="en-US" altLang="ja-JP" sz="1200" dirty="0">
+                <a:solidFill>
+                  <a:schemeClr val="tx1">
+                    <a:lumMod val="75000"/>
+                    <a:lumOff val="25000"/>
+                  </a:schemeClr>
+                </a:solidFill>
+              </a:rPr>
+              <a:t>HTML</a:t>
+            </a:r>
+            <a:endParaRPr kumimoji="1" lang="ja-JP" altLang="en-US" sz="1200">
+              <a:solidFill>
+                <a:schemeClr val="tx1">
+                  <a:lumMod val="75000"/>
+                  <a:lumOff val="25000"/>
+                </a:schemeClr>
+              </a:solidFill>
+            </a:endParaRPr>
+          </a:p>
+        </p:txBody>
+      </p:sp>
+      <p:sp>
+        <p:nvSpPr>
+          <p:cNvPr id="12" name="円柱 11">
+            <a:extLst>
+              <a:ext uri="{FF2B5EF4-FFF2-40B4-BE49-F238E27FC236}">
+                <a16:creationId xmlns:a16="http://schemas.microsoft.com/office/drawing/2014/main" id="{5A39070F-B41A-FB48-9E0D-F61D0FBCB927}"/>
+              </a:ext>
+            </a:extLst>
+          </p:cNvPr>
+          <p:cNvSpPr/>
+          <p:nvPr/>
+        </p:nvSpPr>
+        <p:spPr>
+          <a:xfrm>
+            <a:off x="1314550" y="6063270"/>
+            <a:ext cx="4885112" cy="462074"/>
+          </a:xfrm>
+          <a:prstGeom prst="can">
+            <a:avLst/>
+          </a:prstGeom>
+          <a:solidFill>
+            <a:schemeClr val="accent1">
+              <a:lumMod val="20000"/>
+              <a:lumOff val="80000"/>
+            </a:schemeClr>
+          </a:solidFill>
+          <a:ln>
+            <a:solidFill>
+              <a:schemeClr val="tx1">
+                <a:lumMod val="75000"/>
+                <a:lumOff val="25000"/>
+              </a:schemeClr>
+            </a:solidFill>
+          </a:ln>
+        </p:spPr>
+        <p:style>
+          <a:lnRef idx="2">
+            <a:schemeClr val="accent1">
+              <a:shade val="50000"/>
+            </a:schemeClr>
+          </a:lnRef>
+          <a:fillRef idx="1">
+            <a:schemeClr val="accent1"/>
+          </a:fillRef>
+          <a:effectRef idx="0">
+            <a:schemeClr val="accent1"/>
+          </a:effectRef>
+          <a:fontRef idx="minor">
+            <a:schemeClr val="lt1"/>
+          </a:fontRef>
+        </p:style>
+        <p:txBody>
+          <a:bodyPr wrap="none" lIns="36000" tIns="36000" rIns="36000" bIns="36000" rtlCol="0" anchor="ctr"/>
+          <a:lstStyle/>
+          <a:p>
+            <a:pPr algn="ctr"/>
+            <a:r>
+              <a:rPr kumimoji="1" lang="en-US" altLang="ja-JP" sz="1200" dirty="0">
+                <a:solidFill>
+                  <a:schemeClr val="tx1">
+                    <a:lumMod val="75000"/>
+                    <a:lumOff val="25000"/>
+                  </a:schemeClr>
+                </a:solidFill>
+              </a:rPr>
+              <a:t>Scraping Page </a:t>
+            </a:r>
+            <a:r>
+              <a:rPr lang="en-US" altLang="ja-JP" sz="1200" dirty="0" err="1">
+                <a:solidFill>
+                  <a:schemeClr val="tx1">
+                    <a:lumMod val="75000"/>
+                    <a:lumOff val="25000"/>
+                  </a:schemeClr>
+                </a:solidFill>
+              </a:rPr>
+              <a:t>Urls</a:t>
+            </a:r>
+            <a:endParaRPr kumimoji="1" lang="ja-JP" altLang="en-US" sz="1200">
+              <a:solidFill>
+                <a:schemeClr val="tx1">
+                  <a:lumMod val="75000"/>
+                  <a:lumOff val="25000"/>
+                </a:schemeClr>
+              </a:solidFill>
+            </a:endParaRPr>
+          </a:p>
+        </p:txBody>
+      </p:sp>
+      <p:cxnSp>
+        <p:nvCxnSpPr>
+          <p:cNvPr id="14" name="直線矢印コネクタ 13">
+            <a:extLst>
+              <a:ext uri="{FF2B5EF4-FFF2-40B4-BE49-F238E27FC236}">
+                <a16:creationId xmlns:a16="http://schemas.microsoft.com/office/drawing/2014/main" id="{91DDB582-0F29-6149-A837-2A6D55426DE5}"/>
+              </a:ext>
+            </a:extLst>
+          </p:cNvPr>
+          <p:cNvCxnSpPr>
+            <a:cxnSpLocks/>
+            <a:stCxn id="9" idx="2"/>
+          </p:cNvCxnSpPr>
+          <p:nvPr/>
+        </p:nvCxnSpPr>
+        <p:spPr>
+          <a:xfrm>
+            <a:off x="1674590" y="2462870"/>
+            <a:ext cx="0" cy="3600400"/>
+          </a:xfrm>
+          <a:prstGeom prst="straightConnector1">
+            <a:avLst/>
+          </a:prstGeom>
+          <a:ln>
+            <a:solidFill>
+              <a:schemeClr val="tx1">
+                <a:lumMod val="75000"/>
+                <a:lumOff val="25000"/>
+              </a:schemeClr>
+            </a:solidFill>
+            <a:tailEnd type="arrow"/>
+          </a:ln>
+        </p:spPr>
+        <p:style>
+          <a:lnRef idx="1">
+            <a:schemeClr val="accent1"/>
+          </a:lnRef>
+          <a:fillRef idx="0">
+            <a:schemeClr val="accent1"/>
+          </a:fillRef>
+          <a:effectRef idx="0">
+            <a:schemeClr val="accent1"/>
+          </a:effectRef>
+          <a:fontRef idx="minor">
+            <a:schemeClr val="tx1"/>
+          </a:fontRef>
+        </p:style>
+      </p:cxnSp>
+      <p:cxnSp>
+        <p:nvCxnSpPr>
+          <p:cNvPr id="16" name="直線矢印コネクタ 15">
+            <a:extLst>
+              <a:ext uri="{FF2B5EF4-FFF2-40B4-BE49-F238E27FC236}">
+                <a16:creationId xmlns:a16="http://schemas.microsoft.com/office/drawing/2014/main" id="{E917BCF0-40A5-D243-AE30-136BF4AFB104}"/>
+              </a:ext>
+            </a:extLst>
+          </p:cNvPr>
+          <p:cNvCxnSpPr>
+            <a:cxnSpLocks/>
+            <a:stCxn id="9" idx="3"/>
+            <a:endCxn id="11" idx="1"/>
+          </p:cNvCxnSpPr>
+          <p:nvPr/>
+        </p:nvCxnSpPr>
+        <p:spPr>
+          <a:xfrm>
+            <a:off x="2034630" y="2102830"/>
+            <a:ext cx="288031" cy="0"/>
+          </a:xfrm>
+          <a:prstGeom prst="straightConnector1">
+            <a:avLst/>
+          </a:prstGeom>
+          <a:ln>
+            <a:solidFill>
+              <a:schemeClr val="tx1">
+                <a:lumMod val="75000"/>
+                <a:lumOff val="25000"/>
+              </a:schemeClr>
+            </a:solidFill>
+            <a:tailEnd type="arrow"/>
+          </a:ln>
+        </p:spPr>
+        <p:style>
+          <a:lnRef idx="1">
+            <a:schemeClr val="accent1"/>
+          </a:lnRef>
+          <a:fillRef idx="0">
+            <a:schemeClr val="accent1"/>
+          </a:fillRef>
+          <a:effectRef idx="0">
+            <a:schemeClr val="accent1"/>
+          </a:effectRef>
+          <a:fontRef idx="minor">
+            <a:schemeClr val="tx1"/>
+          </a:fontRef>
+        </p:style>
+      </p:cxnSp>
+      <p:sp>
+        <p:nvSpPr>
+          <p:cNvPr id="33" name="正方形/長方形 32">
+            <a:extLst>
+              <a:ext uri="{FF2B5EF4-FFF2-40B4-BE49-F238E27FC236}">
+                <a16:creationId xmlns:a16="http://schemas.microsoft.com/office/drawing/2014/main" id="{9C1C8EB0-EB1C-8840-BCFF-97C0D04294D7}"/>
+              </a:ext>
+            </a:extLst>
+          </p:cNvPr>
+          <p:cNvSpPr/>
+          <p:nvPr/>
+        </p:nvSpPr>
+        <p:spPr>
+          <a:xfrm>
+            <a:off x="4750907" y="1742790"/>
+            <a:ext cx="1701394" cy="720080"/>
+          </a:xfrm>
+          <a:prstGeom prst="rect">
+            <a:avLst/>
+          </a:prstGeom>
+          <a:solidFill>
+            <a:schemeClr val="accent1">
+              <a:lumMod val="20000"/>
+              <a:lumOff val="80000"/>
+            </a:schemeClr>
+          </a:solidFill>
+          <a:ln>
+            <a:solidFill>
+              <a:schemeClr val="tx1">
+                <a:lumMod val="75000"/>
+                <a:lumOff val="25000"/>
+              </a:schemeClr>
+            </a:solidFill>
+          </a:ln>
+        </p:spPr>
+        <p:style>
+          <a:lnRef idx="2">
+            <a:schemeClr val="accent1">
+              <a:shade val="50000"/>
+            </a:schemeClr>
+          </a:lnRef>
+          <a:fillRef idx="1">
+            <a:schemeClr val="accent1"/>
+          </a:fillRef>
+          <a:effectRef idx="0">
+            <a:schemeClr val="accent1"/>
+          </a:effectRef>
+          <a:fontRef idx="minor">
+            <a:schemeClr val="lt1"/>
+          </a:fontRef>
+        </p:style>
+        <p:txBody>
+          <a:bodyPr wrap="none" lIns="36000" tIns="36000" rIns="36000" bIns="36000" rtlCol="0" anchor="ctr"/>
+          <a:lstStyle/>
+          <a:p>
+            <a:pPr algn="ctr"/>
+            <a:r>
+              <a:rPr kumimoji="1" lang="en-US" altLang="ja-JP" sz="1200" dirty="0">
+                <a:solidFill>
+                  <a:schemeClr val="tx1">
+                    <a:lumMod val="75000"/>
+                    <a:lumOff val="25000"/>
+                  </a:schemeClr>
+                </a:solidFill>
+              </a:rPr>
+              <a:t>Scraping </a:t>
+            </a:r>
+            <a:r>
+              <a:rPr lang="en-US" altLang="ja-JP" sz="1200" dirty="0">
+                <a:solidFill>
+                  <a:schemeClr val="tx1">
+                    <a:lumMod val="75000"/>
+                    <a:lumOff val="25000"/>
+                  </a:schemeClr>
+                </a:solidFill>
+              </a:rPr>
+              <a:t>code</a:t>
+            </a:r>
+            <a:endParaRPr kumimoji="1" lang="ja-JP" altLang="en-US" sz="1200">
+              <a:solidFill>
+                <a:schemeClr val="tx1">
+                  <a:lumMod val="75000"/>
+                  <a:lumOff val="25000"/>
+                </a:schemeClr>
+              </a:solidFill>
+            </a:endParaRPr>
+          </a:p>
+        </p:txBody>
+      </p:sp>
+      <p:cxnSp>
+        <p:nvCxnSpPr>
+          <p:cNvPr id="34" name="直線矢印コネクタ 33">
+            <a:extLst>
+              <a:ext uri="{FF2B5EF4-FFF2-40B4-BE49-F238E27FC236}">
+                <a16:creationId xmlns:a16="http://schemas.microsoft.com/office/drawing/2014/main" id="{BCAD3774-D64D-8147-B2F4-57682C982B31}"/>
+              </a:ext>
+            </a:extLst>
+          </p:cNvPr>
+          <p:cNvCxnSpPr>
+            <a:cxnSpLocks/>
+            <a:stCxn id="11" idx="3"/>
+            <a:endCxn id="54" idx="1"/>
+          </p:cNvCxnSpPr>
+          <p:nvPr/>
+        </p:nvCxnSpPr>
+        <p:spPr>
+          <a:xfrm>
+            <a:off x="3313684" y="2102830"/>
+            <a:ext cx="322212" cy="0"/>
+          </a:xfrm>
+          <a:prstGeom prst="straightConnector1">
+            <a:avLst/>
+          </a:prstGeom>
+          <a:ln>
+            <a:solidFill>
+              <a:schemeClr val="tx1">
+                <a:lumMod val="75000"/>
+                <a:lumOff val="25000"/>
+              </a:schemeClr>
+            </a:solidFill>
+            <a:tailEnd type="arrow"/>
+          </a:ln>
+        </p:spPr>
+        <p:style>
+          <a:lnRef idx="1">
+            <a:schemeClr val="accent1"/>
+          </a:lnRef>
+          <a:fillRef idx="0">
+            <a:schemeClr val="accent1"/>
+          </a:fillRef>
+          <a:effectRef idx="0">
+            <a:schemeClr val="accent1"/>
+          </a:effectRef>
+          <a:fontRef idx="minor">
+            <a:schemeClr val="tx1"/>
+          </a:fontRef>
+        </p:style>
+      </p:cxnSp>
+      <p:cxnSp>
+        <p:nvCxnSpPr>
+          <p:cNvPr id="42" name="直線矢印コネクタ 41">
+            <a:extLst>
+              <a:ext uri="{FF2B5EF4-FFF2-40B4-BE49-F238E27FC236}">
+                <a16:creationId xmlns:a16="http://schemas.microsoft.com/office/drawing/2014/main" id="{AFE5EF4A-5DC5-7748-ABCB-0A03E7D24F71}"/>
+              </a:ext>
+            </a:extLst>
+          </p:cNvPr>
+          <p:cNvCxnSpPr>
+            <a:cxnSpLocks/>
+          </p:cNvCxnSpPr>
+          <p:nvPr/>
+        </p:nvCxnSpPr>
+        <p:spPr>
+          <a:xfrm>
+            <a:off x="3114750" y="2462870"/>
+            <a:ext cx="0" cy="864096"/>
+          </a:xfrm>
+          <a:prstGeom prst="straightConnector1">
+            <a:avLst/>
+          </a:prstGeom>
+          <a:ln>
+            <a:solidFill>
+              <a:schemeClr val="tx1">
+                <a:lumMod val="75000"/>
+                <a:lumOff val="25000"/>
+              </a:schemeClr>
+            </a:solidFill>
+            <a:tailEnd type="arrow"/>
+          </a:ln>
+        </p:spPr>
+        <p:style>
+          <a:lnRef idx="1">
+            <a:schemeClr val="accent1"/>
+          </a:lnRef>
+          <a:fillRef idx="0">
+            <a:schemeClr val="accent1"/>
+          </a:fillRef>
+          <a:effectRef idx="0">
+            <a:schemeClr val="accent1"/>
+          </a:effectRef>
+          <a:fontRef idx="minor">
+            <a:schemeClr val="tx1"/>
+          </a:fontRef>
+        </p:style>
+      </p:cxnSp>
+      <p:cxnSp>
+        <p:nvCxnSpPr>
+          <p:cNvPr id="47" name="直線矢印コネクタ 46">
+            <a:extLst>
+              <a:ext uri="{FF2B5EF4-FFF2-40B4-BE49-F238E27FC236}">
+                <a16:creationId xmlns:a16="http://schemas.microsoft.com/office/drawing/2014/main" id="{7C5667A4-333C-DC4A-826C-9B2DD2F67B6A}"/>
+              </a:ext>
+            </a:extLst>
+          </p:cNvPr>
+          <p:cNvCxnSpPr>
+            <a:cxnSpLocks/>
+          </p:cNvCxnSpPr>
+          <p:nvPr/>
+        </p:nvCxnSpPr>
+        <p:spPr>
+          <a:xfrm flipV="1">
+            <a:off x="2565543" y="2462870"/>
+            <a:ext cx="0" cy="3600400"/>
+          </a:xfrm>
+          <a:prstGeom prst="straightConnector1">
+            <a:avLst/>
+          </a:prstGeom>
+          <a:ln>
+            <a:solidFill>
+              <a:schemeClr val="tx1">
+                <a:lumMod val="75000"/>
+                <a:lumOff val="25000"/>
+              </a:schemeClr>
+            </a:solidFill>
+            <a:tailEnd type="arrow"/>
+          </a:ln>
+        </p:spPr>
+        <p:style>
+          <a:lnRef idx="1">
+            <a:schemeClr val="accent1"/>
+          </a:lnRef>
+          <a:fillRef idx="0">
+            <a:schemeClr val="accent1"/>
+          </a:fillRef>
+          <a:effectRef idx="0">
+            <a:schemeClr val="accent1"/>
+          </a:effectRef>
+          <a:fontRef idx="minor">
+            <a:schemeClr val="tx1"/>
+          </a:fontRef>
+        </p:style>
+      </p:cxnSp>
+      <p:sp>
+        <p:nvSpPr>
+          <p:cNvPr id="49" name="テキスト ボックス 48">
+            <a:extLst>
+              <a:ext uri="{FF2B5EF4-FFF2-40B4-BE49-F238E27FC236}">
+                <a16:creationId xmlns:a16="http://schemas.microsoft.com/office/drawing/2014/main" id="{96994981-0603-0D45-9F47-76265E6A80C0}"/>
+              </a:ext>
+            </a:extLst>
+          </p:cNvPr>
+          <p:cNvSpPr txBox="1"/>
+          <p:nvPr/>
+        </p:nvSpPr>
+        <p:spPr>
+          <a:xfrm>
+            <a:off x="1674590" y="2492896"/>
+            <a:ext cx="432048" cy="216024"/>
+          </a:xfrm>
+          <a:prstGeom prst="rect">
+            <a:avLst/>
+          </a:prstGeom>
+          <a:noFill/>
+        </p:spPr>
+        <p:txBody>
+          <a:bodyPr wrap="none" rtlCol="0" anchor="ctr">
+            <a:noAutofit/>
+          </a:bodyPr>
+          <a:lstStyle/>
+          <a:p>
+            <a:pPr algn="ctr"/>
+            <a:r>
+              <a:rPr kumimoji="1" lang="en-US" altLang="ja-JP" sz="1200" dirty="0"/>
+              <a:t>URL</a:t>
+            </a:r>
+            <a:endParaRPr kumimoji="1" lang="ja-JP" altLang="en-US" sz="1200"/>
+          </a:p>
+        </p:txBody>
+      </p:sp>
+      <p:sp>
+        <p:nvSpPr>
+          <p:cNvPr id="50" name="テキスト ボックス 49">
+            <a:extLst>
+              <a:ext uri="{FF2B5EF4-FFF2-40B4-BE49-F238E27FC236}">
+                <a16:creationId xmlns:a16="http://schemas.microsoft.com/office/drawing/2014/main" id="{462391E3-AE28-3446-8F0B-162EF37A0AA3}"/>
+              </a:ext>
+            </a:extLst>
+          </p:cNvPr>
+          <p:cNvSpPr txBox="1"/>
+          <p:nvPr/>
+        </p:nvSpPr>
+        <p:spPr>
+          <a:xfrm>
+            <a:off x="2555776" y="5805264"/>
+            <a:ext cx="432048" cy="216024"/>
+          </a:xfrm>
+          <a:prstGeom prst="rect">
+            <a:avLst/>
+          </a:prstGeom>
+          <a:noFill/>
+        </p:spPr>
+        <p:txBody>
+          <a:bodyPr wrap="none" rtlCol="0" anchor="ctr">
+            <a:noAutofit/>
+          </a:bodyPr>
+          <a:lstStyle/>
+          <a:p>
+            <a:pPr algn="ctr"/>
+            <a:r>
+              <a:rPr kumimoji="1" lang="en-US" altLang="ja-JP" sz="1200" dirty="0"/>
+              <a:t>URL</a:t>
+            </a:r>
+            <a:endParaRPr kumimoji="1" lang="ja-JP" altLang="en-US" sz="1200"/>
+          </a:p>
+        </p:txBody>
+      </p:sp>
+      <p:sp>
+        <p:nvSpPr>
+          <p:cNvPr id="51" name="テキスト ボックス 50">
+            <a:extLst>
+              <a:ext uri="{FF2B5EF4-FFF2-40B4-BE49-F238E27FC236}">
+                <a16:creationId xmlns:a16="http://schemas.microsoft.com/office/drawing/2014/main" id="{DE4770AE-8D26-7848-9134-2E0A5FC553D8}"/>
+              </a:ext>
+            </a:extLst>
+          </p:cNvPr>
+          <p:cNvSpPr txBox="1"/>
+          <p:nvPr/>
+        </p:nvSpPr>
+        <p:spPr>
+          <a:xfrm>
+            <a:off x="3186758" y="2492896"/>
+            <a:ext cx="432048" cy="216024"/>
+          </a:xfrm>
+          <a:prstGeom prst="rect">
+            <a:avLst/>
+          </a:prstGeom>
+          <a:noFill/>
+        </p:spPr>
+        <p:txBody>
+          <a:bodyPr wrap="none" rtlCol="0" anchor="ctr">
+            <a:noAutofit/>
+          </a:bodyPr>
+          <a:lstStyle/>
+          <a:p>
+            <a:pPr algn="ctr"/>
+            <a:r>
+              <a:rPr kumimoji="1" lang="en-US" altLang="ja-JP" sz="1200" dirty="0"/>
+              <a:t>HTML</a:t>
+            </a:r>
+            <a:endParaRPr kumimoji="1" lang="ja-JP" altLang="en-US" sz="1200"/>
+          </a:p>
+        </p:txBody>
+      </p:sp>
+      <p:sp>
+        <p:nvSpPr>
+          <p:cNvPr id="53" name="円柱 52">
+            <a:extLst>
+              <a:ext uri="{FF2B5EF4-FFF2-40B4-BE49-F238E27FC236}">
+                <a16:creationId xmlns:a16="http://schemas.microsoft.com/office/drawing/2014/main" id="{727F0BE9-AE83-C84C-8BF8-9B50C3B21B08}"/>
+              </a:ext>
+            </a:extLst>
+          </p:cNvPr>
+          <p:cNvSpPr/>
+          <p:nvPr/>
+        </p:nvSpPr>
+        <p:spPr>
+          <a:xfrm>
+            <a:off x="6199662" y="5199174"/>
+            <a:ext cx="964626" cy="462074"/>
+          </a:xfrm>
+          <a:prstGeom prst="can">
+            <a:avLst/>
+          </a:prstGeom>
+          <a:solidFill>
+            <a:schemeClr val="accent1">
+              <a:lumMod val="20000"/>
+              <a:lumOff val="80000"/>
+            </a:schemeClr>
+          </a:solidFill>
+          <a:ln>
+            <a:solidFill>
+              <a:schemeClr val="tx1">
+                <a:lumMod val="75000"/>
+                <a:lumOff val="25000"/>
+              </a:schemeClr>
+            </a:solidFill>
+          </a:ln>
+        </p:spPr>
+        <p:style>
+          <a:lnRef idx="2">
+            <a:schemeClr val="accent1">
+              <a:shade val="50000"/>
+            </a:schemeClr>
+          </a:lnRef>
+          <a:fillRef idx="1">
+            <a:schemeClr val="accent1"/>
+          </a:fillRef>
+          <a:effectRef idx="0">
+            <a:schemeClr val="accent1"/>
+          </a:effectRef>
+          <a:fontRef idx="minor">
+            <a:schemeClr val="lt1"/>
+          </a:fontRef>
+        </p:style>
+        <p:txBody>
+          <a:bodyPr wrap="none" lIns="36000" tIns="36000" rIns="36000" bIns="36000" rtlCol="0" anchor="ctr"/>
+          <a:lstStyle/>
+          <a:p>
+            <a:pPr algn="ctr"/>
+            <a:r>
+              <a:rPr kumimoji="1" lang="en-US" altLang="ja-JP" sz="1200" dirty="0">
+                <a:solidFill>
+                  <a:schemeClr val="tx1">
+                    <a:lumMod val="75000"/>
+                    <a:lumOff val="25000"/>
+                  </a:schemeClr>
+                </a:solidFill>
+              </a:rPr>
+              <a:t>Scraped </a:t>
+            </a:r>
+            <a:r>
+              <a:rPr lang="en-US" altLang="ja-JP" sz="1200" dirty="0">
+                <a:solidFill>
+                  <a:schemeClr val="tx1">
+                    <a:lumMod val="75000"/>
+                    <a:lumOff val="25000"/>
+                  </a:schemeClr>
+                </a:solidFill>
+              </a:rPr>
+              <a:t>Codes</a:t>
+            </a:r>
+            <a:endParaRPr kumimoji="1" lang="ja-JP" altLang="en-US" sz="1200">
+              <a:solidFill>
+                <a:schemeClr val="tx1">
+                  <a:lumMod val="75000"/>
+                  <a:lumOff val="25000"/>
+                </a:schemeClr>
+              </a:solidFill>
+            </a:endParaRPr>
+          </a:p>
+        </p:txBody>
+      </p:sp>
+      <p:sp>
+        <p:nvSpPr>
+          <p:cNvPr id="55" name="正方形/長方形 54">
+            <a:extLst>
+              <a:ext uri="{FF2B5EF4-FFF2-40B4-BE49-F238E27FC236}">
+                <a16:creationId xmlns:a16="http://schemas.microsoft.com/office/drawing/2014/main" id="{09310345-C4A7-984C-A95C-F67293E15621}"/>
+              </a:ext>
+            </a:extLst>
+          </p:cNvPr>
+          <p:cNvSpPr/>
+          <p:nvPr/>
+        </p:nvSpPr>
+        <p:spPr>
+          <a:xfrm>
+            <a:off x="6812342" y="1742790"/>
+            <a:ext cx="1605923" cy="720080"/>
+          </a:xfrm>
+          <a:prstGeom prst="rect">
+            <a:avLst/>
+          </a:prstGeom>
+          <a:solidFill>
+            <a:schemeClr val="accent1">
+              <a:lumMod val="20000"/>
+              <a:lumOff val="80000"/>
+            </a:schemeClr>
+          </a:solidFill>
+          <a:ln>
+            <a:solidFill>
+              <a:schemeClr val="tx1">
+                <a:lumMod val="75000"/>
+                <a:lumOff val="25000"/>
+              </a:schemeClr>
+            </a:solidFill>
+          </a:ln>
+        </p:spPr>
+        <p:style>
+          <a:lnRef idx="2">
+            <a:schemeClr val="accent1">
+              <a:shade val="50000"/>
+            </a:schemeClr>
+          </a:lnRef>
+          <a:fillRef idx="1">
+            <a:schemeClr val="accent1"/>
+          </a:fillRef>
+          <a:effectRef idx="0">
+            <a:schemeClr val="accent1"/>
+          </a:effectRef>
+          <a:fontRef idx="minor">
+            <a:schemeClr val="lt1"/>
+          </a:fontRef>
+        </p:style>
+        <p:txBody>
+          <a:bodyPr wrap="none" lIns="36000" tIns="36000" rIns="36000" bIns="36000" rtlCol="0" anchor="ctr"/>
+          <a:lstStyle/>
+          <a:p>
+            <a:pPr algn="ctr"/>
+            <a:r>
+              <a:rPr kumimoji="1" lang="en-US" altLang="ja-JP" sz="1200" dirty="0">
+                <a:solidFill>
+                  <a:schemeClr val="tx1">
+                    <a:lumMod val="75000"/>
+                    <a:lumOff val="25000"/>
+                  </a:schemeClr>
+                </a:solidFill>
+              </a:rPr>
+              <a:t>Diff </a:t>
+            </a:r>
+            <a:r>
+              <a:rPr lang="en-US" altLang="ja-JP" sz="1200" dirty="0">
+                <a:solidFill>
+                  <a:schemeClr val="tx1">
+                    <a:lumMod val="75000"/>
+                    <a:lumOff val="25000"/>
+                  </a:schemeClr>
+                </a:solidFill>
+              </a:rPr>
+              <a:t>c</a:t>
+            </a:r>
+            <a:r>
+              <a:rPr kumimoji="1" lang="en-US" altLang="ja-JP" sz="1200" dirty="0">
+                <a:solidFill>
+                  <a:schemeClr val="tx1">
+                    <a:lumMod val="75000"/>
+                    <a:lumOff val="25000"/>
+                  </a:schemeClr>
+                </a:solidFill>
+              </a:rPr>
+              <a:t>odes</a:t>
+            </a:r>
+            <a:endParaRPr kumimoji="1" lang="ja-JP" altLang="en-US" sz="1200">
+              <a:solidFill>
+                <a:schemeClr val="tx1">
+                  <a:lumMod val="75000"/>
+                  <a:lumOff val="25000"/>
+                </a:schemeClr>
+              </a:solidFill>
+            </a:endParaRPr>
+          </a:p>
+        </p:txBody>
+      </p:sp>
+      <p:cxnSp>
+        <p:nvCxnSpPr>
+          <p:cNvPr id="56" name="直線矢印コネクタ 55">
+            <a:extLst>
+              <a:ext uri="{FF2B5EF4-FFF2-40B4-BE49-F238E27FC236}">
+                <a16:creationId xmlns:a16="http://schemas.microsoft.com/office/drawing/2014/main" id="{400148B8-2A31-E341-A3E4-37E535271E8B}"/>
+              </a:ext>
+            </a:extLst>
+          </p:cNvPr>
+          <p:cNvCxnSpPr>
+            <a:cxnSpLocks/>
+            <a:stCxn id="33" idx="3"/>
+            <a:endCxn id="55" idx="1"/>
+          </p:cNvCxnSpPr>
+          <p:nvPr/>
+        </p:nvCxnSpPr>
+        <p:spPr>
+          <a:xfrm>
+            <a:off x="6452301" y="2102830"/>
+            <a:ext cx="360041" cy="0"/>
+          </a:xfrm>
+          <a:prstGeom prst="straightConnector1">
+            <a:avLst/>
+          </a:prstGeom>
+          <a:ln>
+            <a:solidFill>
+              <a:schemeClr val="tx1">
+                <a:lumMod val="75000"/>
+                <a:lumOff val="25000"/>
+              </a:schemeClr>
+            </a:solidFill>
+            <a:tailEnd type="arrow"/>
+          </a:ln>
+        </p:spPr>
+        <p:style>
+          <a:lnRef idx="1">
+            <a:schemeClr val="accent1"/>
+          </a:lnRef>
+          <a:fillRef idx="0">
+            <a:schemeClr val="accent1"/>
+          </a:fillRef>
+          <a:effectRef idx="0">
+            <a:schemeClr val="accent1"/>
+          </a:effectRef>
+          <a:fontRef idx="minor">
+            <a:schemeClr val="tx1"/>
+          </a:fontRef>
+        </p:style>
+      </p:cxnSp>
+      <p:cxnSp>
+        <p:nvCxnSpPr>
+          <p:cNvPr id="63" name="直線矢印コネクタ 62">
+            <a:extLst>
+              <a:ext uri="{FF2B5EF4-FFF2-40B4-BE49-F238E27FC236}">
+                <a16:creationId xmlns:a16="http://schemas.microsoft.com/office/drawing/2014/main" id="{54F0449C-EB2D-1D47-955A-5370734E85EB}"/>
+              </a:ext>
+            </a:extLst>
+          </p:cNvPr>
+          <p:cNvCxnSpPr>
+            <a:cxnSpLocks/>
+          </p:cNvCxnSpPr>
+          <p:nvPr/>
+        </p:nvCxnSpPr>
+        <p:spPr>
+          <a:xfrm>
+            <a:off x="6330570" y="2462870"/>
+            <a:ext cx="0" cy="2725743"/>
+          </a:xfrm>
+          <a:prstGeom prst="straightConnector1">
+            <a:avLst/>
+          </a:prstGeom>
+          <a:ln>
+            <a:solidFill>
+              <a:schemeClr val="tx1">
+                <a:lumMod val="75000"/>
+                <a:lumOff val="25000"/>
+              </a:schemeClr>
+            </a:solidFill>
+            <a:tailEnd type="arrow"/>
+          </a:ln>
+        </p:spPr>
+        <p:style>
+          <a:lnRef idx="1">
+            <a:schemeClr val="accent1"/>
+          </a:lnRef>
+          <a:fillRef idx="0">
+            <a:schemeClr val="accent1"/>
+          </a:fillRef>
+          <a:effectRef idx="0">
+            <a:schemeClr val="accent1"/>
+          </a:effectRef>
+          <a:fontRef idx="minor">
+            <a:schemeClr val="tx1"/>
+          </a:fontRef>
+        </p:style>
+      </p:cxnSp>
+      <p:sp>
+        <p:nvSpPr>
+          <p:cNvPr id="66" name="テキスト ボックス 65">
+            <a:extLst>
+              <a:ext uri="{FF2B5EF4-FFF2-40B4-BE49-F238E27FC236}">
+                <a16:creationId xmlns:a16="http://schemas.microsoft.com/office/drawing/2014/main" id="{C7C969D1-620A-EB45-9B7A-92E8FF537916}"/>
+              </a:ext>
+            </a:extLst>
+          </p:cNvPr>
+          <p:cNvSpPr txBox="1"/>
+          <p:nvPr/>
+        </p:nvSpPr>
+        <p:spPr>
+          <a:xfrm>
+            <a:off x="6444208" y="2588269"/>
+            <a:ext cx="432048" cy="216024"/>
+          </a:xfrm>
+          <a:prstGeom prst="rect">
+            <a:avLst/>
+          </a:prstGeom>
+          <a:noFill/>
+        </p:spPr>
+        <p:txBody>
+          <a:bodyPr wrap="none" rtlCol="0" anchor="ctr">
+            <a:noAutofit/>
+          </a:bodyPr>
+          <a:lstStyle/>
+          <a:p>
+            <a:pPr algn="ctr"/>
+            <a:r>
+              <a:rPr kumimoji="1" lang="en-US" altLang="ja-JP" sz="1200" dirty="0"/>
+              <a:t>Scraped</a:t>
+            </a:r>
+          </a:p>
+          <a:p>
+            <a:pPr algn="ctr"/>
+            <a:r>
+              <a:rPr lang="en-US" altLang="ja-JP" sz="1200" dirty="0"/>
+              <a:t>code</a:t>
+            </a:r>
+            <a:endParaRPr kumimoji="1" lang="ja-JP" altLang="en-US" sz="1200"/>
+          </a:p>
+        </p:txBody>
+      </p:sp>
+      <p:sp>
+        <p:nvSpPr>
+          <p:cNvPr id="67" name="ホームベース 66">
+            <a:extLst>
+              <a:ext uri="{FF2B5EF4-FFF2-40B4-BE49-F238E27FC236}">
+                <a16:creationId xmlns:a16="http://schemas.microsoft.com/office/drawing/2014/main" id="{4F929955-7D45-C644-856B-F576C0487191}"/>
+              </a:ext>
+            </a:extLst>
+          </p:cNvPr>
+          <p:cNvSpPr/>
+          <p:nvPr/>
+        </p:nvSpPr>
+        <p:spPr>
+          <a:xfrm>
+            <a:off x="6372200" y="692696"/>
+            <a:ext cx="2448272" cy="504056"/>
+          </a:xfrm>
+          <a:prstGeom prst="homePlate">
+            <a:avLst/>
+          </a:prstGeom>
+          <a:solidFill>
+            <a:schemeClr val="accent1"/>
+          </a:solidFill>
+          <a:ln>
+            <a:solidFill>
+              <a:schemeClr val="tx1">
+                <a:lumMod val="75000"/>
+                <a:lumOff val="25000"/>
+              </a:schemeClr>
+            </a:solidFill>
+          </a:ln>
+        </p:spPr>
+        <p:style>
+          <a:lnRef idx="2">
+            <a:schemeClr val="accent1">
+              <a:shade val="50000"/>
+            </a:schemeClr>
+          </a:lnRef>
+          <a:fillRef idx="1">
+            <a:schemeClr val="accent1"/>
+          </a:fillRef>
+          <a:effectRef idx="0">
+            <a:schemeClr val="accent1"/>
+          </a:effectRef>
+          <a:fontRef idx="minor">
+            <a:schemeClr val="lt1"/>
+          </a:fontRef>
+        </p:style>
+        <p:txBody>
+          <a:bodyPr rot="0" spcFirstLastPara="0" vertOverflow="overflow" horzOverflow="overflow" vert="horz" wrap="none" lIns="36000" tIns="36000" rIns="36000" bIns="36000" numCol="1" spcCol="0" rtlCol="0" fromWordArt="0" anchor="ctr" anchorCtr="0" forceAA="0" compatLnSpc="1">
+            <a:prstTxWarp prst="textNoShape">
+              <a:avLst/>
+            </a:prstTxWarp>
+            <a:noAutofit/>
+          </a:bodyPr>
+          <a:lstStyle/>
+          <a:p>
+            <a:pPr algn="ctr"/>
+            <a:r>
+              <a:rPr kumimoji="1" lang="en-US" altLang="ja-JP" sz="1400" dirty="0">
+                <a:solidFill>
+                  <a:schemeClr val="bg1"/>
+                </a:solidFill>
+              </a:rPr>
+              <a:t>Scraping Code</a:t>
+            </a:r>
+            <a:endParaRPr kumimoji="1" lang="ja-JP" altLang="en-US" sz="1400">
+              <a:solidFill>
+                <a:schemeClr val="bg1"/>
+              </a:solidFill>
+            </a:endParaRPr>
+          </a:p>
+        </p:txBody>
+      </p:sp>
+      <p:cxnSp>
+        <p:nvCxnSpPr>
+          <p:cNvPr id="72" name="直線矢印コネクタ 71">
+            <a:extLst>
+              <a:ext uri="{FF2B5EF4-FFF2-40B4-BE49-F238E27FC236}">
+                <a16:creationId xmlns:a16="http://schemas.microsoft.com/office/drawing/2014/main" id="{E36CBB4E-B725-B344-BE79-462B2898C57C}"/>
+              </a:ext>
+            </a:extLst>
+          </p:cNvPr>
+          <p:cNvCxnSpPr>
+            <a:cxnSpLocks/>
+          </p:cNvCxnSpPr>
+          <p:nvPr/>
+        </p:nvCxnSpPr>
+        <p:spPr>
+          <a:xfrm flipV="1">
+            <a:off x="7055163" y="2462870"/>
+            <a:ext cx="0" cy="2725743"/>
+          </a:xfrm>
+          <a:prstGeom prst="straightConnector1">
+            <a:avLst/>
+          </a:prstGeom>
+          <a:ln>
+            <a:solidFill>
+              <a:schemeClr val="tx1">
+                <a:lumMod val="75000"/>
+                <a:lumOff val="25000"/>
+              </a:schemeClr>
+            </a:solidFill>
+            <a:tailEnd type="arrow"/>
+          </a:ln>
+        </p:spPr>
+        <p:style>
+          <a:lnRef idx="1">
+            <a:schemeClr val="accent1"/>
+          </a:lnRef>
+          <a:fillRef idx="0">
+            <a:schemeClr val="accent1"/>
+          </a:fillRef>
+          <a:effectRef idx="0">
+            <a:schemeClr val="accent1"/>
+          </a:effectRef>
+          <a:fontRef idx="minor">
+            <a:schemeClr val="tx1"/>
+          </a:fontRef>
+        </p:style>
+      </p:cxnSp>
+      <p:sp>
+        <p:nvSpPr>
+          <p:cNvPr id="73" name="テキスト ボックス 72">
+            <a:extLst>
+              <a:ext uri="{FF2B5EF4-FFF2-40B4-BE49-F238E27FC236}">
+                <a16:creationId xmlns:a16="http://schemas.microsoft.com/office/drawing/2014/main" id="{94B924F7-498A-EE4D-BC6E-0D5BAC48007E}"/>
+              </a:ext>
+            </a:extLst>
+          </p:cNvPr>
+          <p:cNvSpPr txBox="1"/>
+          <p:nvPr/>
+        </p:nvSpPr>
+        <p:spPr>
+          <a:xfrm>
+            <a:off x="6991750" y="4751350"/>
+            <a:ext cx="892618" cy="437263"/>
+          </a:xfrm>
+          <a:prstGeom prst="rect">
+            <a:avLst/>
+          </a:prstGeom>
+          <a:noFill/>
+        </p:spPr>
+        <p:txBody>
+          <a:bodyPr wrap="none" rtlCol="0" anchor="ctr">
+            <a:noAutofit/>
+          </a:bodyPr>
+          <a:lstStyle/>
+          <a:p>
+            <a:pPr algn="ctr"/>
+            <a:r>
+              <a:rPr kumimoji="1" lang="en-US" altLang="ja-JP" sz="1200" dirty="0"/>
+              <a:t>Latest </a:t>
+            </a:r>
+            <a:r>
+              <a:rPr lang="en-US" altLang="ja-JP" sz="1200" dirty="0"/>
+              <a:t>and</a:t>
+            </a:r>
+          </a:p>
+          <a:p>
+            <a:pPr algn="ctr"/>
+            <a:r>
+              <a:rPr lang="en-US" altLang="ja-JP" sz="1200" dirty="0"/>
+              <a:t>p</a:t>
+            </a:r>
+            <a:r>
+              <a:rPr kumimoji="1" lang="en-US" altLang="ja-JP" sz="1200" dirty="0"/>
+              <a:t>ast codes</a:t>
+            </a:r>
+            <a:endParaRPr kumimoji="1" lang="ja-JP" altLang="en-US" sz="1200"/>
+          </a:p>
+        </p:txBody>
+      </p:sp>
+      <p:cxnSp>
+        <p:nvCxnSpPr>
+          <p:cNvPr id="75" name="直線矢印コネクタ 74">
+            <a:extLst>
+              <a:ext uri="{FF2B5EF4-FFF2-40B4-BE49-F238E27FC236}">
+                <a16:creationId xmlns:a16="http://schemas.microsoft.com/office/drawing/2014/main" id="{3F52B983-99B0-A94E-9721-FB113A366659}"/>
+              </a:ext>
+            </a:extLst>
+          </p:cNvPr>
+          <p:cNvCxnSpPr>
+            <a:cxnSpLocks/>
+          </p:cNvCxnSpPr>
+          <p:nvPr/>
+        </p:nvCxnSpPr>
+        <p:spPr>
+          <a:xfrm flipV="1">
+            <a:off x="4932040" y="2462870"/>
+            <a:ext cx="0" cy="864096"/>
+          </a:xfrm>
+          <a:prstGeom prst="straightConnector1">
+            <a:avLst/>
+          </a:prstGeom>
+          <a:ln>
+            <a:solidFill>
+              <a:schemeClr val="tx1">
+                <a:lumMod val="75000"/>
+                <a:lumOff val="25000"/>
+              </a:schemeClr>
+            </a:solidFill>
+            <a:tailEnd type="arrow"/>
+          </a:ln>
+        </p:spPr>
+        <p:style>
+          <a:lnRef idx="1">
+            <a:schemeClr val="accent1"/>
+          </a:lnRef>
+          <a:fillRef idx="0">
+            <a:schemeClr val="accent1"/>
+          </a:fillRef>
+          <a:effectRef idx="0">
+            <a:schemeClr val="accent1"/>
+          </a:effectRef>
+          <a:fontRef idx="minor">
+            <a:schemeClr val="tx1"/>
+          </a:fontRef>
+        </p:style>
+      </p:cxnSp>
+      <p:sp>
+        <p:nvSpPr>
+          <p:cNvPr id="77" name="テキスト ボックス 76">
+            <a:extLst>
+              <a:ext uri="{FF2B5EF4-FFF2-40B4-BE49-F238E27FC236}">
+                <a16:creationId xmlns:a16="http://schemas.microsoft.com/office/drawing/2014/main" id="{D0B3E8F3-3B9C-5446-8BE5-55A52E689323}"/>
+              </a:ext>
+            </a:extLst>
+          </p:cNvPr>
+          <p:cNvSpPr txBox="1"/>
+          <p:nvPr/>
+        </p:nvSpPr>
+        <p:spPr>
+          <a:xfrm>
+            <a:off x="4932040" y="3068960"/>
+            <a:ext cx="432048" cy="216024"/>
+          </a:xfrm>
+          <a:prstGeom prst="rect">
+            <a:avLst/>
+          </a:prstGeom>
+          <a:noFill/>
+        </p:spPr>
+        <p:txBody>
+          <a:bodyPr wrap="none" rtlCol="0" anchor="ctr">
+            <a:noAutofit/>
+          </a:bodyPr>
+          <a:lstStyle/>
+          <a:p>
+            <a:pPr algn="ctr"/>
+            <a:r>
+              <a:rPr kumimoji="1" lang="en-US" altLang="ja-JP" sz="1200" dirty="0"/>
+              <a:t>HTML</a:t>
+            </a:r>
+            <a:endParaRPr kumimoji="1" lang="ja-JP" altLang="en-US" sz="1200"/>
+          </a:p>
+        </p:txBody>
+      </p:sp>
+      <p:sp>
+        <p:nvSpPr>
+          <p:cNvPr id="78" name="円柱 77">
+            <a:extLst>
+              <a:ext uri="{FF2B5EF4-FFF2-40B4-BE49-F238E27FC236}">
+                <a16:creationId xmlns:a16="http://schemas.microsoft.com/office/drawing/2014/main" id="{7128EA47-8A3C-B646-8D93-A72C9406E8A9}"/>
+              </a:ext>
+            </a:extLst>
+          </p:cNvPr>
+          <p:cNvSpPr/>
+          <p:nvPr/>
+        </p:nvSpPr>
+        <p:spPr>
+          <a:xfrm>
+            <a:off x="7452320" y="5199174"/>
+            <a:ext cx="1026985" cy="462074"/>
+          </a:xfrm>
+          <a:prstGeom prst="can">
+            <a:avLst/>
+          </a:prstGeom>
+          <a:solidFill>
+            <a:schemeClr val="accent1">
+              <a:lumMod val="20000"/>
+              <a:lumOff val="80000"/>
+            </a:schemeClr>
+          </a:solidFill>
+          <a:ln>
+            <a:solidFill>
+              <a:schemeClr val="tx1">
+                <a:lumMod val="75000"/>
+                <a:lumOff val="25000"/>
+              </a:schemeClr>
+            </a:solidFill>
+          </a:ln>
+        </p:spPr>
+        <p:style>
+          <a:lnRef idx="2">
+            <a:schemeClr val="accent1">
+              <a:shade val="50000"/>
+            </a:schemeClr>
+          </a:lnRef>
+          <a:fillRef idx="1">
+            <a:schemeClr val="accent1"/>
+          </a:fillRef>
+          <a:effectRef idx="0">
+            <a:schemeClr val="accent1"/>
+          </a:effectRef>
+          <a:fontRef idx="minor">
+            <a:schemeClr val="lt1"/>
+          </a:fontRef>
+        </p:style>
+        <p:txBody>
+          <a:bodyPr wrap="none" lIns="36000" tIns="36000" rIns="36000" bIns="36000" rtlCol="0" anchor="ctr"/>
+          <a:lstStyle/>
+          <a:p>
+            <a:pPr algn="ctr"/>
+            <a:r>
+              <a:rPr kumimoji="1" lang="en-US" altLang="ja-JP" sz="1200" dirty="0">
+                <a:solidFill>
+                  <a:schemeClr val="tx1">
+                    <a:lumMod val="75000"/>
+                    <a:lumOff val="25000"/>
+                  </a:schemeClr>
+                </a:solidFill>
+              </a:rPr>
+              <a:t>Diff Codes</a:t>
+            </a:r>
+            <a:endParaRPr kumimoji="1" lang="ja-JP" altLang="en-US" sz="1200">
+              <a:solidFill>
+                <a:schemeClr val="tx1">
+                  <a:lumMod val="75000"/>
+                  <a:lumOff val="25000"/>
+                </a:schemeClr>
+              </a:solidFill>
+            </a:endParaRPr>
+          </a:p>
+        </p:txBody>
+      </p:sp>
+      <p:cxnSp>
+        <p:nvCxnSpPr>
+          <p:cNvPr id="80" name="直線矢印コネクタ 79">
+            <a:extLst>
+              <a:ext uri="{FF2B5EF4-FFF2-40B4-BE49-F238E27FC236}">
+                <a16:creationId xmlns:a16="http://schemas.microsoft.com/office/drawing/2014/main" id="{B099A13C-F990-8345-A033-49F17B4F15CB}"/>
+              </a:ext>
+            </a:extLst>
+          </p:cNvPr>
+          <p:cNvCxnSpPr>
+            <a:cxnSpLocks/>
+          </p:cNvCxnSpPr>
+          <p:nvPr/>
+        </p:nvCxnSpPr>
+        <p:spPr>
+          <a:xfrm>
+            <a:off x="7938873" y="2462870"/>
+            <a:ext cx="0" cy="2725743"/>
+          </a:xfrm>
+          <a:prstGeom prst="straightConnector1">
+            <a:avLst/>
+          </a:prstGeom>
+          <a:ln>
+            <a:solidFill>
+              <a:schemeClr val="tx1">
+                <a:lumMod val="75000"/>
+                <a:lumOff val="25000"/>
+              </a:schemeClr>
+            </a:solidFill>
+            <a:tailEnd type="arrow"/>
+          </a:ln>
+        </p:spPr>
+        <p:style>
+          <a:lnRef idx="1">
+            <a:schemeClr val="accent1"/>
+          </a:lnRef>
+          <a:fillRef idx="0">
+            <a:schemeClr val="accent1"/>
+          </a:fillRef>
+          <a:effectRef idx="0">
+            <a:schemeClr val="accent1"/>
+          </a:effectRef>
+          <a:fontRef idx="minor">
+            <a:schemeClr val="tx1"/>
+          </a:fontRef>
+        </p:style>
+      </p:cxnSp>
+      <p:sp>
+        <p:nvSpPr>
+          <p:cNvPr id="81" name="テキスト ボックス 80">
+            <a:extLst>
+              <a:ext uri="{FF2B5EF4-FFF2-40B4-BE49-F238E27FC236}">
+                <a16:creationId xmlns:a16="http://schemas.microsoft.com/office/drawing/2014/main" id="{6FFF4812-FC54-7843-8EA9-2142060416D1}"/>
+              </a:ext>
+            </a:extLst>
+          </p:cNvPr>
+          <p:cNvSpPr txBox="1"/>
+          <p:nvPr/>
+        </p:nvSpPr>
+        <p:spPr>
+          <a:xfrm>
+            <a:off x="8089422" y="2588269"/>
+            <a:ext cx="432048" cy="216024"/>
+          </a:xfrm>
+          <a:prstGeom prst="rect">
+            <a:avLst/>
+          </a:prstGeom>
+          <a:noFill/>
+        </p:spPr>
+        <p:txBody>
+          <a:bodyPr wrap="none" rtlCol="0" anchor="ctr">
+            <a:noAutofit/>
+          </a:bodyPr>
+          <a:lstStyle/>
+          <a:p>
+            <a:pPr algn="ctr"/>
+            <a:r>
+              <a:rPr kumimoji="1" lang="en-US" altLang="ja-JP" sz="1200" dirty="0"/>
+              <a:t>Diff result</a:t>
+            </a:r>
+            <a:endParaRPr kumimoji="1" lang="ja-JP" altLang="en-US" sz="1200"/>
+          </a:p>
+        </p:txBody>
+      </p:sp>
+      <p:sp>
+        <p:nvSpPr>
+          <p:cNvPr id="29" name="ホームベース 28">
+            <a:extLst>
+              <a:ext uri="{FF2B5EF4-FFF2-40B4-BE49-F238E27FC236}">
+                <a16:creationId xmlns:a16="http://schemas.microsoft.com/office/drawing/2014/main" id="{EF78C011-98E3-D04D-AA1C-275B3625A0A7}"/>
+              </a:ext>
+            </a:extLst>
+          </p:cNvPr>
+          <p:cNvSpPr/>
+          <p:nvPr/>
+        </p:nvSpPr>
+        <p:spPr>
+          <a:xfrm>
+            <a:off x="3347863" y="692696"/>
+            <a:ext cx="3354189" cy="504056"/>
+          </a:xfrm>
+          <a:prstGeom prst="homePlate">
+            <a:avLst/>
+          </a:prstGeom>
+          <a:solidFill>
+            <a:schemeClr val="accent1"/>
+          </a:solidFill>
+          <a:ln>
+            <a:solidFill>
+              <a:schemeClr val="tx1">
+                <a:lumMod val="75000"/>
+                <a:lumOff val="25000"/>
+              </a:schemeClr>
+            </a:solidFill>
+          </a:ln>
+        </p:spPr>
+        <p:style>
+          <a:lnRef idx="2">
+            <a:schemeClr val="accent1">
+              <a:shade val="50000"/>
+            </a:schemeClr>
+          </a:lnRef>
+          <a:fillRef idx="1">
+            <a:schemeClr val="accent1"/>
+          </a:fillRef>
+          <a:effectRef idx="0">
+            <a:schemeClr val="accent1"/>
+          </a:effectRef>
+          <a:fontRef idx="minor">
+            <a:schemeClr val="lt1"/>
+          </a:fontRef>
+        </p:style>
+        <p:txBody>
+          <a:bodyPr rot="0" spcFirstLastPara="0" vertOverflow="overflow" horzOverflow="overflow" vert="horz" wrap="none" lIns="36000" tIns="36000" rIns="36000" bIns="36000" numCol="1" spcCol="0" rtlCol="0" fromWordArt="0" anchor="ctr" anchorCtr="0" forceAA="0" compatLnSpc="1">
+            <a:prstTxWarp prst="textNoShape">
+              <a:avLst/>
+            </a:prstTxWarp>
+            <a:noAutofit/>
+          </a:bodyPr>
+          <a:lstStyle/>
+          <a:p>
+            <a:pPr algn="ctr"/>
+            <a:r>
+              <a:rPr kumimoji="1" lang="en-US" altLang="ja-JP" sz="1400" dirty="0">
+                <a:solidFill>
+                  <a:schemeClr val="bg1"/>
+                </a:solidFill>
+              </a:rPr>
+              <a:t>Scraping Code</a:t>
+            </a:r>
+            <a:endParaRPr kumimoji="1" lang="ja-JP" altLang="en-US" sz="1400">
+              <a:solidFill>
+                <a:schemeClr val="bg1"/>
+              </a:solidFill>
+            </a:endParaRPr>
+          </a:p>
+        </p:txBody>
+      </p:sp>
+      <p:sp>
+        <p:nvSpPr>
+          <p:cNvPr id="28" name="ホームベース 27">
+            <a:extLst>
+              <a:ext uri="{FF2B5EF4-FFF2-40B4-BE49-F238E27FC236}">
+                <a16:creationId xmlns:a16="http://schemas.microsoft.com/office/drawing/2014/main" id="{60E05DDE-99F7-974B-A871-BF758D8AE13D}"/>
+              </a:ext>
+            </a:extLst>
+          </p:cNvPr>
+          <p:cNvSpPr/>
+          <p:nvPr/>
+        </p:nvSpPr>
+        <p:spPr>
+          <a:xfrm>
+            <a:off x="1170534" y="692696"/>
+            <a:ext cx="2448272" cy="504056"/>
+          </a:xfrm>
+          <a:prstGeom prst="homePlate">
+            <a:avLst/>
+          </a:prstGeom>
+          <a:solidFill>
+            <a:schemeClr val="accent1"/>
+          </a:solidFill>
+          <a:ln>
+            <a:solidFill>
+              <a:schemeClr val="tx1">
+                <a:lumMod val="75000"/>
+                <a:lumOff val="25000"/>
+              </a:schemeClr>
+            </a:solidFill>
+          </a:ln>
+        </p:spPr>
+        <p:style>
+          <a:lnRef idx="2">
+            <a:schemeClr val="accent1">
+              <a:shade val="50000"/>
+            </a:schemeClr>
+          </a:lnRef>
+          <a:fillRef idx="1">
+            <a:schemeClr val="accent1"/>
+          </a:fillRef>
+          <a:effectRef idx="0">
+            <a:schemeClr val="accent1"/>
+          </a:effectRef>
+          <a:fontRef idx="minor">
+            <a:schemeClr val="lt1"/>
+          </a:fontRef>
+        </p:style>
+        <p:txBody>
+          <a:bodyPr rot="0" spcFirstLastPara="0" vertOverflow="overflow" horzOverflow="overflow" vert="horz" wrap="none" lIns="36000" tIns="36000" rIns="36000" bIns="36000" numCol="1" spcCol="0" rtlCol="0" fromWordArt="0" anchor="ctr" anchorCtr="0" forceAA="0" compatLnSpc="1">
+            <a:prstTxWarp prst="textNoShape">
+              <a:avLst/>
+            </a:prstTxWarp>
+            <a:noAutofit/>
+          </a:bodyPr>
+          <a:lstStyle/>
+          <a:p>
+            <a:pPr algn="ctr"/>
+            <a:r>
+              <a:rPr kumimoji="1" lang="en-US" altLang="ja-JP" sz="1400" dirty="0">
+                <a:solidFill>
+                  <a:schemeClr val="bg1"/>
+                </a:solidFill>
+              </a:rPr>
+              <a:t>Add Site URL</a:t>
+            </a:r>
+            <a:endParaRPr kumimoji="1" lang="ja-JP" altLang="en-US" sz="1400">
+              <a:solidFill>
+                <a:schemeClr val="bg1"/>
+              </a:solidFill>
+            </a:endParaRPr>
+          </a:p>
+        </p:txBody>
+      </p:sp>
+      <p:sp>
+        <p:nvSpPr>
+          <p:cNvPr id="36" name="円柱 35">
+            <a:extLst>
+              <a:ext uri="{FF2B5EF4-FFF2-40B4-BE49-F238E27FC236}">
+                <a16:creationId xmlns:a16="http://schemas.microsoft.com/office/drawing/2014/main" id="{D2470320-0AB3-3342-9B80-F5B8A3FA42D2}"/>
+              </a:ext>
+            </a:extLst>
+          </p:cNvPr>
+          <p:cNvSpPr/>
+          <p:nvPr/>
+        </p:nvSpPr>
+        <p:spPr>
+          <a:xfrm>
+            <a:off x="3635896" y="5199174"/>
+            <a:ext cx="1876317" cy="462074"/>
+          </a:xfrm>
+          <a:prstGeom prst="can">
+            <a:avLst/>
+          </a:prstGeom>
+          <a:solidFill>
+            <a:schemeClr val="accent2"/>
+          </a:solidFill>
+          <a:ln>
+            <a:solidFill>
+              <a:schemeClr val="tx1">
+                <a:lumMod val="75000"/>
+                <a:lumOff val="25000"/>
+              </a:schemeClr>
+            </a:solidFill>
+          </a:ln>
+        </p:spPr>
+        <p:style>
+          <a:lnRef idx="2">
+            <a:schemeClr val="accent1">
+              <a:shade val="50000"/>
+            </a:schemeClr>
+          </a:lnRef>
+          <a:fillRef idx="1">
+            <a:schemeClr val="accent1"/>
+          </a:fillRef>
+          <a:effectRef idx="0">
+            <a:schemeClr val="accent1"/>
+          </a:effectRef>
+          <a:fontRef idx="minor">
+            <a:schemeClr val="lt1"/>
+          </a:fontRef>
+        </p:style>
+        <p:txBody>
+          <a:bodyPr wrap="none" lIns="36000" tIns="36000" rIns="36000" bIns="36000" rtlCol="0" anchor="ctr"/>
+          <a:lstStyle/>
+          <a:p>
+            <a:pPr algn="ctr"/>
+            <a:r>
+              <a:rPr kumimoji="1" lang="en-US" altLang="ja-JP" sz="1200" dirty="0">
+                <a:solidFill>
+                  <a:schemeClr val="tx1">
+                    <a:lumMod val="75000"/>
+                    <a:lumOff val="25000"/>
+                  </a:schemeClr>
+                </a:solidFill>
+              </a:rPr>
+              <a:t>Scraping </a:t>
+            </a:r>
+            <a:r>
+              <a:rPr lang="en-US" altLang="ja-JP" sz="1200" dirty="0">
+                <a:solidFill>
+                  <a:schemeClr val="tx1">
+                    <a:lumMod val="75000"/>
+                    <a:lumOff val="25000"/>
+                  </a:schemeClr>
+                </a:solidFill>
+              </a:rPr>
+              <a:t>Html</a:t>
+            </a:r>
+            <a:endParaRPr kumimoji="1" lang="en-US" altLang="ja-JP" sz="1200" dirty="0">
+              <a:solidFill>
+                <a:schemeClr val="tx1">
+                  <a:lumMod val="75000"/>
+                  <a:lumOff val="25000"/>
+                </a:schemeClr>
+              </a:solidFill>
+            </a:endParaRPr>
+          </a:p>
+          <a:p>
+            <a:pPr algn="ctr"/>
+            <a:r>
+              <a:rPr lang="en-US" altLang="ja-JP" sz="1200" dirty="0" err="1">
+                <a:solidFill>
+                  <a:schemeClr val="tx1">
+                    <a:lumMod val="75000"/>
+                    <a:lumOff val="25000"/>
+                  </a:schemeClr>
+                </a:solidFill>
+              </a:rPr>
+              <a:t>Eelemtns</a:t>
+            </a:r>
+            <a:endParaRPr kumimoji="1" lang="ja-JP" altLang="en-US" sz="1200">
+              <a:solidFill>
+                <a:schemeClr val="tx1">
+                  <a:lumMod val="75000"/>
+                  <a:lumOff val="25000"/>
+                </a:schemeClr>
+              </a:solidFill>
+            </a:endParaRPr>
+          </a:p>
+        </p:txBody>
+      </p:sp>
+      <p:cxnSp>
+        <p:nvCxnSpPr>
+          <p:cNvPr id="37" name="直線矢印コネクタ 36">
+            <a:extLst>
+              <a:ext uri="{FF2B5EF4-FFF2-40B4-BE49-F238E27FC236}">
+                <a16:creationId xmlns:a16="http://schemas.microsoft.com/office/drawing/2014/main" id="{140107FC-847C-EC43-81D9-AFB5FA6D9354}"/>
+              </a:ext>
+            </a:extLst>
+          </p:cNvPr>
+          <p:cNvCxnSpPr>
+            <a:cxnSpLocks/>
+          </p:cNvCxnSpPr>
+          <p:nvPr/>
+        </p:nvCxnSpPr>
+        <p:spPr>
+          <a:xfrm>
+            <a:off x="3995936" y="2462870"/>
+            <a:ext cx="0" cy="2725743"/>
+          </a:xfrm>
+          <a:prstGeom prst="straightConnector1">
+            <a:avLst/>
+          </a:prstGeom>
+          <a:ln>
+            <a:solidFill>
+              <a:schemeClr val="tx1">
+                <a:lumMod val="75000"/>
+                <a:lumOff val="25000"/>
+              </a:schemeClr>
+            </a:solidFill>
+            <a:tailEnd type="arrow"/>
+          </a:ln>
+        </p:spPr>
+        <p:style>
+          <a:lnRef idx="1">
+            <a:schemeClr val="accent1"/>
+          </a:lnRef>
+          <a:fillRef idx="0">
+            <a:schemeClr val="accent1"/>
+          </a:fillRef>
+          <a:effectRef idx="0">
+            <a:schemeClr val="accent1"/>
+          </a:effectRef>
+          <a:fontRef idx="minor">
+            <a:schemeClr val="tx1"/>
+          </a:fontRef>
+        </p:style>
+      </p:cxnSp>
+      <p:sp>
+        <p:nvSpPr>
+          <p:cNvPr id="38" name="テキスト ボックス 37">
+            <a:extLst>
+              <a:ext uri="{FF2B5EF4-FFF2-40B4-BE49-F238E27FC236}">
+                <a16:creationId xmlns:a16="http://schemas.microsoft.com/office/drawing/2014/main" id="{967B316D-C14E-0E4E-A94A-829B9A016FFB}"/>
+              </a:ext>
+            </a:extLst>
+          </p:cNvPr>
+          <p:cNvSpPr txBox="1"/>
+          <p:nvPr/>
+        </p:nvSpPr>
+        <p:spPr>
+          <a:xfrm>
+            <a:off x="4067944" y="2588269"/>
+            <a:ext cx="432048" cy="216024"/>
+          </a:xfrm>
+          <a:prstGeom prst="rect">
+            <a:avLst/>
+          </a:prstGeom>
+          <a:noFill/>
+        </p:spPr>
+        <p:txBody>
+          <a:bodyPr wrap="none" rtlCol="0" anchor="ctr">
+            <a:noAutofit/>
+          </a:bodyPr>
+          <a:lstStyle/>
+          <a:p>
+            <a:pPr algn="ctr"/>
+            <a:r>
+              <a:rPr lang="en-US" altLang="ja-JP" sz="1200" dirty="0"/>
+              <a:t>HTML</a:t>
+            </a:r>
+          </a:p>
+          <a:p>
+            <a:pPr algn="ctr"/>
+            <a:r>
+              <a:rPr lang="en-US" altLang="ja-JP" sz="1200" dirty="0" err="1"/>
+              <a:t>elemnt</a:t>
+            </a:r>
+            <a:endParaRPr lang="ja-JP" altLang="en-US" sz="1200"/>
+          </a:p>
+        </p:txBody>
+      </p:sp>
+      <p:cxnSp>
+        <p:nvCxnSpPr>
+          <p:cNvPr id="41" name="直線矢印コネクタ 40">
+            <a:extLst>
+              <a:ext uri="{FF2B5EF4-FFF2-40B4-BE49-F238E27FC236}">
+                <a16:creationId xmlns:a16="http://schemas.microsoft.com/office/drawing/2014/main" id="{2E7C8E65-A2FD-3F43-8000-C64F5488A38A}"/>
+              </a:ext>
+            </a:extLst>
+          </p:cNvPr>
+          <p:cNvCxnSpPr>
+            <a:cxnSpLocks/>
+          </p:cNvCxnSpPr>
+          <p:nvPr/>
+        </p:nvCxnSpPr>
+        <p:spPr>
+          <a:xfrm flipV="1">
+            <a:off x="5364088" y="2462870"/>
+            <a:ext cx="0" cy="2725743"/>
+          </a:xfrm>
+          <a:prstGeom prst="straightConnector1">
+            <a:avLst/>
+          </a:prstGeom>
+          <a:ln>
+            <a:solidFill>
+              <a:schemeClr val="tx1">
+                <a:lumMod val="75000"/>
+                <a:lumOff val="25000"/>
+              </a:schemeClr>
+            </a:solidFill>
+            <a:tailEnd type="arrow"/>
+          </a:ln>
+        </p:spPr>
+        <p:style>
+          <a:lnRef idx="1">
+            <a:schemeClr val="accent1"/>
+          </a:lnRef>
+          <a:fillRef idx="0">
+            <a:schemeClr val="accent1"/>
+          </a:fillRef>
+          <a:effectRef idx="0">
+            <a:schemeClr val="accent1"/>
+          </a:effectRef>
+          <a:fontRef idx="minor">
+            <a:schemeClr val="tx1"/>
+          </a:fontRef>
+        </p:style>
+      </p:cxnSp>
+      <p:sp>
+        <p:nvSpPr>
+          <p:cNvPr id="43" name="テキスト ボックス 42">
+            <a:extLst>
+              <a:ext uri="{FF2B5EF4-FFF2-40B4-BE49-F238E27FC236}">
+                <a16:creationId xmlns:a16="http://schemas.microsoft.com/office/drawing/2014/main" id="{54B1CB16-822A-6B4F-B9BF-CA1455E2648E}"/>
+              </a:ext>
+            </a:extLst>
+          </p:cNvPr>
+          <p:cNvSpPr txBox="1"/>
+          <p:nvPr/>
+        </p:nvSpPr>
+        <p:spPr>
+          <a:xfrm>
+            <a:off x="5436096" y="4869858"/>
+            <a:ext cx="432048" cy="216024"/>
+          </a:xfrm>
+          <a:prstGeom prst="rect">
+            <a:avLst/>
+          </a:prstGeom>
+          <a:noFill/>
+        </p:spPr>
+        <p:txBody>
+          <a:bodyPr wrap="none" rtlCol="0" anchor="ctr">
+            <a:noAutofit/>
+          </a:bodyPr>
+          <a:lstStyle/>
+          <a:p>
+            <a:pPr algn="ctr"/>
+            <a:r>
+              <a:rPr kumimoji="1" lang="en-US" altLang="ja-JP" sz="1200" dirty="0"/>
+              <a:t>HTML</a:t>
+            </a:r>
+          </a:p>
+          <a:p>
+            <a:pPr algn="ctr"/>
+            <a:r>
+              <a:rPr kumimoji="1" lang="en-US" altLang="ja-JP" sz="1200" dirty="0"/>
+              <a:t>element</a:t>
+            </a:r>
+            <a:endParaRPr kumimoji="1" lang="ja-JP" altLang="en-US" sz="1200"/>
+          </a:p>
+        </p:txBody>
+      </p:sp>
+      <p:sp>
+        <p:nvSpPr>
+          <p:cNvPr id="54" name="正方形/長方形 53">
+            <a:extLst>
+              <a:ext uri="{FF2B5EF4-FFF2-40B4-BE49-F238E27FC236}">
+                <a16:creationId xmlns:a16="http://schemas.microsoft.com/office/drawing/2014/main" id="{3267FD2C-0CA4-2743-9E7F-801635D5CC53}"/>
+              </a:ext>
+            </a:extLst>
+          </p:cNvPr>
+          <p:cNvSpPr/>
+          <p:nvPr/>
+        </p:nvSpPr>
+        <p:spPr>
+          <a:xfrm>
+            <a:off x="3635896" y="1742790"/>
+            <a:ext cx="752673" cy="720080"/>
+          </a:xfrm>
+          <a:prstGeom prst="rect">
+            <a:avLst/>
+          </a:prstGeom>
+          <a:solidFill>
+            <a:schemeClr val="accent2"/>
+          </a:solidFill>
+          <a:ln>
+            <a:solidFill>
+              <a:schemeClr val="tx1">
+                <a:lumMod val="75000"/>
+                <a:lumOff val="25000"/>
+              </a:schemeClr>
+            </a:solidFill>
+          </a:ln>
+        </p:spPr>
+        <p:style>
+          <a:lnRef idx="2">
+            <a:schemeClr val="accent1">
+              <a:shade val="50000"/>
+            </a:schemeClr>
+          </a:lnRef>
+          <a:fillRef idx="1">
+            <a:schemeClr val="accent1"/>
+          </a:fillRef>
+          <a:effectRef idx="0">
+            <a:schemeClr val="accent1"/>
+          </a:effectRef>
+          <a:fontRef idx="minor">
+            <a:schemeClr val="lt1"/>
+          </a:fontRef>
+        </p:style>
+        <p:txBody>
+          <a:bodyPr wrap="none" lIns="36000" tIns="36000" rIns="36000" bIns="36000" rtlCol="0" anchor="ctr"/>
+          <a:lstStyle/>
+          <a:p>
+            <a:pPr algn="ctr"/>
+            <a:r>
+              <a:rPr lang="en-US" altLang="ja-JP" sz="1200" dirty="0">
+                <a:solidFill>
+                  <a:schemeClr val="tx1">
+                    <a:lumMod val="75000"/>
+                    <a:lumOff val="25000"/>
+                  </a:schemeClr>
+                </a:solidFill>
+              </a:rPr>
+              <a:t>Add HTML</a:t>
+            </a:r>
+          </a:p>
+          <a:p>
+            <a:pPr algn="ctr"/>
+            <a:r>
+              <a:rPr lang="en-US" altLang="ja-JP" sz="1200" dirty="0">
+                <a:solidFill>
+                  <a:schemeClr val="tx1">
+                    <a:lumMod val="75000"/>
+                    <a:lumOff val="25000"/>
+                  </a:schemeClr>
+                </a:solidFill>
+              </a:rPr>
+              <a:t>element</a:t>
+            </a:r>
+          </a:p>
+        </p:txBody>
+      </p:sp>
+      <p:cxnSp>
+        <p:nvCxnSpPr>
+          <p:cNvPr id="57" name="直線矢印コネクタ 56">
+            <a:extLst>
+              <a:ext uri="{FF2B5EF4-FFF2-40B4-BE49-F238E27FC236}">
+                <a16:creationId xmlns:a16="http://schemas.microsoft.com/office/drawing/2014/main" id="{E391AAC4-5032-AF45-A4DC-C13C21E52F33}"/>
+              </a:ext>
+            </a:extLst>
+          </p:cNvPr>
+          <p:cNvCxnSpPr>
+            <a:cxnSpLocks/>
+            <a:stCxn id="54" idx="3"/>
+            <a:endCxn id="33" idx="1"/>
+          </p:cNvCxnSpPr>
+          <p:nvPr/>
+        </p:nvCxnSpPr>
+        <p:spPr>
+          <a:xfrm>
+            <a:off x="4388569" y="2102830"/>
+            <a:ext cx="362338" cy="0"/>
+          </a:xfrm>
+          <a:prstGeom prst="straightConnector1">
+            <a:avLst/>
+          </a:prstGeom>
+          <a:ln>
+            <a:solidFill>
+              <a:schemeClr val="tx1">
+                <a:lumMod val="75000"/>
+                <a:lumOff val="25000"/>
+              </a:schemeClr>
+            </a:solidFill>
+            <a:tailEnd type="arrow"/>
+          </a:ln>
+        </p:spPr>
+        <p:style>
+          <a:lnRef idx="1">
+            <a:schemeClr val="accent1"/>
+          </a:lnRef>
+          <a:fillRef idx="0">
+            <a:schemeClr val="accent1"/>
+          </a:fillRef>
+          <a:effectRef idx="0">
+            <a:schemeClr val="accent1"/>
+          </a:effectRef>
+          <a:fontRef idx="minor">
+            <a:schemeClr val="tx1"/>
+          </a:fontRef>
+        </p:style>
+      </p:cxnSp>
+      <p:sp>
+        <p:nvSpPr>
+          <p:cNvPr id="15" name="メモ 14">
+            <a:extLst>
+              <a:ext uri="{FF2B5EF4-FFF2-40B4-BE49-F238E27FC236}">
+                <a16:creationId xmlns:a16="http://schemas.microsoft.com/office/drawing/2014/main" id="{1BBBFB0E-6FF4-DB40-9827-75A19E286355}"/>
+              </a:ext>
+            </a:extLst>
+          </p:cNvPr>
+          <p:cNvSpPr/>
+          <p:nvPr/>
+        </p:nvSpPr>
+        <p:spPr>
+          <a:xfrm>
+            <a:off x="2980501" y="3326966"/>
+            <a:ext cx="2057181" cy="720080"/>
+          </a:xfrm>
+          <a:prstGeom prst="foldedCorner">
+            <a:avLst/>
+          </a:prstGeom>
+          <a:solidFill>
+            <a:schemeClr val="accent1">
+              <a:lumMod val="20000"/>
+              <a:lumOff val="80000"/>
+            </a:schemeClr>
+          </a:solidFill>
+          <a:ln>
+            <a:solidFill>
+              <a:schemeClr val="tx1">
+                <a:lumMod val="75000"/>
+                <a:lumOff val="25000"/>
+              </a:schemeClr>
+            </a:solidFill>
+          </a:ln>
+        </p:spPr>
+        <p:style>
+          <a:lnRef idx="2">
+            <a:schemeClr val="accent1">
+              <a:shade val="50000"/>
+            </a:schemeClr>
+          </a:lnRef>
+          <a:fillRef idx="1">
+            <a:schemeClr val="accent1"/>
+          </a:fillRef>
+          <a:effectRef idx="0">
+            <a:schemeClr val="accent1"/>
+          </a:effectRef>
+          <a:fontRef idx="minor">
+            <a:schemeClr val="lt1"/>
+          </a:fontRef>
+        </p:style>
+        <p:txBody>
+          <a:bodyPr rot="0" spcFirstLastPara="0" vertOverflow="overflow" horzOverflow="overflow" vert="horz" wrap="none" lIns="36000" tIns="36000" rIns="36000" bIns="36000" numCol="1" spcCol="0" rtlCol="0" fromWordArt="0" anchor="ctr" anchorCtr="0" forceAA="0" compatLnSpc="1">
+            <a:prstTxWarp prst="textNoShape">
+              <a:avLst/>
+            </a:prstTxWarp>
+            <a:noAutofit/>
+          </a:bodyPr>
+          <a:lstStyle/>
+          <a:p>
+            <a:pPr algn="ctr"/>
+            <a:r>
+              <a:rPr kumimoji="1" lang="en-US" altLang="ja-JP" sz="1200" dirty="0">
+                <a:solidFill>
+                  <a:schemeClr val="tx1">
+                    <a:lumMod val="75000"/>
+                    <a:lumOff val="25000"/>
+                  </a:schemeClr>
+                </a:solidFill>
+              </a:rPr>
+              <a:t>HTML</a:t>
+            </a:r>
+            <a:endParaRPr kumimoji="1" lang="ja-JP" altLang="en-US" sz="1200">
+              <a:solidFill>
+                <a:schemeClr val="tx1">
+                  <a:lumMod val="75000"/>
+                  <a:lumOff val="25000"/>
+                </a:schemeClr>
+              </a:solidFill>
+            </a:endParaRPr>
+          </a:p>
+        </p:txBody>
+      </p:sp>
+      <p:cxnSp>
+        <p:nvCxnSpPr>
+          <p:cNvPr id="74" name="直線矢印コネクタ 73">
+            <a:extLst>
+              <a:ext uri="{FF2B5EF4-FFF2-40B4-BE49-F238E27FC236}">
+                <a16:creationId xmlns:a16="http://schemas.microsoft.com/office/drawing/2014/main" id="{04DDC773-6AD5-2F42-BCB5-D0CB2E8399C1}"/>
+              </a:ext>
+            </a:extLst>
+          </p:cNvPr>
+          <p:cNvCxnSpPr>
+            <a:cxnSpLocks/>
+          </p:cNvCxnSpPr>
+          <p:nvPr/>
+        </p:nvCxnSpPr>
+        <p:spPr>
+          <a:xfrm flipV="1">
+            <a:off x="5921391" y="2462870"/>
+            <a:ext cx="0" cy="3600400"/>
+          </a:xfrm>
+          <a:prstGeom prst="straightConnector1">
+            <a:avLst/>
+          </a:prstGeom>
+          <a:ln>
+            <a:solidFill>
+              <a:schemeClr val="tx1">
+                <a:lumMod val="75000"/>
+                <a:lumOff val="25000"/>
+              </a:schemeClr>
+            </a:solidFill>
+            <a:tailEnd type="arrow"/>
+          </a:ln>
+        </p:spPr>
+        <p:style>
+          <a:lnRef idx="1">
+            <a:schemeClr val="accent1"/>
+          </a:lnRef>
+          <a:fillRef idx="0">
+            <a:schemeClr val="accent1"/>
+          </a:fillRef>
+          <a:effectRef idx="0">
+            <a:schemeClr val="accent1"/>
+          </a:effectRef>
+          <a:fontRef idx="minor">
+            <a:schemeClr val="tx1"/>
+          </a:fontRef>
+        </p:style>
+      </p:cxnSp>
+      <p:sp>
+        <p:nvSpPr>
+          <p:cNvPr id="76" name="テキスト ボックス 75">
+            <a:extLst>
+              <a:ext uri="{FF2B5EF4-FFF2-40B4-BE49-F238E27FC236}">
+                <a16:creationId xmlns:a16="http://schemas.microsoft.com/office/drawing/2014/main" id="{7DB04629-345B-7C4B-B78F-B59C0CF3C038}"/>
+              </a:ext>
+            </a:extLst>
+          </p:cNvPr>
+          <p:cNvSpPr txBox="1"/>
+          <p:nvPr/>
+        </p:nvSpPr>
+        <p:spPr>
+          <a:xfrm>
+            <a:off x="5911624" y="5805264"/>
+            <a:ext cx="432048" cy="216024"/>
+          </a:xfrm>
+          <a:prstGeom prst="rect">
+            <a:avLst/>
+          </a:prstGeom>
+          <a:noFill/>
+        </p:spPr>
+        <p:txBody>
+          <a:bodyPr wrap="none" rtlCol="0" anchor="ctr">
+            <a:noAutofit/>
+          </a:bodyPr>
+          <a:lstStyle/>
+          <a:p>
+            <a:pPr algn="ctr"/>
+            <a:r>
+              <a:rPr kumimoji="1" lang="en-US" altLang="ja-JP" sz="1200" dirty="0"/>
+              <a:t>URL</a:t>
+            </a:r>
+            <a:endParaRPr kumimoji="1" lang="ja-JP" altLang="en-US" sz="1200"/>
+          </a:p>
+        </p:txBody>
+      </p:sp>
+    </p:spTree>
+    <p:extLst>
+      <p:ext uri="{BB962C8B-B14F-4D97-AF65-F5344CB8AC3E}">
+        <p14:creationId xmlns:p14="http://schemas.microsoft.com/office/powerpoint/2010/main" val="3056823433"/>
+      </p:ext>
+    </p:extLst>
+  </p:cSld>
+  <p:clrMapOvr>
+    <a:masterClrMapping/>
+  </p:clrMapOvr>
+</p:sld>
+</file>
+
+<file path=ppt/slides/slide2.xml><?xml version="1.0" encoding="utf-8"?>
+<p:sld xmlns:a="http://schemas.openxmlformats.org/drawingml/2006/main" xmlns:r="http://schemas.openxmlformats.org/officeDocument/2006/relationships" xmlns:p="http://schemas.openxmlformats.org/presentationml/2006/main">
+  <p:cSld>
+    <p:spTree>
+      <p:nvGrpSpPr>
+        <p:cNvPr id="1" name=""/>
+        <p:cNvGrpSpPr/>
+        <p:nvPr/>
+      </p:nvGrpSpPr>
+      <p:grpSpPr>
+        <a:xfrm>
+          <a:off x="0" y="0"/>
+          <a:ext cx="0" cy="0"/>
+          <a:chOff x="0" y="0"/>
+          <a:chExt cx="0" cy="0"/>
+        </a:xfrm>
+      </p:grpSpPr>
+      <p:sp>
+        <p:nvSpPr>
+          <p:cNvPr id="2" name="タイトル 1">
+            <a:extLst>
+              <a:ext uri="{FF2B5EF4-FFF2-40B4-BE49-F238E27FC236}">
+                <a16:creationId xmlns:a16="http://schemas.microsoft.com/office/drawing/2014/main" id="{259BA5AD-3AF3-0643-93E3-C60A9AA12ECC}"/>
+              </a:ext>
+            </a:extLst>
+          </p:cNvPr>
+          <p:cNvSpPr>
+            <a:spLocks noGrp="1"/>
+          </p:cNvSpPr>
+          <p:nvPr>
+            <p:ph type="title"/>
+          </p:nvPr>
+        </p:nvSpPr>
+        <p:spPr/>
+        <p:txBody>
+          <a:bodyPr/>
+          <a:lstStyle/>
+          <a:p>
+            <a:r>
+              <a:rPr kumimoji="1" lang="en-US" altLang="ja-JP" dirty="0"/>
+              <a:t>Action Flow v0.1 – </a:t>
+            </a:r>
+            <a:r>
+              <a:rPr lang="en-US" altLang="ja-JP" dirty="0"/>
+              <a:t>Atomic</a:t>
+            </a:r>
+            <a:r>
+              <a:rPr kumimoji="1" lang="en-US" altLang="ja-JP" dirty="0"/>
+              <a:t> Page URL</a:t>
+            </a:r>
+            <a:endParaRPr kumimoji="1" lang="ja-JP" altLang="en-US"/>
+          </a:p>
+        </p:txBody>
+      </p:sp>
+      <p:graphicFrame>
+        <p:nvGraphicFramePr>
+          <p:cNvPr id="7" name="表 6">
+            <a:extLst>
+              <a:ext uri="{FF2B5EF4-FFF2-40B4-BE49-F238E27FC236}">
+                <a16:creationId xmlns:a16="http://schemas.microsoft.com/office/drawing/2014/main" id="{BDB7A2A9-4A38-2048-B3F1-91E8B6190B79}"/>
+              </a:ext>
+            </a:extLst>
+          </p:cNvPr>
+          <p:cNvGraphicFramePr>
+            <a:graphicFrameLocks noGrp="1"/>
+          </p:cNvGraphicFramePr>
+          <p:nvPr>
+            <p:extLst/>
           </p:nvPr>
         </p:nvGraphicFramePr>
         <p:xfrm>
@@ -4308,7 +7198,7 @@
           <a:p>
             <a:fld id="{D0280A10-6354-6240-932A-EFE3B18031F6}" type="slidenum">
               <a:rPr kumimoji="1" lang="ja-JP" altLang="en-US" smtClean="0"/>
-              <a:t>1</a:t>
+              <a:t>2</a:t>
             </a:fld>
             <a:endParaRPr kumimoji="1" lang="ja-JP" altLang="en-US"/>
           </a:p>
@@ -6013,7 +8903,7 @@
     </p:spTree>
     <p:extLst>
       <p:ext uri="{BB962C8B-B14F-4D97-AF65-F5344CB8AC3E}">
-        <p14:creationId xmlns:p14="http://schemas.microsoft.com/office/powerpoint/2010/main" val="3056823433"/>
+        <p14:creationId xmlns:p14="http://schemas.microsoft.com/office/powerpoint/2010/main" val="1122158116"/>
       </p:ext>
     </p:extLst>
   </p:cSld>

</xml_diff>

<commit_message>
docs: add V0.1 ER
</commit_message>
<xml_diff>
--- a/line-markers/docs/requirements_definition.pptx
+++ b/line-markers/docs/requirements_definition.pptx
@@ -5,12 +5,13 @@
     <p:sldMasterId id="2147483660" r:id="rId1"/>
   </p:sldMasterIdLst>
   <p:notesMasterIdLst>
-    <p:notesMasterId r:id="rId5"/>
+    <p:notesMasterId r:id="rId6"/>
   </p:notesMasterIdLst>
   <p:sldIdLst>
     <p:sldId id="259" r:id="rId2"/>
-    <p:sldId id="257" r:id="rId3"/>
-    <p:sldId id="258" r:id="rId4"/>
+    <p:sldId id="260" r:id="rId3"/>
+    <p:sldId id="257" r:id="rId4"/>
+    <p:sldId id="258" r:id="rId5"/>
   </p:sldIdLst>
   <p:sldSz cx="9144000" cy="6858000" type="screen4x3"/>
   <p:notesSz cx="6858000" cy="9144000"/>
@@ -199,7 +200,7 @@
           <a:p>
             <a:fld id="{59CC0C07-EF41-2A45-AB7B-6DDD38BD2356}" type="datetimeFigureOut">
               <a:rPr kumimoji="1" lang="ja-JP" altLang="en-US" smtClean="0"/>
-              <a:t>2018/11/3</a:t>
+              <a:t>2018/11/4</a:t>
             </a:fld>
             <a:endParaRPr kumimoji="1" lang="ja-JP" altLang="en-US"/>
           </a:p>
@@ -604,7 +605,7 @@
           <a:p>
             <a:fld id="{B47B6F5B-CD8F-5F4B-9DDA-6618F802EDE5}" type="datetime1">
               <a:rPr kumimoji="1" lang="ja-JP" altLang="en-US" smtClean="0"/>
-              <a:t>2018/11/3</a:t>
+              <a:t>2018/11/4</a:t>
             </a:fld>
             <a:endParaRPr kumimoji="1" lang="ja-JP" altLang="en-US"/>
           </a:p>
@@ -782,7 +783,7 @@
           <a:p>
             <a:fld id="{A2B3B09D-2F29-2F41-BEF5-D6F1454FA527}" type="datetime1">
               <a:rPr kumimoji="1" lang="ja-JP" altLang="en-US" smtClean="0"/>
-              <a:t>2018/11/3</a:t>
+              <a:t>2018/11/4</a:t>
             </a:fld>
             <a:endParaRPr kumimoji="1" lang="ja-JP" altLang="en-US"/>
           </a:p>
@@ -970,7 +971,7 @@
           <a:p>
             <a:fld id="{3BC60FA1-7D6F-F641-B7C0-FD86AA4C9CF9}" type="datetime1">
               <a:rPr kumimoji="1" lang="ja-JP" altLang="en-US" smtClean="0"/>
-              <a:t>2018/11/3</a:t>
+              <a:t>2018/11/4</a:t>
             </a:fld>
             <a:endParaRPr kumimoji="1" lang="ja-JP" altLang="en-US"/>
           </a:p>
@@ -1175,7 +1176,7 @@
           <a:p>
             <a:fld id="{B026633C-E544-DA45-A705-B44A7B402973}" type="datetime1">
               <a:rPr kumimoji="1" lang="ja-JP" altLang="en-US" smtClean="0"/>
-              <a:t>2018/11/3</a:t>
+              <a:t>2018/11/4</a:t>
             </a:fld>
             <a:endParaRPr kumimoji="1" lang="ja-JP" altLang="en-US"/>
           </a:p>
@@ -1466,7 +1467,7 @@
           <a:p>
             <a:fld id="{75BCBF7F-B084-4047-BE6A-A729B2BDFEA8}" type="datetime1">
               <a:rPr kumimoji="1" lang="ja-JP" altLang="en-US" smtClean="0"/>
-              <a:t>2018/11/3</a:t>
+              <a:t>2018/11/4</a:t>
             </a:fld>
             <a:endParaRPr kumimoji="1" lang="ja-JP" altLang="en-US"/>
           </a:p>
@@ -1714,7 +1715,7 @@
           <a:p>
             <a:fld id="{C09D9B14-0B76-1840-A7BD-474CF72A4B65}" type="datetime1">
               <a:rPr kumimoji="1" lang="ja-JP" altLang="en-US" smtClean="0"/>
-              <a:t>2018/11/3</a:t>
+              <a:t>2018/11/4</a:t>
             </a:fld>
             <a:endParaRPr kumimoji="1" lang="ja-JP" altLang="en-US"/>
           </a:p>
@@ -2171,7 +2172,7 @@
           <a:p>
             <a:fld id="{320912EB-1735-9847-96B4-6EB5297105CD}" type="datetime1">
               <a:rPr kumimoji="1" lang="ja-JP" altLang="en-US" smtClean="0"/>
-              <a:t>2018/11/3</a:t>
+              <a:t>2018/11/4</a:t>
             </a:fld>
             <a:endParaRPr kumimoji="1" lang="ja-JP" altLang="en-US"/>
           </a:p>
@@ -2289,7 +2290,7 @@
           <a:p>
             <a:fld id="{2D32CB35-C3D9-2F49-9060-8479F2F563F4}" type="datetime1">
               <a:rPr kumimoji="1" lang="ja-JP" altLang="en-US" smtClean="0"/>
-              <a:t>2018/11/3</a:t>
+              <a:t>2018/11/4</a:t>
             </a:fld>
             <a:endParaRPr kumimoji="1" lang="ja-JP" altLang="en-US"/>
           </a:p>
@@ -2384,7 +2385,7 @@
           <a:p>
             <a:fld id="{09215C7D-F122-204F-A13A-95E3EF730427}" type="datetime1">
               <a:rPr kumimoji="1" lang="ja-JP" altLang="en-US" smtClean="0"/>
-              <a:t>2018/11/3</a:t>
+              <a:t>2018/11/4</a:t>
             </a:fld>
             <a:endParaRPr kumimoji="1" lang="ja-JP" altLang="en-US"/>
           </a:p>
@@ -2706,7 +2707,7 @@
           <a:p>
             <a:fld id="{7CE742CC-AB04-394F-95DC-4916A50FDBEE}" type="datetime1">
               <a:rPr kumimoji="1" lang="ja-JP" altLang="en-US" smtClean="0"/>
-              <a:t>2018/11/3</a:t>
+              <a:t>2018/11/4</a:t>
             </a:fld>
             <a:endParaRPr kumimoji="1" lang="ja-JP" altLang="en-US"/>
           </a:p>
@@ -3000,7 +3001,7 @@
           <a:p>
             <a:fld id="{8A8D9395-7356-D64B-8F25-F14BADA3CCE8}" type="datetime1">
               <a:rPr kumimoji="1" lang="ja-JP" altLang="en-US" smtClean="0"/>
-              <a:t>2018/11/3</a:t>
+              <a:t>2018/11/4</a:t>
             </a:fld>
             <a:endParaRPr kumimoji="1" lang="ja-JP" altLang="en-US"/>
           </a:p>
@@ -3221,7 +3222,7 @@
           <a:p>
             <a:fld id="{83103C3F-A96D-1340-80CB-81ACC68C7E6A}" type="datetime1">
               <a:rPr kumimoji="1" lang="ja-JP" altLang="en-US" smtClean="0"/>
-              <a:t>2018/11/3</a:t>
+              <a:t>2018/11/4</a:t>
             </a:fld>
             <a:endParaRPr kumimoji="1" lang="ja-JP" altLang="en-US"/>
           </a:p>
@@ -3710,10 +3711,7 @@
             <a:avLst/>
           </a:prstGeom>
           <a:solidFill>
-            <a:schemeClr val="accent1">
-              <a:lumMod val="20000"/>
-              <a:lumOff val="80000"/>
-            </a:schemeClr>
+            <a:schemeClr val="accent2"/>
           </a:solidFill>
           <a:ln>
             <a:solidFill>
@@ -6190,6 +6188,2241 @@
 </file>
 
 <file path=ppt/slides/slide2.xml><?xml version="1.0" encoding="utf-8"?>
+<p:sld xmlns:a="http://schemas.openxmlformats.org/drawingml/2006/main" xmlns:r="http://schemas.openxmlformats.org/officeDocument/2006/relationships" xmlns:p="http://schemas.openxmlformats.org/presentationml/2006/main">
+  <p:cSld>
+    <p:spTree>
+      <p:nvGrpSpPr>
+        <p:cNvPr id="1" name=""/>
+        <p:cNvGrpSpPr/>
+        <p:nvPr/>
+      </p:nvGrpSpPr>
+      <p:grpSpPr>
+        <a:xfrm>
+          <a:off x="0" y="0"/>
+          <a:ext cx="0" cy="0"/>
+          <a:chOff x="0" y="0"/>
+          <a:chExt cx="0" cy="0"/>
+        </a:xfrm>
+      </p:grpSpPr>
+      <p:sp>
+        <p:nvSpPr>
+          <p:cNvPr id="2" name="タイトル 1">
+            <a:extLst>
+              <a:ext uri="{FF2B5EF4-FFF2-40B4-BE49-F238E27FC236}">
+                <a16:creationId xmlns:a16="http://schemas.microsoft.com/office/drawing/2014/main" id="{5FA28D1A-0B5C-2146-B387-25AF7CC7F9D8}"/>
+              </a:ext>
+            </a:extLst>
+          </p:cNvPr>
+          <p:cNvSpPr>
+            <a:spLocks noGrp="1"/>
+          </p:cNvSpPr>
+          <p:nvPr>
+            <p:ph type="title"/>
+          </p:nvPr>
+        </p:nvSpPr>
+        <p:spPr/>
+        <p:txBody>
+          <a:bodyPr/>
+          <a:lstStyle/>
+          <a:p>
+            <a:r>
+              <a:rPr lang="en-US" altLang="ja-JP" dirty="0"/>
+              <a:t>v0.1 </a:t>
+            </a:r>
+            <a:r>
+              <a:rPr kumimoji="1" lang="en-US" altLang="ja-JP" dirty="0"/>
+              <a:t>ER</a:t>
+            </a:r>
+            <a:endParaRPr kumimoji="1" lang="ja-JP" altLang="en-US"/>
+          </a:p>
+        </p:txBody>
+      </p:sp>
+      <p:sp>
+        <p:nvSpPr>
+          <p:cNvPr id="4" name="スライド番号プレースホルダー 3">
+            <a:extLst>
+              <a:ext uri="{FF2B5EF4-FFF2-40B4-BE49-F238E27FC236}">
+                <a16:creationId xmlns:a16="http://schemas.microsoft.com/office/drawing/2014/main" id="{D6917922-6059-524E-8602-8A297E312C2D}"/>
+              </a:ext>
+            </a:extLst>
+          </p:cNvPr>
+          <p:cNvSpPr>
+            <a:spLocks noGrp="1"/>
+          </p:cNvSpPr>
+          <p:nvPr>
+            <p:ph type="sldNum" sz="quarter" idx="12"/>
+          </p:nvPr>
+        </p:nvSpPr>
+        <p:spPr/>
+        <p:txBody>
+          <a:bodyPr/>
+          <a:lstStyle/>
+          <a:p>
+            <a:fld id="{D0280A10-6354-6240-932A-EFE3B18031F6}" type="slidenum">
+              <a:rPr kumimoji="1" lang="ja-JP" altLang="en-US" smtClean="0"/>
+              <a:t>2</a:t>
+            </a:fld>
+            <a:endParaRPr kumimoji="1" lang="ja-JP" altLang="en-US"/>
+          </a:p>
+        </p:txBody>
+      </p:sp>
+      <p:sp>
+        <p:nvSpPr>
+          <p:cNvPr id="6" name="円柱 5">
+            <a:extLst>
+              <a:ext uri="{FF2B5EF4-FFF2-40B4-BE49-F238E27FC236}">
+                <a16:creationId xmlns:a16="http://schemas.microsoft.com/office/drawing/2014/main" id="{26DF7C48-252E-D044-AF89-EEFDB0994B28}"/>
+              </a:ext>
+            </a:extLst>
+          </p:cNvPr>
+          <p:cNvSpPr/>
+          <p:nvPr/>
+        </p:nvSpPr>
+        <p:spPr>
+          <a:xfrm>
+            <a:off x="3963641" y="4015973"/>
+            <a:ext cx="968400" cy="462074"/>
+          </a:xfrm>
+          <a:prstGeom prst="can">
+            <a:avLst/>
+          </a:prstGeom>
+          <a:solidFill>
+            <a:schemeClr val="accent1">
+              <a:lumMod val="20000"/>
+              <a:lumOff val="80000"/>
+            </a:schemeClr>
+          </a:solidFill>
+          <a:ln>
+            <a:solidFill>
+              <a:schemeClr val="tx1">
+                <a:lumMod val="75000"/>
+                <a:lumOff val="25000"/>
+              </a:schemeClr>
+            </a:solidFill>
+          </a:ln>
+        </p:spPr>
+        <p:style>
+          <a:lnRef idx="2">
+            <a:schemeClr val="accent1">
+              <a:shade val="50000"/>
+            </a:schemeClr>
+          </a:lnRef>
+          <a:fillRef idx="1">
+            <a:schemeClr val="accent1"/>
+          </a:fillRef>
+          <a:effectRef idx="0">
+            <a:schemeClr val="accent1"/>
+          </a:effectRef>
+          <a:fontRef idx="minor">
+            <a:schemeClr val="lt1"/>
+          </a:fontRef>
+        </p:style>
+        <p:txBody>
+          <a:bodyPr wrap="none" lIns="36000" tIns="36000" rIns="36000" bIns="36000" rtlCol="0" anchor="ctr"/>
+          <a:lstStyle/>
+          <a:p>
+            <a:pPr algn="ctr"/>
+            <a:r>
+              <a:rPr kumimoji="1" lang="en-US" altLang="ja-JP" sz="1200" dirty="0">
+                <a:solidFill>
+                  <a:schemeClr val="tx1">
+                    <a:lumMod val="75000"/>
+                    <a:lumOff val="25000"/>
+                  </a:schemeClr>
+                </a:solidFill>
+              </a:rPr>
+              <a:t>Scraped </a:t>
+            </a:r>
+            <a:r>
+              <a:rPr lang="en-US" altLang="ja-JP" sz="1200" dirty="0">
+                <a:solidFill>
+                  <a:schemeClr val="tx1">
+                    <a:lumMod val="75000"/>
+                    <a:lumOff val="25000"/>
+                  </a:schemeClr>
+                </a:solidFill>
+              </a:rPr>
+              <a:t>Code</a:t>
+            </a:r>
+            <a:endParaRPr kumimoji="1" lang="ja-JP" altLang="en-US" sz="1200">
+              <a:solidFill>
+                <a:schemeClr val="tx1">
+                  <a:lumMod val="75000"/>
+                  <a:lumOff val="25000"/>
+                </a:schemeClr>
+              </a:solidFill>
+            </a:endParaRPr>
+          </a:p>
+        </p:txBody>
+      </p:sp>
+      <p:sp>
+        <p:nvSpPr>
+          <p:cNvPr id="7" name="円柱 6">
+            <a:extLst>
+              <a:ext uri="{FF2B5EF4-FFF2-40B4-BE49-F238E27FC236}">
+                <a16:creationId xmlns:a16="http://schemas.microsoft.com/office/drawing/2014/main" id="{B25BA081-BAE8-2148-B216-13B4B28443D7}"/>
+              </a:ext>
+            </a:extLst>
+          </p:cNvPr>
+          <p:cNvSpPr/>
+          <p:nvPr/>
+        </p:nvSpPr>
+        <p:spPr>
+          <a:xfrm>
+            <a:off x="3963641" y="4955976"/>
+            <a:ext cx="968400" cy="462074"/>
+          </a:xfrm>
+          <a:prstGeom prst="can">
+            <a:avLst/>
+          </a:prstGeom>
+          <a:solidFill>
+            <a:schemeClr val="accent1">
+              <a:lumMod val="20000"/>
+              <a:lumOff val="80000"/>
+            </a:schemeClr>
+          </a:solidFill>
+          <a:ln>
+            <a:solidFill>
+              <a:schemeClr val="tx1">
+                <a:lumMod val="75000"/>
+                <a:lumOff val="25000"/>
+              </a:schemeClr>
+            </a:solidFill>
+          </a:ln>
+        </p:spPr>
+        <p:style>
+          <a:lnRef idx="2">
+            <a:schemeClr val="accent1">
+              <a:shade val="50000"/>
+            </a:schemeClr>
+          </a:lnRef>
+          <a:fillRef idx="1">
+            <a:schemeClr val="accent1"/>
+          </a:fillRef>
+          <a:effectRef idx="0">
+            <a:schemeClr val="accent1"/>
+          </a:effectRef>
+          <a:fontRef idx="minor">
+            <a:schemeClr val="lt1"/>
+          </a:fontRef>
+        </p:style>
+        <p:txBody>
+          <a:bodyPr wrap="none" lIns="36000" tIns="36000" rIns="36000" bIns="36000" rtlCol="0" anchor="ctr"/>
+          <a:lstStyle/>
+          <a:p>
+            <a:pPr algn="ctr"/>
+            <a:r>
+              <a:rPr kumimoji="1" lang="en-US" altLang="ja-JP" sz="1200" dirty="0">
+                <a:solidFill>
+                  <a:schemeClr val="tx1">
+                    <a:lumMod val="75000"/>
+                    <a:lumOff val="25000"/>
+                  </a:schemeClr>
+                </a:solidFill>
+              </a:rPr>
+              <a:t>Diff Code</a:t>
+            </a:r>
+            <a:endParaRPr kumimoji="1" lang="ja-JP" altLang="en-US" sz="1200">
+              <a:solidFill>
+                <a:schemeClr val="tx1">
+                  <a:lumMod val="75000"/>
+                  <a:lumOff val="25000"/>
+                </a:schemeClr>
+              </a:solidFill>
+            </a:endParaRPr>
+          </a:p>
+        </p:txBody>
+      </p:sp>
+      <p:cxnSp>
+        <p:nvCxnSpPr>
+          <p:cNvPr id="12" name="カギ線コネクタ 11">
+            <a:extLst>
+              <a:ext uri="{FF2B5EF4-FFF2-40B4-BE49-F238E27FC236}">
+                <a16:creationId xmlns:a16="http://schemas.microsoft.com/office/drawing/2014/main" id="{3894C07F-C4DC-FF40-9A7A-60DA5B2A4E10}"/>
+              </a:ext>
+            </a:extLst>
+          </p:cNvPr>
+          <p:cNvCxnSpPr>
+            <a:cxnSpLocks/>
+            <a:stCxn id="112" idx="4"/>
+            <a:endCxn id="6" idx="2"/>
+          </p:cNvCxnSpPr>
+          <p:nvPr/>
+        </p:nvCxnSpPr>
+        <p:spPr>
+          <a:xfrm>
+            <a:off x="1867992" y="3341979"/>
+            <a:ext cx="2095649" cy="905031"/>
+          </a:xfrm>
+          <a:prstGeom prst="bentConnector3">
+            <a:avLst>
+              <a:gd name="adj1" fmla="val 50000"/>
+            </a:avLst>
+          </a:prstGeom>
+          <a:ln>
+            <a:solidFill>
+              <a:schemeClr val="tx1">
+                <a:lumMod val="75000"/>
+                <a:lumOff val="25000"/>
+              </a:schemeClr>
+            </a:solidFill>
+            <a:headEnd type="none" w="med" len="med"/>
+            <a:tailEnd type="none" w="med" len="med"/>
+          </a:ln>
+        </p:spPr>
+        <p:style>
+          <a:lnRef idx="1">
+            <a:schemeClr val="accent1"/>
+          </a:lnRef>
+          <a:fillRef idx="0">
+            <a:schemeClr val="accent1"/>
+          </a:fillRef>
+          <a:effectRef idx="0">
+            <a:schemeClr val="accent1"/>
+          </a:effectRef>
+          <a:fontRef idx="minor">
+            <a:schemeClr val="tx1"/>
+          </a:fontRef>
+        </p:style>
+      </p:cxnSp>
+      <p:cxnSp>
+        <p:nvCxnSpPr>
+          <p:cNvPr id="15" name="カギ線コネクタ 14">
+            <a:extLst>
+              <a:ext uri="{FF2B5EF4-FFF2-40B4-BE49-F238E27FC236}">
+                <a16:creationId xmlns:a16="http://schemas.microsoft.com/office/drawing/2014/main" id="{2CB87D06-4B59-F945-8FD4-C4104D34295B}"/>
+              </a:ext>
+            </a:extLst>
+          </p:cNvPr>
+          <p:cNvCxnSpPr>
+            <a:cxnSpLocks/>
+            <a:stCxn id="112" idx="3"/>
+            <a:endCxn id="7" idx="2"/>
+          </p:cNvCxnSpPr>
+          <p:nvPr/>
+        </p:nvCxnSpPr>
+        <p:spPr>
+          <a:xfrm rot="16200000" flipH="1">
+            <a:off x="1866718" y="3090089"/>
+            <a:ext cx="1613997" cy="2579849"/>
+          </a:xfrm>
+          <a:prstGeom prst="bentConnector2">
+            <a:avLst/>
+          </a:prstGeom>
+          <a:ln>
+            <a:solidFill>
+              <a:schemeClr val="tx1">
+                <a:lumMod val="75000"/>
+                <a:lumOff val="25000"/>
+              </a:schemeClr>
+            </a:solidFill>
+            <a:headEnd type="none" w="med" len="med"/>
+            <a:tailEnd type="none" w="med" len="med"/>
+          </a:ln>
+        </p:spPr>
+        <p:style>
+          <a:lnRef idx="1">
+            <a:schemeClr val="accent1"/>
+          </a:lnRef>
+          <a:fillRef idx="0">
+            <a:schemeClr val="accent1"/>
+          </a:fillRef>
+          <a:effectRef idx="0">
+            <a:schemeClr val="accent1"/>
+          </a:effectRef>
+          <a:fontRef idx="minor">
+            <a:schemeClr val="tx1"/>
+          </a:fontRef>
+        </p:style>
+      </p:cxnSp>
+      <p:cxnSp>
+        <p:nvCxnSpPr>
+          <p:cNvPr id="20" name="直線コネクタ 19">
+            <a:extLst>
+              <a:ext uri="{FF2B5EF4-FFF2-40B4-BE49-F238E27FC236}">
+                <a16:creationId xmlns:a16="http://schemas.microsoft.com/office/drawing/2014/main" id="{79D8A933-400C-014C-864E-646085220AE0}"/>
+              </a:ext>
+            </a:extLst>
+          </p:cNvPr>
+          <p:cNvCxnSpPr>
+            <a:stCxn id="6" idx="3"/>
+            <a:endCxn id="7" idx="1"/>
+          </p:cNvCxnSpPr>
+          <p:nvPr/>
+        </p:nvCxnSpPr>
+        <p:spPr>
+          <a:xfrm>
+            <a:off x="4447841" y="4478047"/>
+            <a:ext cx="0" cy="477929"/>
+          </a:xfrm>
+          <a:prstGeom prst="line">
+            <a:avLst/>
+          </a:prstGeom>
+          <a:ln>
+            <a:solidFill>
+              <a:schemeClr val="tx1">
+                <a:lumMod val="75000"/>
+                <a:lumOff val="25000"/>
+              </a:schemeClr>
+            </a:solidFill>
+            <a:prstDash val="solid"/>
+            <a:headEnd type="none" w="med" len="med"/>
+            <a:tailEnd type="none" w="med" len="med"/>
+          </a:ln>
+        </p:spPr>
+        <p:style>
+          <a:lnRef idx="1">
+            <a:schemeClr val="accent1"/>
+          </a:lnRef>
+          <a:fillRef idx="0">
+            <a:schemeClr val="accent1"/>
+          </a:fillRef>
+          <a:effectRef idx="0">
+            <a:schemeClr val="accent1"/>
+          </a:effectRef>
+          <a:fontRef idx="minor">
+            <a:schemeClr val="tx1"/>
+          </a:fontRef>
+        </p:style>
+      </p:cxnSp>
+      <p:sp>
+        <p:nvSpPr>
+          <p:cNvPr id="25" name="テキスト ボックス 24">
+            <a:extLst>
+              <a:ext uri="{FF2B5EF4-FFF2-40B4-BE49-F238E27FC236}">
+                <a16:creationId xmlns:a16="http://schemas.microsoft.com/office/drawing/2014/main" id="{80749E97-6EC7-5C4F-80C1-B69412E165D3}"/>
+              </a:ext>
+            </a:extLst>
+          </p:cNvPr>
+          <p:cNvSpPr txBox="1"/>
+          <p:nvPr/>
+        </p:nvSpPr>
+        <p:spPr>
+          <a:xfrm>
+            <a:off x="4458261" y="4475015"/>
+            <a:ext cx="242374" cy="230832"/>
+          </a:xfrm>
+          <a:prstGeom prst="rect">
+            <a:avLst/>
+          </a:prstGeom>
+          <a:noFill/>
+        </p:spPr>
+        <p:txBody>
+          <a:bodyPr wrap="none" rtlCol="0" anchor="ctr">
+            <a:spAutoFit/>
+          </a:bodyPr>
+          <a:lstStyle/>
+          <a:p>
+            <a:pPr algn="ctr"/>
+            <a:r>
+              <a:rPr kumimoji="1" lang="en-US" altLang="ja-JP" sz="900" dirty="0"/>
+              <a:t>1</a:t>
+            </a:r>
+            <a:endParaRPr kumimoji="1" lang="ja-JP" altLang="en-US" sz="900"/>
+          </a:p>
+        </p:txBody>
+      </p:sp>
+      <p:sp>
+        <p:nvSpPr>
+          <p:cNvPr id="26" name="テキスト ボックス 25">
+            <a:extLst>
+              <a:ext uri="{FF2B5EF4-FFF2-40B4-BE49-F238E27FC236}">
+                <a16:creationId xmlns:a16="http://schemas.microsoft.com/office/drawing/2014/main" id="{502486D9-C622-244F-A390-825407B05283}"/>
+              </a:ext>
+            </a:extLst>
+          </p:cNvPr>
+          <p:cNvSpPr txBox="1"/>
+          <p:nvPr/>
+        </p:nvSpPr>
+        <p:spPr>
+          <a:xfrm>
+            <a:off x="4458261" y="4725144"/>
+            <a:ext cx="242374" cy="230832"/>
+          </a:xfrm>
+          <a:prstGeom prst="rect">
+            <a:avLst/>
+          </a:prstGeom>
+          <a:noFill/>
+        </p:spPr>
+        <p:txBody>
+          <a:bodyPr wrap="none" rtlCol="0" anchor="ctr">
+            <a:spAutoFit/>
+          </a:bodyPr>
+          <a:lstStyle/>
+          <a:p>
+            <a:pPr algn="ctr"/>
+            <a:r>
+              <a:rPr kumimoji="1" lang="en-US" altLang="ja-JP" sz="900" dirty="0"/>
+              <a:t>1</a:t>
+            </a:r>
+            <a:endParaRPr kumimoji="1" lang="ja-JP" altLang="en-US" sz="900"/>
+          </a:p>
+        </p:txBody>
+      </p:sp>
+      <p:sp>
+        <p:nvSpPr>
+          <p:cNvPr id="31" name="テキスト ボックス 30">
+            <a:extLst>
+              <a:ext uri="{FF2B5EF4-FFF2-40B4-BE49-F238E27FC236}">
+                <a16:creationId xmlns:a16="http://schemas.microsoft.com/office/drawing/2014/main" id="{3B92AC20-C97A-1F48-89C7-61BD9BD769A7}"/>
+              </a:ext>
+            </a:extLst>
+          </p:cNvPr>
+          <p:cNvSpPr txBox="1"/>
+          <p:nvPr/>
+        </p:nvSpPr>
+        <p:spPr>
+          <a:xfrm>
+            <a:off x="3709242" y="4941168"/>
+            <a:ext cx="245580" cy="230832"/>
+          </a:xfrm>
+          <a:prstGeom prst="rect">
+            <a:avLst/>
+          </a:prstGeom>
+          <a:noFill/>
+        </p:spPr>
+        <p:txBody>
+          <a:bodyPr wrap="none" rtlCol="0" anchor="ctr">
+            <a:spAutoFit/>
+          </a:bodyPr>
+          <a:lstStyle/>
+          <a:p>
+            <a:pPr algn="ctr"/>
+            <a:r>
+              <a:rPr lang="en-US" altLang="ja-JP" sz="900" dirty="0"/>
+              <a:t>n</a:t>
+            </a:r>
+            <a:endParaRPr kumimoji="1" lang="ja-JP" altLang="en-US" sz="900"/>
+          </a:p>
+        </p:txBody>
+      </p:sp>
+      <p:sp>
+        <p:nvSpPr>
+          <p:cNvPr id="32" name="テキスト ボックス 31">
+            <a:extLst>
+              <a:ext uri="{FF2B5EF4-FFF2-40B4-BE49-F238E27FC236}">
+                <a16:creationId xmlns:a16="http://schemas.microsoft.com/office/drawing/2014/main" id="{6CFA1244-28B7-D94E-95AE-55D829D2C80F}"/>
+              </a:ext>
+            </a:extLst>
+          </p:cNvPr>
+          <p:cNvSpPr txBox="1"/>
+          <p:nvPr/>
+        </p:nvSpPr>
+        <p:spPr>
+          <a:xfrm>
+            <a:off x="1414430" y="4941168"/>
+            <a:ext cx="242374" cy="230832"/>
+          </a:xfrm>
+          <a:prstGeom prst="rect">
+            <a:avLst/>
+          </a:prstGeom>
+          <a:noFill/>
+        </p:spPr>
+        <p:txBody>
+          <a:bodyPr wrap="none" rtlCol="0" anchor="ctr">
+            <a:spAutoFit/>
+          </a:bodyPr>
+          <a:lstStyle/>
+          <a:p>
+            <a:pPr algn="ctr"/>
+            <a:r>
+              <a:rPr lang="en-US" altLang="ja-JP" sz="900" dirty="0"/>
+              <a:t>1</a:t>
+            </a:r>
+            <a:endParaRPr kumimoji="1" lang="ja-JP" altLang="en-US" sz="900"/>
+          </a:p>
+        </p:txBody>
+      </p:sp>
+      <p:sp>
+        <p:nvSpPr>
+          <p:cNvPr id="33" name="テキスト ボックス 32">
+            <a:extLst>
+              <a:ext uri="{FF2B5EF4-FFF2-40B4-BE49-F238E27FC236}">
+                <a16:creationId xmlns:a16="http://schemas.microsoft.com/office/drawing/2014/main" id="{51D1CB4C-7400-3343-A0FE-0C8972B97F65}"/>
+              </a:ext>
+            </a:extLst>
+          </p:cNvPr>
+          <p:cNvSpPr txBox="1"/>
+          <p:nvPr/>
+        </p:nvSpPr>
+        <p:spPr>
+          <a:xfrm>
+            <a:off x="3709242" y="4005064"/>
+            <a:ext cx="245580" cy="230832"/>
+          </a:xfrm>
+          <a:prstGeom prst="rect">
+            <a:avLst/>
+          </a:prstGeom>
+          <a:noFill/>
+        </p:spPr>
+        <p:txBody>
+          <a:bodyPr wrap="none" rtlCol="0" anchor="ctr">
+            <a:spAutoFit/>
+          </a:bodyPr>
+          <a:lstStyle/>
+          <a:p>
+            <a:pPr algn="ctr"/>
+            <a:r>
+              <a:rPr lang="en-US" altLang="ja-JP" sz="900" dirty="0"/>
+              <a:t>n</a:t>
+            </a:r>
+            <a:endParaRPr kumimoji="1" lang="ja-JP" altLang="en-US" sz="900"/>
+          </a:p>
+        </p:txBody>
+      </p:sp>
+      <p:sp>
+        <p:nvSpPr>
+          <p:cNvPr id="34" name="テキスト ボックス 33">
+            <a:extLst>
+              <a:ext uri="{FF2B5EF4-FFF2-40B4-BE49-F238E27FC236}">
+                <a16:creationId xmlns:a16="http://schemas.microsoft.com/office/drawing/2014/main" id="{C7AF7CA4-5664-5E47-9929-8B1BD4F81A9C}"/>
+              </a:ext>
+            </a:extLst>
+          </p:cNvPr>
+          <p:cNvSpPr txBox="1"/>
+          <p:nvPr/>
+        </p:nvSpPr>
+        <p:spPr>
+          <a:xfrm>
+            <a:off x="3131841" y="4005064"/>
+            <a:ext cx="242374" cy="230832"/>
+          </a:xfrm>
+          <a:prstGeom prst="rect">
+            <a:avLst/>
+          </a:prstGeom>
+          <a:noFill/>
+        </p:spPr>
+        <p:txBody>
+          <a:bodyPr wrap="none" rtlCol="0" anchor="ctr">
+            <a:spAutoFit/>
+          </a:bodyPr>
+          <a:lstStyle/>
+          <a:p>
+            <a:pPr algn="ctr"/>
+            <a:r>
+              <a:rPr lang="en-US" altLang="ja-JP" sz="900" dirty="0"/>
+              <a:t>1</a:t>
+            </a:r>
+            <a:endParaRPr kumimoji="1" lang="ja-JP" altLang="en-US" sz="900"/>
+          </a:p>
+        </p:txBody>
+      </p:sp>
+      <p:sp>
+        <p:nvSpPr>
+          <p:cNvPr id="40" name="円柱 39">
+            <a:extLst>
+              <a:ext uri="{FF2B5EF4-FFF2-40B4-BE49-F238E27FC236}">
+                <a16:creationId xmlns:a16="http://schemas.microsoft.com/office/drawing/2014/main" id="{832095AF-8109-4D43-AEB1-62DC0844115A}"/>
+              </a:ext>
+            </a:extLst>
+          </p:cNvPr>
+          <p:cNvSpPr/>
+          <p:nvPr/>
+        </p:nvSpPr>
+        <p:spPr>
+          <a:xfrm>
+            <a:off x="7085712" y="3110942"/>
+            <a:ext cx="968400" cy="462074"/>
+          </a:xfrm>
+          <a:prstGeom prst="can">
+            <a:avLst/>
+          </a:prstGeom>
+          <a:solidFill>
+            <a:schemeClr val="accent1">
+              <a:lumMod val="20000"/>
+              <a:lumOff val="80000"/>
+            </a:schemeClr>
+          </a:solidFill>
+          <a:ln>
+            <a:solidFill>
+              <a:schemeClr val="tx1">
+                <a:lumMod val="75000"/>
+                <a:lumOff val="25000"/>
+              </a:schemeClr>
+            </a:solidFill>
+          </a:ln>
+        </p:spPr>
+        <p:style>
+          <a:lnRef idx="2">
+            <a:schemeClr val="accent1">
+              <a:shade val="50000"/>
+            </a:schemeClr>
+          </a:lnRef>
+          <a:fillRef idx="1">
+            <a:schemeClr val="accent1"/>
+          </a:fillRef>
+          <a:effectRef idx="0">
+            <a:schemeClr val="accent1"/>
+          </a:effectRef>
+          <a:fontRef idx="minor">
+            <a:schemeClr val="lt1"/>
+          </a:fontRef>
+        </p:style>
+        <p:txBody>
+          <a:bodyPr wrap="none" lIns="36000" tIns="36000" rIns="36000" bIns="36000" rtlCol="0" anchor="ctr"/>
+          <a:lstStyle/>
+          <a:p>
+            <a:pPr algn="ctr"/>
+            <a:r>
+              <a:rPr kumimoji="1" lang="en-US" altLang="ja-JP" sz="1200" dirty="0">
+                <a:solidFill>
+                  <a:schemeClr val="tx1">
+                    <a:lumMod val="75000"/>
+                    <a:lumOff val="25000"/>
+                  </a:schemeClr>
+                </a:solidFill>
+              </a:rPr>
+              <a:t>Bookshelf</a:t>
+            </a:r>
+            <a:endParaRPr kumimoji="1" lang="ja-JP" altLang="en-US" sz="1200">
+              <a:solidFill>
+                <a:schemeClr val="tx1">
+                  <a:lumMod val="75000"/>
+                  <a:lumOff val="25000"/>
+                </a:schemeClr>
+              </a:solidFill>
+            </a:endParaRPr>
+          </a:p>
+        </p:txBody>
+      </p:sp>
+      <p:sp>
+        <p:nvSpPr>
+          <p:cNvPr id="45" name="円柱 44">
+            <a:extLst>
+              <a:ext uri="{FF2B5EF4-FFF2-40B4-BE49-F238E27FC236}">
+                <a16:creationId xmlns:a16="http://schemas.microsoft.com/office/drawing/2014/main" id="{35FB99C5-8146-5C4C-B724-C272C7061395}"/>
+              </a:ext>
+            </a:extLst>
+          </p:cNvPr>
+          <p:cNvSpPr/>
+          <p:nvPr/>
+        </p:nvSpPr>
+        <p:spPr>
+          <a:xfrm>
+            <a:off x="4932041" y="1556792"/>
+            <a:ext cx="968400" cy="462074"/>
+          </a:xfrm>
+          <a:prstGeom prst="can">
+            <a:avLst/>
+          </a:prstGeom>
+          <a:solidFill>
+            <a:schemeClr val="accent1">
+              <a:lumMod val="20000"/>
+              <a:lumOff val="80000"/>
+            </a:schemeClr>
+          </a:solidFill>
+          <a:ln>
+            <a:solidFill>
+              <a:schemeClr val="tx1">
+                <a:lumMod val="75000"/>
+                <a:lumOff val="25000"/>
+              </a:schemeClr>
+            </a:solidFill>
+          </a:ln>
+        </p:spPr>
+        <p:style>
+          <a:lnRef idx="2">
+            <a:schemeClr val="accent1">
+              <a:shade val="50000"/>
+            </a:schemeClr>
+          </a:lnRef>
+          <a:fillRef idx="1">
+            <a:schemeClr val="accent1"/>
+          </a:fillRef>
+          <a:effectRef idx="0">
+            <a:schemeClr val="accent1"/>
+          </a:effectRef>
+          <a:fontRef idx="minor">
+            <a:schemeClr val="lt1"/>
+          </a:fontRef>
+        </p:style>
+        <p:txBody>
+          <a:bodyPr wrap="none" lIns="36000" tIns="36000" rIns="36000" bIns="36000" rtlCol="0" anchor="ctr"/>
+          <a:lstStyle/>
+          <a:p>
+            <a:pPr algn="ctr"/>
+            <a:r>
+              <a:rPr kumimoji="1" lang="en-US" altLang="ja-JP" sz="1200" dirty="0">
+                <a:solidFill>
+                  <a:schemeClr val="tx1">
+                    <a:lumMod val="75000"/>
+                    <a:lumOff val="25000"/>
+                  </a:schemeClr>
+                </a:solidFill>
+              </a:rPr>
+              <a:t>User</a:t>
+            </a:r>
+            <a:endParaRPr kumimoji="1" lang="ja-JP" altLang="en-US" sz="1200">
+              <a:solidFill>
+                <a:schemeClr val="tx1">
+                  <a:lumMod val="75000"/>
+                  <a:lumOff val="25000"/>
+                </a:schemeClr>
+              </a:solidFill>
+            </a:endParaRPr>
+          </a:p>
+        </p:txBody>
+      </p:sp>
+      <p:cxnSp>
+        <p:nvCxnSpPr>
+          <p:cNvPr id="50" name="カギ線コネクタ 49">
+            <a:extLst>
+              <a:ext uri="{FF2B5EF4-FFF2-40B4-BE49-F238E27FC236}">
+                <a16:creationId xmlns:a16="http://schemas.microsoft.com/office/drawing/2014/main" id="{BA5BE3A3-D9A5-4046-8866-C0C54D14429C}"/>
+              </a:ext>
+            </a:extLst>
+          </p:cNvPr>
+          <p:cNvCxnSpPr>
+            <a:cxnSpLocks/>
+            <a:stCxn id="45" idx="3"/>
+            <a:endCxn id="40" idx="1"/>
+          </p:cNvCxnSpPr>
+          <p:nvPr/>
+        </p:nvCxnSpPr>
+        <p:spPr>
+          <a:xfrm rot="16200000" flipH="1">
+            <a:off x="5947038" y="1488068"/>
+            <a:ext cx="1092076" cy="2153671"/>
+          </a:xfrm>
+          <a:prstGeom prst="bentConnector3">
+            <a:avLst>
+              <a:gd name="adj1" fmla="val 50000"/>
+            </a:avLst>
+          </a:prstGeom>
+          <a:ln>
+            <a:solidFill>
+              <a:schemeClr val="tx1">
+                <a:lumMod val="75000"/>
+                <a:lumOff val="25000"/>
+              </a:schemeClr>
+            </a:solidFill>
+            <a:headEnd type="none" w="med" len="med"/>
+            <a:tailEnd type="none" w="med" len="med"/>
+          </a:ln>
+        </p:spPr>
+        <p:style>
+          <a:lnRef idx="1">
+            <a:schemeClr val="accent1"/>
+          </a:lnRef>
+          <a:fillRef idx="0">
+            <a:schemeClr val="accent1"/>
+          </a:fillRef>
+          <a:effectRef idx="0">
+            <a:schemeClr val="accent1"/>
+          </a:effectRef>
+          <a:fontRef idx="minor">
+            <a:schemeClr val="tx1"/>
+          </a:fontRef>
+        </p:style>
+      </p:cxnSp>
+      <p:cxnSp>
+        <p:nvCxnSpPr>
+          <p:cNvPr id="68" name="カギ線コネクタ 67">
+            <a:extLst>
+              <a:ext uri="{FF2B5EF4-FFF2-40B4-BE49-F238E27FC236}">
+                <a16:creationId xmlns:a16="http://schemas.microsoft.com/office/drawing/2014/main" id="{A0074E9E-9601-DB4D-8CFE-C772D6B51531}"/>
+              </a:ext>
+            </a:extLst>
+          </p:cNvPr>
+          <p:cNvCxnSpPr>
+            <a:cxnSpLocks/>
+            <a:stCxn id="40" idx="3"/>
+            <a:endCxn id="78" idx="4"/>
+          </p:cNvCxnSpPr>
+          <p:nvPr/>
+        </p:nvCxnSpPr>
+        <p:spPr>
+          <a:xfrm rot="5400000">
+            <a:off x="6832429" y="3509527"/>
+            <a:ext cx="673994" cy="800972"/>
+          </a:xfrm>
+          <a:prstGeom prst="bentConnector2">
+            <a:avLst/>
+          </a:prstGeom>
+          <a:ln>
+            <a:solidFill>
+              <a:schemeClr val="tx1">
+                <a:lumMod val="75000"/>
+                <a:lumOff val="25000"/>
+              </a:schemeClr>
+            </a:solidFill>
+            <a:headEnd type="none" w="med" len="med"/>
+            <a:tailEnd type="none" w="med" len="med"/>
+          </a:ln>
+        </p:spPr>
+        <p:style>
+          <a:lnRef idx="1">
+            <a:schemeClr val="accent1"/>
+          </a:lnRef>
+          <a:fillRef idx="0">
+            <a:schemeClr val="accent1"/>
+          </a:fillRef>
+          <a:effectRef idx="0">
+            <a:schemeClr val="accent1"/>
+          </a:effectRef>
+          <a:fontRef idx="minor">
+            <a:schemeClr val="tx1"/>
+          </a:fontRef>
+        </p:style>
+      </p:cxnSp>
+      <p:sp>
+        <p:nvSpPr>
+          <p:cNvPr id="72" name="テキスト ボックス 71">
+            <a:extLst>
+              <a:ext uri="{FF2B5EF4-FFF2-40B4-BE49-F238E27FC236}">
+                <a16:creationId xmlns:a16="http://schemas.microsoft.com/office/drawing/2014/main" id="{0CC58562-803D-3843-896D-0FB893D4352B}"/>
+              </a:ext>
+            </a:extLst>
+          </p:cNvPr>
+          <p:cNvSpPr txBox="1"/>
+          <p:nvPr/>
+        </p:nvSpPr>
+        <p:spPr>
+          <a:xfrm>
+            <a:off x="7333995" y="4013996"/>
+            <a:ext cx="245580" cy="230832"/>
+          </a:xfrm>
+          <a:prstGeom prst="rect">
+            <a:avLst/>
+          </a:prstGeom>
+          <a:noFill/>
+        </p:spPr>
+        <p:txBody>
+          <a:bodyPr wrap="none" rtlCol="0" anchor="ctr">
+            <a:spAutoFit/>
+          </a:bodyPr>
+          <a:lstStyle/>
+          <a:p>
+            <a:pPr algn="ctr"/>
+            <a:r>
+              <a:rPr lang="en-US" altLang="ja-JP" sz="900" dirty="0"/>
+              <a:t>1</a:t>
+            </a:r>
+            <a:endParaRPr kumimoji="1" lang="ja-JP" altLang="en-US" sz="900"/>
+          </a:p>
+        </p:txBody>
+      </p:sp>
+      <p:sp>
+        <p:nvSpPr>
+          <p:cNvPr id="73" name="テキスト ボックス 72">
+            <a:extLst>
+              <a:ext uri="{FF2B5EF4-FFF2-40B4-BE49-F238E27FC236}">
+                <a16:creationId xmlns:a16="http://schemas.microsoft.com/office/drawing/2014/main" id="{D7D940A8-C1C1-FD40-BF86-0A905637D70D}"/>
+              </a:ext>
+            </a:extLst>
+          </p:cNvPr>
+          <p:cNvSpPr txBox="1"/>
+          <p:nvPr/>
+        </p:nvSpPr>
+        <p:spPr>
+          <a:xfrm>
+            <a:off x="7333995" y="2815045"/>
+            <a:ext cx="245580" cy="253915"/>
+          </a:xfrm>
+          <a:prstGeom prst="rect">
+            <a:avLst/>
+          </a:prstGeom>
+          <a:noFill/>
+        </p:spPr>
+        <p:txBody>
+          <a:bodyPr wrap="none" rtlCol="0" anchor="ctr">
+            <a:spAutoFit/>
+          </a:bodyPr>
+          <a:lstStyle/>
+          <a:p>
+            <a:pPr algn="ctr"/>
+            <a:r>
+              <a:rPr lang="en-US" altLang="ja-JP" sz="900" dirty="0"/>
+              <a:t>n</a:t>
+            </a:r>
+            <a:endParaRPr kumimoji="1" lang="ja-JP" altLang="en-US" sz="900"/>
+          </a:p>
+        </p:txBody>
+      </p:sp>
+      <p:sp>
+        <p:nvSpPr>
+          <p:cNvPr id="74" name="テキスト ボックス 73">
+            <a:extLst>
+              <a:ext uri="{FF2B5EF4-FFF2-40B4-BE49-F238E27FC236}">
+                <a16:creationId xmlns:a16="http://schemas.microsoft.com/office/drawing/2014/main" id="{6706CFAA-B7AA-D44D-880A-B805B33B0DA6}"/>
+              </a:ext>
+            </a:extLst>
+          </p:cNvPr>
+          <p:cNvSpPr txBox="1"/>
+          <p:nvPr/>
+        </p:nvSpPr>
+        <p:spPr>
+          <a:xfrm>
+            <a:off x="4932040" y="4013996"/>
+            <a:ext cx="245580" cy="230832"/>
+          </a:xfrm>
+          <a:prstGeom prst="rect">
+            <a:avLst/>
+          </a:prstGeom>
+          <a:noFill/>
+        </p:spPr>
+        <p:txBody>
+          <a:bodyPr wrap="none" rtlCol="0" anchor="ctr">
+            <a:spAutoFit/>
+          </a:bodyPr>
+          <a:lstStyle/>
+          <a:p>
+            <a:pPr algn="ctr"/>
+            <a:r>
+              <a:rPr lang="en-US" altLang="ja-JP" sz="900" dirty="0"/>
+              <a:t>n</a:t>
+            </a:r>
+            <a:endParaRPr kumimoji="1" lang="ja-JP" altLang="en-US" sz="900"/>
+          </a:p>
+        </p:txBody>
+      </p:sp>
+      <p:sp>
+        <p:nvSpPr>
+          <p:cNvPr id="78" name="円柱 77">
+            <a:extLst>
+              <a:ext uri="{FF2B5EF4-FFF2-40B4-BE49-F238E27FC236}">
+                <a16:creationId xmlns:a16="http://schemas.microsoft.com/office/drawing/2014/main" id="{F9EAACC6-2DE0-0744-976C-003EBC557E2E}"/>
+              </a:ext>
+            </a:extLst>
+          </p:cNvPr>
+          <p:cNvSpPr/>
+          <p:nvPr/>
+        </p:nvSpPr>
+        <p:spPr>
+          <a:xfrm>
+            <a:off x="5800540" y="4015973"/>
+            <a:ext cx="968400" cy="462074"/>
+          </a:xfrm>
+          <a:prstGeom prst="can">
+            <a:avLst/>
+          </a:prstGeom>
+          <a:solidFill>
+            <a:schemeClr val="accent1">
+              <a:lumMod val="20000"/>
+              <a:lumOff val="80000"/>
+            </a:schemeClr>
+          </a:solidFill>
+          <a:ln>
+            <a:solidFill>
+              <a:schemeClr val="tx1">
+                <a:lumMod val="75000"/>
+                <a:lumOff val="25000"/>
+              </a:schemeClr>
+            </a:solidFill>
+          </a:ln>
+        </p:spPr>
+        <p:style>
+          <a:lnRef idx="2">
+            <a:schemeClr val="accent1">
+              <a:shade val="50000"/>
+            </a:schemeClr>
+          </a:lnRef>
+          <a:fillRef idx="1">
+            <a:schemeClr val="accent1"/>
+          </a:fillRef>
+          <a:effectRef idx="0">
+            <a:schemeClr val="accent1"/>
+          </a:effectRef>
+          <a:fontRef idx="minor">
+            <a:schemeClr val="lt1"/>
+          </a:fontRef>
+        </p:style>
+        <p:txBody>
+          <a:bodyPr wrap="none" lIns="36000" tIns="36000" rIns="36000" bIns="36000" rtlCol="0" anchor="ctr"/>
+          <a:lstStyle/>
+          <a:p>
+            <a:pPr algn="ctr"/>
+            <a:r>
+              <a:rPr kumimoji="1" lang="en-US" altLang="ja-JP" sz="1200" dirty="0" err="1">
+                <a:solidFill>
+                  <a:schemeClr val="tx1">
+                    <a:lumMod val="75000"/>
+                    <a:lumOff val="25000"/>
+                  </a:schemeClr>
+                </a:solidFill>
+              </a:rPr>
+              <a:t>Bookshelfs</a:t>
+            </a:r>
+            <a:endParaRPr kumimoji="1" lang="en-US" altLang="ja-JP" sz="1200" dirty="0">
+              <a:solidFill>
+                <a:schemeClr val="tx1">
+                  <a:lumMod val="75000"/>
+                  <a:lumOff val="25000"/>
+                </a:schemeClr>
+              </a:solidFill>
+            </a:endParaRPr>
+          </a:p>
+          <a:p>
+            <a:pPr algn="ctr"/>
+            <a:r>
+              <a:rPr lang="en-US" altLang="ja-JP" sz="1200" dirty="0">
+                <a:solidFill>
+                  <a:schemeClr val="tx1">
+                    <a:lumMod val="75000"/>
+                    <a:lumOff val="25000"/>
+                  </a:schemeClr>
+                </a:solidFill>
+              </a:rPr>
+              <a:t>Scraped Codes</a:t>
+            </a:r>
+            <a:endParaRPr kumimoji="1" lang="ja-JP" altLang="en-US" sz="1200">
+              <a:solidFill>
+                <a:schemeClr val="tx1">
+                  <a:lumMod val="75000"/>
+                  <a:lumOff val="25000"/>
+                </a:schemeClr>
+              </a:solidFill>
+            </a:endParaRPr>
+          </a:p>
+        </p:txBody>
+      </p:sp>
+      <p:sp>
+        <p:nvSpPr>
+          <p:cNvPr id="79" name="テキスト ボックス 78">
+            <a:extLst>
+              <a:ext uri="{FF2B5EF4-FFF2-40B4-BE49-F238E27FC236}">
+                <a16:creationId xmlns:a16="http://schemas.microsoft.com/office/drawing/2014/main" id="{5A67DD3D-26C8-374F-8514-22A47BA63363}"/>
+              </a:ext>
+            </a:extLst>
+          </p:cNvPr>
+          <p:cNvSpPr txBox="1"/>
+          <p:nvPr/>
+        </p:nvSpPr>
+        <p:spPr>
+          <a:xfrm>
+            <a:off x="6768940" y="4013996"/>
+            <a:ext cx="245580" cy="230832"/>
+          </a:xfrm>
+          <a:prstGeom prst="rect">
+            <a:avLst/>
+          </a:prstGeom>
+          <a:noFill/>
+        </p:spPr>
+        <p:txBody>
+          <a:bodyPr wrap="none" rtlCol="0" anchor="ctr">
+            <a:spAutoFit/>
+          </a:bodyPr>
+          <a:lstStyle/>
+          <a:p>
+            <a:pPr algn="ctr"/>
+            <a:r>
+              <a:rPr lang="en-US" altLang="ja-JP" sz="900" dirty="0"/>
+              <a:t>n</a:t>
+            </a:r>
+            <a:endParaRPr kumimoji="1" lang="ja-JP" altLang="en-US" sz="900"/>
+          </a:p>
+        </p:txBody>
+      </p:sp>
+      <p:sp>
+        <p:nvSpPr>
+          <p:cNvPr id="80" name="テキスト ボックス 79">
+            <a:extLst>
+              <a:ext uri="{FF2B5EF4-FFF2-40B4-BE49-F238E27FC236}">
+                <a16:creationId xmlns:a16="http://schemas.microsoft.com/office/drawing/2014/main" id="{ED328B3B-6FDC-C044-BFD6-52A2BFD9C00D}"/>
+              </a:ext>
+            </a:extLst>
+          </p:cNvPr>
+          <p:cNvSpPr txBox="1"/>
+          <p:nvPr/>
+        </p:nvSpPr>
+        <p:spPr>
+          <a:xfrm>
+            <a:off x="5563796" y="4013996"/>
+            <a:ext cx="245580" cy="230832"/>
+          </a:xfrm>
+          <a:prstGeom prst="rect">
+            <a:avLst/>
+          </a:prstGeom>
+          <a:noFill/>
+        </p:spPr>
+        <p:txBody>
+          <a:bodyPr wrap="none" rtlCol="0" anchor="ctr">
+            <a:spAutoFit/>
+          </a:bodyPr>
+          <a:lstStyle/>
+          <a:p>
+            <a:pPr algn="ctr"/>
+            <a:r>
+              <a:rPr lang="en-US" altLang="ja-JP" sz="900" dirty="0"/>
+              <a:t>n</a:t>
+            </a:r>
+            <a:endParaRPr kumimoji="1" lang="ja-JP" altLang="en-US" sz="900"/>
+          </a:p>
+        </p:txBody>
+      </p:sp>
+      <p:cxnSp>
+        <p:nvCxnSpPr>
+          <p:cNvPr id="82" name="直線コネクタ 81">
+            <a:extLst>
+              <a:ext uri="{FF2B5EF4-FFF2-40B4-BE49-F238E27FC236}">
+                <a16:creationId xmlns:a16="http://schemas.microsoft.com/office/drawing/2014/main" id="{0338DD1D-0C8B-9E4C-BFE7-0AC8609E02C4}"/>
+              </a:ext>
+            </a:extLst>
+          </p:cNvPr>
+          <p:cNvCxnSpPr>
+            <a:cxnSpLocks/>
+            <a:stCxn id="6" idx="4"/>
+            <a:endCxn id="78" idx="2"/>
+          </p:cNvCxnSpPr>
+          <p:nvPr/>
+        </p:nvCxnSpPr>
+        <p:spPr>
+          <a:xfrm>
+            <a:off x="4932041" y="4247010"/>
+            <a:ext cx="868499" cy="0"/>
+          </a:xfrm>
+          <a:prstGeom prst="line">
+            <a:avLst/>
+          </a:prstGeom>
+          <a:ln>
+            <a:solidFill>
+              <a:schemeClr val="tx1">
+                <a:lumMod val="75000"/>
+                <a:lumOff val="25000"/>
+              </a:schemeClr>
+            </a:solidFill>
+            <a:prstDash val="solid"/>
+            <a:headEnd type="none" w="med" len="med"/>
+            <a:tailEnd type="none" w="med" len="med"/>
+          </a:ln>
+        </p:spPr>
+        <p:style>
+          <a:lnRef idx="1">
+            <a:schemeClr val="accent1"/>
+          </a:lnRef>
+          <a:fillRef idx="0">
+            <a:schemeClr val="accent1"/>
+          </a:fillRef>
+          <a:effectRef idx="0">
+            <a:schemeClr val="accent1"/>
+          </a:effectRef>
+          <a:fontRef idx="minor">
+            <a:schemeClr val="tx1"/>
+          </a:fontRef>
+        </p:style>
+      </p:cxnSp>
+      <p:cxnSp>
+        <p:nvCxnSpPr>
+          <p:cNvPr id="85" name="カギ線コネクタ 84">
+            <a:extLst>
+              <a:ext uri="{FF2B5EF4-FFF2-40B4-BE49-F238E27FC236}">
+                <a16:creationId xmlns:a16="http://schemas.microsoft.com/office/drawing/2014/main" id="{E62CD2F2-D55B-1449-BAE4-3B6247ECCC66}"/>
+              </a:ext>
+            </a:extLst>
+          </p:cNvPr>
+          <p:cNvCxnSpPr>
+            <a:cxnSpLocks/>
+            <a:stCxn id="40" idx="3"/>
+            <a:endCxn id="88" idx="4"/>
+          </p:cNvCxnSpPr>
+          <p:nvPr/>
+        </p:nvCxnSpPr>
+        <p:spPr>
+          <a:xfrm rot="5400000">
+            <a:off x="6362428" y="3979528"/>
+            <a:ext cx="1613997" cy="800972"/>
+          </a:xfrm>
+          <a:prstGeom prst="bentConnector2">
+            <a:avLst/>
+          </a:prstGeom>
+          <a:ln>
+            <a:solidFill>
+              <a:schemeClr val="tx1">
+                <a:lumMod val="75000"/>
+                <a:lumOff val="25000"/>
+              </a:schemeClr>
+            </a:solidFill>
+            <a:headEnd type="none" w="med" len="med"/>
+            <a:tailEnd type="none" w="med" len="med"/>
+          </a:ln>
+        </p:spPr>
+        <p:style>
+          <a:lnRef idx="1">
+            <a:schemeClr val="accent1"/>
+          </a:lnRef>
+          <a:fillRef idx="0">
+            <a:schemeClr val="accent1"/>
+          </a:fillRef>
+          <a:effectRef idx="0">
+            <a:schemeClr val="accent1"/>
+          </a:effectRef>
+          <a:fontRef idx="minor">
+            <a:schemeClr val="tx1"/>
+          </a:fontRef>
+        </p:style>
+      </p:cxnSp>
+      <p:sp>
+        <p:nvSpPr>
+          <p:cNvPr id="86" name="テキスト ボックス 85">
+            <a:extLst>
+              <a:ext uri="{FF2B5EF4-FFF2-40B4-BE49-F238E27FC236}">
+                <a16:creationId xmlns:a16="http://schemas.microsoft.com/office/drawing/2014/main" id="{BD64E04A-4342-BD48-B22B-05486BA72009}"/>
+              </a:ext>
+            </a:extLst>
+          </p:cNvPr>
+          <p:cNvSpPr txBox="1"/>
+          <p:nvPr/>
+        </p:nvSpPr>
+        <p:spPr>
+          <a:xfrm>
+            <a:off x="7333995" y="4953999"/>
+            <a:ext cx="245580" cy="230832"/>
+          </a:xfrm>
+          <a:prstGeom prst="rect">
+            <a:avLst/>
+          </a:prstGeom>
+          <a:noFill/>
+        </p:spPr>
+        <p:txBody>
+          <a:bodyPr wrap="none" rtlCol="0" anchor="ctr">
+            <a:spAutoFit/>
+          </a:bodyPr>
+          <a:lstStyle/>
+          <a:p>
+            <a:pPr algn="ctr"/>
+            <a:r>
+              <a:rPr lang="en-US" altLang="ja-JP" sz="900" dirty="0"/>
+              <a:t>1</a:t>
+            </a:r>
+            <a:endParaRPr kumimoji="1" lang="ja-JP" altLang="en-US" sz="900"/>
+          </a:p>
+        </p:txBody>
+      </p:sp>
+      <p:sp>
+        <p:nvSpPr>
+          <p:cNvPr id="87" name="テキスト ボックス 86">
+            <a:extLst>
+              <a:ext uri="{FF2B5EF4-FFF2-40B4-BE49-F238E27FC236}">
+                <a16:creationId xmlns:a16="http://schemas.microsoft.com/office/drawing/2014/main" id="{EF153C8B-D720-9449-949B-6E875E471A3F}"/>
+              </a:ext>
+            </a:extLst>
+          </p:cNvPr>
+          <p:cNvSpPr txBox="1"/>
+          <p:nvPr/>
+        </p:nvSpPr>
+        <p:spPr>
+          <a:xfrm>
+            <a:off x="4932040" y="4953999"/>
+            <a:ext cx="245580" cy="230832"/>
+          </a:xfrm>
+          <a:prstGeom prst="rect">
+            <a:avLst/>
+          </a:prstGeom>
+          <a:noFill/>
+        </p:spPr>
+        <p:txBody>
+          <a:bodyPr wrap="none" rtlCol="0" anchor="ctr">
+            <a:spAutoFit/>
+          </a:bodyPr>
+          <a:lstStyle/>
+          <a:p>
+            <a:pPr algn="ctr"/>
+            <a:r>
+              <a:rPr lang="en-US" altLang="ja-JP" sz="900" dirty="0"/>
+              <a:t>n</a:t>
+            </a:r>
+            <a:endParaRPr kumimoji="1" lang="ja-JP" altLang="en-US" sz="900"/>
+          </a:p>
+        </p:txBody>
+      </p:sp>
+      <p:sp>
+        <p:nvSpPr>
+          <p:cNvPr id="88" name="円柱 87">
+            <a:extLst>
+              <a:ext uri="{FF2B5EF4-FFF2-40B4-BE49-F238E27FC236}">
+                <a16:creationId xmlns:a16="http://schemas.microsoft.com/office/drawing/2014/main" id="{045447EB-4AFF-424B-9653-4CA58489B606}"/>
+              </a:ext>
+            </a:extLst>
+          </p:cNvPr>
+          <p:cNvSpPr/>
+          <p:nvPr/>
+        </p:nvSpPr>
+        <p:spPr>
+          <a:xfrm>
+            <a:off x="5800540" y="4955976"/>
+            <a:ext cx="968400" cy="462074"/>
+          </a:xfrm>
+          <a:prstGeom prst="can">
+            <a:avLst/>
+          </a:prstGeom>
+          <a:solidFill>
+            <a:schemeClr val="accent1">
+              <a:lumMod val="20000"/>
+              <a:lumOff val="80000"/>
+            </a:schemeClr>
+          </a:solidFill>
+          <a:ln>
+            <a:solidFill>
+              <a:schemeClr val="tx1">
+                <a:lumMod val="75000"/>
+                <a:lumOff val="25000"/>
+              </a:schemeClr>
+            </a:solidFill>
+          </a:ln>
+        </p:spPr>
+        <p:style>
+          <a:lnRef idx="2">
+            <a:schemeClr val="accent1">
+              <a:shade val="50000"/>
+            </a:schemeClr>
+          </a:lnRef>
+          <a:fillRef idx="1">
+            <a:schemeClr val="accent1"/>
+          </a:fillRef>
+          <a:effectRef idx="0">
+            <a:schemeClr val="accent1"/>
+          </a:effectRef>
+          <a:fontRef idx="minor">
+            <a:schemeClr val="lt1"/>
+          </a:fontRef>
+        </p:style>
+        <p:txBody>
+          <a:bodyPr wrap="none" lIns="36000" tIns="36000" rIns="36000" bIns="36000" rtlCol="0" anchor="ctr"/>
+          <a:lstStyle/>
+          <a:p>
+            <a:pPr algn="ctr"/>
+            <a:r>
+              <a:rPr kumimoji="1" lang="en-US" altLang="ja-JP" sz="1200" dirty="0" err="1">
+                <a:solidFill>
+                  <a:schemeClr val="tx1">
+                    <a:lumMod val="75000"/>
+                    <a:lumOff val="25000"/>
+                  </a:schemeClr>
+                </a:solidFill>
+              </a:rPr>
+              <a:t>Bookshelfs</a:t>
+            </a:r>
+            <a:endParaRPr kumimoji="1" lang="en-US" altLang="ja-JP" sz="1200" dirty="0">
+              <a:solidFill>
+                <a:schemeClr val="tx1">
+                  <a:lumMod val="75000"/>
+                  <a:lumOff val="25000"/>
+                </a:schemeClr>
+              </a:solidFill>
+            </a:endParaRPr>
+          </a:p>
+          <a:p>
+            <a:pPr algn="ctr"/>
+            <a:r>
+              <a:rPr lang="en-US" altLang="ja-JP" sz="1200" dirty="0">
+                <a:solidFill>
+                  <a:schemeClr val="tx1">
+                    <a:lumMod val="75000"/>
+                    <a:lumOff val="25000"/>
+                  </a:schemeClr>
+                </a:solidFill>
+              </a:rPr>
+              <a:t>Diff Codes</a:t>
+            </a:r>
+            <a:endParaRPr kumimoji="1" lang="ja-JP" altLang="en-US" sz="1200">
+              <a:solidFill>
+                <a:schemeClr val="tx1">
+                  <a:lumMod val="75000"/>
+                  <a:lumOff val="25000"/>
+                </a:schemeClr>
+              </a:solidFill>
+            </a:endParaRPr>
+          </a:p>
+        </p:txBody>
+      </p:sp>
+      <p:sp>
+        <p:nvSpPr>
+          <p:cNvPr id="89" name="テキスト ボックス 88">
+            <a:extLst>
+              <a:ext uri="{FF2B5EF4-FFF2-40B4-BE49-F238E27FC236}">
+                <a16:creationId xmlns:a16="http://schemas.microsoft.com/office/drawing/2014/main" id="{6FC6545D-6BAA-9C4D-BBE0-FBF932D20C6E}"/>
+              </a:ext>
+            </a:extLst>
+          </p:cNvPr>
+          <p:cNvSpPr txBox="1"/>
+          <p:nvPr/>
+        </p:nvSpPr>
+        <p:spPr>
+          <a:xfrm>
+            <a:off x="6768940" y="4953999"/>
+            <a:ext cx="245580" cy="230832"/>
+          </a:xfrm>
+          <a:prstGeom prst="rect">
+            <a:avLst/>
+          </a:prstGeom>
+          <a:noFill/>
+        </p:spPr>
+        <p:txBody>
+          <a:bodyPr wrap="none" rtlCol="0" anchor="ctr">
+            <a:spAutoFit/>
+          </a:bodyPr>
+          <a:lstStyle/>
+          <a:p>
+            <a:pPr algn="ctr"/>
+            <a:r>
+              <a:rPr lang="en-US" altLang="ja-JP" sz="900" dirty="0"/>
+              <a:t>n</a:t>
+            </a:r>
+            <a:endParaRPr kumimoji="1" lang="ja-JP" altLang="en-US" sz="900"/>
+          </a:p>
+        </p:txBody>
+      </p:sp>
+      <p:sp>
+        <p:nvSpPr>
+          <p:cNvPr id="90" name="テキスト ボックス 89">
+            <a:extLst>
+              <a:ext uri="{FF2B5EF4-FFF2-40B4-BE49-F238E27FC236}">
+                <a16:creationId xmlns:a16="http://schemas.microsoft.com/office/drawing/2014/main" id="{C1BA62BF-31B9-2D42-BE43-5FA590578652}"/>
+              </a:ext>
+            </a:extLst>
+          </p:cNvPr>
+          <p:cNvSpPr txBox="1"/>
+          <p:nvPr/>
+        </p:nvSpPr>
+        <p:spPr>
+          <a:xfrm>
+            <a:off x="5563796" y="4953999"/>
+            <a:ext cx="245580" cy="230832"/>
+          </a:xfrm>
+          <a:prstGeom prst="rect">
+            <a:avLst/>
+          </a:prstGeom>
+          <a:noFill/>
+        </p:spPr>
+        <p:txBody>
+          <a:bodyPr wrap="none" rtlCol="0" anchor="ctr">
+            <a:spAutoFit/>
+          </a:bodyPr>
+          <a:lstStyle/>
+          <a:p>
+            <a:pPr algn="ctr"/>
+            <a:r>
+              <a:rPr kumimoji="1" lang="en-US" altLang="ja-JP" sz="900" dirty="0"/>
+              <a:t>n</a:t>
+            </a:r>
+            <a:endParaRPr kumimoji="1" lang="ja-JP" altLang="en-US" sz="900"/>
+          </a:p>
+        </p:txBody>
+      </p:sp>
+      <p:cxnSp>
+        <p:nvCxnSpPr>
+          <p:cNvPr id="91" name="直線コネクタ 90">
+            <a:extLst>
+              <a:ext uri="{FF2B5EF4-FFF2-40B4-BE49-F238E27FC236}">
+                <a16:creationId xmlns:a16="http://schemas.microsoft.com/office/drawing/2014/main" id="{9B7CCBD7-3590-C54D-90D2-71D001527AA6}"/>
+              </a:ext>
+            </a:extLst>
+          </p:cNvPr>
+          <p:cNvCxnSpPr>
+            <a:cxnSpLocks/>
+            <a:stCxn id="7" idx="4"/>
+            <a:endCxn id="88" idx="2"/>
+          </p:cNvCxnSpPr>
+          <p:nvPr/>
+        </p:nvCxnSpPr>
+        <p:spPr>
+          <a:xfrm>
+            <a:off x="4932041" y="5187013"/>
+            <a:ext cx="868499" cy="0"/>
+          </a:xfrm>
+          <a:prstGeom prst="line">
+            <a:avLst/>
+          </a:prstGeom>
+          <a:ln>
+            <a:solidFill>
+              <a:schemeClr val="tx1">
+                <a:lumMod val="75000"/>
+                <a:lumOff val="25000"/>
+              </a:schemeClr>
+            </a:solidFill>
+            <a:prstDash val="solid"/>
+            <a:headEnd type="none" w="med" len="med"/>
+            <a:tailEnd type="none" w="med" len="med"/>
+          </a:ln>
+        </p:spPr>
+        <p:style>
+          <a:lnRef idx="1">
+            <a:schemeClr val="accent1"/>
+          </a:lnRef>
+          <a:fillRef idx="0">
+            <a:schemeClr val="accent1"/>
+          </a:fillRef>
+          <a:effectRef idx="0">
+            <a:schemeClr val="accent1"/>
+          </a:effectRef>
+          <a:fontRef idx="minor">
+            <a:schemeClr val="tx1"/>
+          </a:fontRef>
+        </p:style>
+      </p:cxnSp>
+      <p:sp>
+        <p:nvSpPr>
+          <p:cNvPr id="96" name="正方形/長方形 95">
+            <a:extLst>
+              <a:ext uri="{FF2B5EF4-FFF2-40B4-BE49-F238E27FC236}">
+                <a16:creationId xmlns:a16="http://schemas.microsoft.com/office/drawing/2014/main" id="{3B5E03EA-F5B1-884D-8DB4-8F4321FA4CBE}"/>
+              </a:ext>
+            </a:extLst>
+          </p:cNvPr>
+          <p:cNvSpPr/>
+          <p:nvPr/>
+        </p:nvSpPr>
+        <p:spPr>
+          <a:xfrm>
+            <a:off x="682324" y="1340768"/>
+            <a:ext cx="7562083" cy="1687454"/>
+          </a:xfrm>
+          <a:prstGeom prst="rect">
+            <a:avLst/>
+          </a:prstGeom>
+          <a:noFill/>
+          <a:ln>
+            <a:solidFill>
+              <a:schemeClr val="tx1">
+                <a:lumMod val="75000"/>
+                <a:lumOff val="25000"/>
+              </a:schemeClr>
+            </a:solidFill>
+            <a:prstDash val="dash"/>
+          </a:ln>
+        </p:spPr>
+        <p:style>
+          <a:lnRef idx="2">
+            <a:schemeClr val="accent1">
+              <a:shade val="50000"/>
+            </a:schemeClr>
+          </a:lnRef>
+          <a:fillRef idx="1">
+            <a:schemeClr val="accent1"/>
+          </a:fillRef>
+          <a:effectRef idx="0">
+            <a:schemeClr val="accent1"/>
+          </a:effectRef>
+          <a:fontRef idx="minor">
+            <a:schemeClr val="lt1"/>
+          </a:fontRef>
+        </p:style>
+        <p:txBody>
+          <a:bodyPr wrap="none" lIns="36000" tIns="36000" rIns="36000" bIns="36000" rtlCol="0" anchor="ctr"/>
+          <a:lstStyle/>
+          <a:p>
+            <a:pPr algn="ctr"/>
+            <a:endParaRPr kumimoji="1" lang="ja-JP" altLang="en-US" sz="1200">
+              <a:solidFill>
+                <a:schemeClr val="tx1">
+                  <a:lumMod val="75000"/>
+                  <a:lumOff val="25000"/>
+                </a:schemeClr>
+              </a:solidFill>
+            </a:endParaRPr>
+          </a:p>
+        </p:txBody>
+      </p:sp>
+      <p:sp>
+        <p:nvSpPr>
+          <p:cNvPr id="97" name="テキスト ボックス 96">
+            <a:extLst>
+              <a:ext uri="{FF2B5EF4-FFF2-40B4-BE49-F238E27FC236}">
+                <a16:creationId xmlns:a16="http://schemas.microsoft.com/office/drawing/2014/main" id="{A40BCEA5-6117-824D-B2C3-16C6D933F67D}"/>
+              </a:ext>
+            </a:extLst>
+          </p:cNvPr>
+          <p:cNvSpPr txBox="1"/>
+          <p:nvPr/>
+        </p:nvSpPr>
+        <p:spPr>
+          <a:xfrm>
+            <a:off x="4674523" y="1065369"/>
+            <a:ext cx="1383534" cy="276999"/>
+          </a:xfrm>
+          <a:prstGeom prst="rect">
+            <a:avLst/>
+          </a:prstGeom>
+          <a:noFill/>
+        </p:spPr>
+        <p:txBody>
+          <a:bodyPr wrap="square" rtlCol="0">
+            <a:spAutoFit/>
+          </a:bodyPr>
+          <a:lstStyle/>
+          <a:p>
+            <a:pPr algn="ctr"/>
+            <a:r>
+              <a:rPr kumimoji="1" lang="en-US" altLang="ja-JP" sz="1200" dirty="0"/>
+              <a:t>Phase2</a:t>
+            </a:r>
+            <a:endParaRPr kumimoji="1" lang="ja-JP" altLang="en-US" sz="1200"/>
+          </a:p>
+        </p:txBody>
+      </p:sp>
+      <p:sp>
+        <p:nvSpPr>
+          <p:cNvPr id="98" name="正方形/長方形 97">
+            <a:extLst>
+              <a:ext uri="{FF2B5EF4-FFF2-40B4-BE49-F238E27FC236}">
+                <a16:creationId xmlns:a16="http://schemas.microsoft.com/office/drawing/2014/main" id="{FCD3CF41-CDA6-0542-9546-123517182A0F}"/>
+              </a:ext>
+            </a:extLst>
+          </p:cNvPr>
+          <p:cNvSpPr/>
+          <p:nvPr/>
+        </p:nvSpPr>
+        <p:spPr>
+          <a:xfrm>
+            <a:off x="5409025" y="3091486"/>
+            <a:ext cx="2835383" cy="2569761"/>
+          </a:xfrm>
+          <a:prstGeom prst="rect">
+            <a:avLst/>
+          </a:prstGeom>
+          <a:noFill/>
+          <a:ln>
+            <a:solidFill>
+              <a:schemeClr val="tx1">
+                <a:lumMod val="75000"/>
+                <a:lumOff val="25000"/>
+              </a:schemeClr>
+            </a:solidFill>
+            <a:prstDash val="dash"/>
+          </a:ln>
+        </p:spPr>
+        <p:style>
+          <a:lnRef idx="2">
+            <a:schemeClr val="accent1">
+              <a:shade val="50000"/>
+            </a:schemeClr>
+          </a:lnRef>
+          <a:fillRef idx="1">
+            <a:schemeClr val="accent1"/>
+          </a:fillRef>
+          <a:effectRef idx="0">
+            <a:schemeClr val="accent1"/>
+          </a:effectRef>
+          <a:fontRef idx="minor">
+            <a:schemeClr val="lt1"/>
+          </a:fontRef>
+        </p:style>
+        <p:txBody>
+          <a:bodyPr wrap="none" lIns="36000" tIns="36000" rIns="36000" bIns="36000" rtlCol="0" anchor="ctr"/>
+          <a:lstStyle/>
+          <a:p>
+            <a:pPr algn="ctr"/>
+            <a:endParaRPr kumimoji="1" lang="ja-JP" altLang="en-US" sz="1200">
+              <a:solidFill>
+                <a:schemeClr val="tx1">
+                  <a:lumMod val="75000"/>
+                  <a:lumOff val="25000"/>
+                </a:schemeClr>
+              </a:solidFill>
+            </a:endParaRPr>
+          </a:p>
+        </p:txBody>
+      </p:sp>
+      <p:sp>
+        <p:nvSpPr>
+          <p:cNvPr id="99" name="テキスト ボックス 98">
+            <a:extLst>
+              <a:ext uri="{FF2B5EF4-FFF2-40B4-BE49-F238E27FC236}">
+                <a16:creationId xmlns:a16="http://schemas.microsoft.com/office/drawing/2014/main" id="{57D92E4E-7CE2-3E45-AB2A-AE931A267D9F}"/>
+              </a:ext>
+            </a:extLst>
+          </p:cNvPr>
+          <p:cNvSpPr txBox="1"/>
+          <p:nvPr/>
+        </p:nvSpPr>
+        <p:spPr>
+          <a:xfrm>
+            <a:off x="6186378" y="5679324"/>
+            <a:ext cx="1383534" cy="276999"/>
+          </a:xfrm>
+          <a:prstGeom prst="rect">
+            <a:avLst/>
+          </a:prstGeom>
+          <a:noFill/>
+        </p:spPr>
+        <p:txBody>
+          <a:bodyPr wrap="square" rtlCol="0">
+            <a:spAutoFit/>
+          </a:bodyPr>
+          <a:lstStyle/>
+          <a:p>
+            <a:pPr algn="ctr"/>
+            <a:r>
+              <a:rPr kumimoji="1" lang="en-US" altLang="ja-JP" sz="1200" dirty="0"/>
+              <a:t>Phase3</a:t>
+            </a:r>
+            <a:endParaRPr kumimoji="1" lang="ja-JP" altLang="en-US" sz="1200"/>
+          </a:p>
+        </p:txBody>
+      </p:sp>
+      <p:sp>
+        <p:nvSpPr>
+          <p:cNvPr id="112" name="円柱 111">
+            <a:extLst>
+              <a:ext uri="{FF2B5EF4-FFF2-40B4-BE49-F238E27FC236}">
+                <a16:creationId xmlns:a16="http://schemas.microsoft.com/office/drawing/2014/main" id="{A8EA08AD-F461-9848-BEF2-3FB459335205}"/>
+              </a:ext>
+            </a:extLst>
+          </p:cNvPr>
+          <p:cNvSpPr/>
+          <p:nvPr/>
+        </p:nvSpPr>
+        <p:spPr>
+          <a:xfrm>
+            <a:off x="899592" y="3110942"/>
+            <a:ext cx="968400" cy="462074"/>
+          </a:xfrm>
+          <a:prstGeom prst="can">
+            <a:avLst/>
+          </a:prstGeom>
+          <a:solidFill>
+            <a:schemeClr val="accent1">
+              <a:lumMod val="20000"/>
+              <a:lumOff val="80000"/>
+            </a:schemeClr>
+          </a:solidFill>
+          <a:ln>
+            <a:solidFill>
+              <a:schemeClr val="tx1">
+                <a:lumMod val="75000"/>
+                <a:lumOff val="25000"/>
+              </a:schemeClr>
+            </a:solidFill>
+          </a:ln>
+        </p:spPr>
+        <p:style>
+          <a:lnRef idx="2">
+            <a:schemeClr val="accent1">
+              <a:shade val="50000"/>
+            </a:schemeClr>
+          </a:lnRef>
+          <a:fillRef idx="1">
+            <a:schemeClr val="accent1"/>
+          </a:fillRef>
+          <a:effectRef idx="0">
+            <a:schemeClr val="accent1"/>
+          </a:effectRef>
+          <a:fontRef idx="minor">
+            <a:schemeClr val="lt1"/>
+          </a:fontRef>
+        </p:style>
+        <p:txBody>
+          <a:bodyPr wrap="none" lIns="36000" tIns="36000" rIns="36000" bIns="36000" rtlCol="0" anchor="ctr"/>
+          <a:lstStyle/>
+          <a:p>
+            <a:pPr algn="ctr"/>
+            <a:r>
+              <a:rPr kumimoji="1" lang="en-US" altLang="ja-JP" sz="1200" dirty="0">
+                <a:solidFill>
+                  <a:schemeClr val="tx1">
+                    <a:lumMod val="75000"/>
+                    <a:lumOff val="25000"/>
+                  </a:schemeClr>
+                </a:solidFill>
+              </a:rPr>
+              <a:t>Scraping </a:t>
+            </a:r>
+            <a:r>
+              <a:rPr lang="en-US" altLang="ja-JP" sz="1200" dirty="0">
+                <a:solidFill>
+                  <a:schemeClr val="tx1">
+                    <a:lumMod val="75000"/>
+                    <a:lumOff val="25000"/>
+                  </a:schemeClr>
+                </a:solidFill>
+              </a:rPr>
+              <a:t>Page</a:t>
+            </a:r>
+            <a:endParaRPr kumimoji="1" lang="ja-JP" altLang="en-US" sz="1200">
+              <a:solidFill>
+                <a:schemeClr val="tx1">
+                  <a:lumMod val="75000"/>
+                  <a:lumOff val="25000"/>
+                </a:schemeClr>
+              </a:solidFill>
+            </a:endParaRPr>
+          </a:p>
+        </p:txBody>
+      </p:sp>
+      <p:cxnSp>
+        <p:nvCxnSpPr>
+          <p:cNvPr id="118" name="カギ線コネクタ 117">
+            <a:extLst>
+              <a:ext uri="{FF2B5EF4-FFF2-40B4-BE49-F238E27FC236}">
+                <a16:creationId xmlns:a16="http://schemas.microsoft.com/office/drawing/2014/main" id="{5243C7CA-791F-524A-8BF4-6478CE67DC2A}"/>
+              </a:ext>
+            </a:extLst>
+          </p:cNvPr>
+          <p:cNvCxnSpPr>
+            <a:cxnSpLocks/>
+            <a:stCxn id="45" idx="3"/>
+            <a:endCxn id="112" idx="1"/>
+          </p:cNvCxnSpPr>
+          <p:nvPr/>
+        </p:nvCxnSpPr>
+        <p:spPr>
+          <a:xfrm rot="5400000">
+            <a:off x="2853979" y="548680"/>
+            <a:ext cx="1092076" cy="4032449"/>
+          </a:xfrm>
+          <a:prstGeom prst="bentConnector3">
+            <a:avLst>
+              <a:gd name="adj1" fmla="val 50000"/>
+            </a:avLst>
+          </a:prstGeom>
+          <a:ln>
+            <a:solidFill>
+              <a:schemeClr val="tx1">
+                <a:lumMod val="75000"/>
+                <a:lumOff val="25000"/>
+              </a:schemeClr>
+            </a:solidFill>
+            <a:headEnd type="none" w="med" len="med"/>
+            <a:tailEnd type="none" w="med" len="med"/>
+          </a:ln>
+        </p:spPr>
+        <p:style>
+          <a:lnRef idx="1">
+            <a:schemeClr val="accent1"/>
+          </a:lnRef>
+          <a:fillRef idx="0">
+            <a:schemeClr val="accent1"/>
+          </a:fillRef>
+          <a:effectRef idx="0">
+            <a:schemeClr val="accent1"/>
+          </a:effectRef>
+          <a:fontRef idx="minor">
+            <a:schemeClr val="tx1"/>
+          </a:fontRef>
+        </p:style>
+      </p:cxnSp>
+      <p:sp>
+        <p:nvSpPr>
+          <p:cNvPr id="123" name="テキスト ボックス 122">
+            <a:extLst>
+              <a:ext uri="{FF2B5EF4-FFF2-40B4-BE49-F238E27FC236}">
+                <a16:creationId xmlns:a16="http://schemas.microsoft.com/office/drawing/2014/main" id="{0777E560-A1DA-8A4F-A754-FD2F46103F30}"/>
+              </a:ext>
+            </a:extLst>
+          </p:cNvPr>
+          <p:cNvSpPr txBox="1"/>
+          <p:nvPr/>
+        </p:nvSpPr>
+        <p:spPr>
+          <a:xfrm>
+            <a:off x="1400537" y="2780928"/>
+            <a:ext cx="245580" cy="230832"/>
+          </a:xfrm>
+          <a:prstGeom prst="rect">
+            <a:avLst/>
+          </a:prstGeom>
+          <a:noFill/>
+        </p:spPr>
+        <p:txBody>
+          <a:bodyPr wrap="none" rtlCol="0" anchor="ctr">
+            <a:spAutoFit/>
+          </a:bodyPr>
+          <a:lstStyle/>
+          <a:p>
+            <a:pPr algn="ctr"/>
+            <a:r>
+              <a:rPr lang="en-US" altLang="ja-JP" sz="900" dirty="0"/>
+              <a:t>1</a:t>
+            </a:r>
+            <a:endParaRPr kumimoji="1" lang="ja-JP" altLang="en-US" sz="900"/>
+          </a:p>
+        </p:txBody>
+      </p:sp>
+      <p:sp>
+        <p:nvSpPr>
+          <p:cNvPr id="124" name="テキスト ボックス 123">
+            <a:extLst>
+              <a:ext uri="{FF2B5EF4-FFF2-40B4-BE49-F238E27FC236}">
+                <a16:creationId xmlns:a16="http://schemas.microsoft.com/office/drawing/2014/main" id="{DDE42188-7BD0-D740-A0F7-9A33683A4F8D}"/>
+              </a:ext>
+            </a:extLst>
+          </p:cNvPr>
+          <p:cNvSpPr txBox="1"/>
+          <p:nvPr/>
+        </p:nvSpPr>
+        <p:spPr>
+          <a:xfrm>
+            <a:off x="1400537" y="2566555"/>
+            <a:ext cx="245580" cy="230832"/>
+          </a:xfrm>
+          <a:prstGeom prst="rect">
+            <a:avLst/>
+          </a:prstGeom>
+          <a:noFill/>
+        </p:spPr>
+        <p:txBody>
+          <a:bodyPr wrap="none" rtlCol="0" anchor="ctr">
+            <a:spAutoFit/>
+          </a:bodyPr>
+          <a:lstStyle/>
+          <a:p>
+            <a:pPr algn="ctr"/>
+            <a:r>
+              <a:rPr lang="en-US" altLang="ja-JP" sz="900" dirty="0"/>
+              <a:t>n</a:t>
+            </a:r>
+            <a:endParaRPr kumimoji="1" lang="ja-JP" altLang="en-US" sz="900"/>
+          </a:p>
+        </p:txBody>
+      </p:sp>
+      <p:sp>
+        <p:nvSpPr>
+          <p:cNvPr id="126" name="テキスト ボックス 125">
+            <a:extLst>
+              <a:ext uri="{FF2B5EF4-FFF2-40B4-BE49-F238E27FC236}">
+                <a16:creationId xmlns:a16="http://schemas.microsoft.com/office/drawing/2014/main" id="{9394B97D-CFF4-1348-B3A3-E8F79B643C64}"/>
+              </a:ext>
+            </a:extLst>
+          </p:cNvPr>
+          <p:cNvSpPr txBox="1"/>
+          <p:nvPr/>
+        </p:nvSpPr>
+        <p:spPr>
+          <a:xfrm>
+            <a:off x="7333995" y="2564904"/>
+            <a:ext cx="245580" cy="230832"/>
+          </a:xfrm>
+          <a:prstGeom prst="rect">
+            <a:avLst/>
+          </a:prstGeom>
+          <a:noFill/>
+        </p:spPr>
+        <p:txBody>
+          <a:bodyPr wrap="none" rtlCol="0" anchor="ctr">
+            <a:spAutoFit/>
+          </a:bodyPr>
+          <a:lstStyle/>
+          <a:p>
+            <a:pPr algn="ctr"/>
+            <a:r>
+              <a:rPr lang="en-US" altLang="ja-JP" sz="900" dirty="0"/>
+              <a:t>1</a:t>
+            </a:r>
+            <a:endParaRPr kumimoji="1" lang="ja-JP" altLang="en-US" sz="900"/>
+          </a:p>
+        </p:txBody>
+      </p:sp>
+      <p:sp>
+        <p:nvSpPr>
+          <p:cNvPr id="127" name="テキスト ボックス 126">
+            <a:extLst>
+              <a:ext uri="{FF2B5EF4-FFF2-40B4-BE49-F238E27FC236}">
+                <a16:creationId xmlns:a16="http://schemas.microsoft.com/office/drawing/2014/main" id="{E0FCCBDA-CC7D-3B4E-8B55-F171C0BD4CBA}"/>
+              </a:ext>
+            </a:extLst>
+          </p:cNvPr>
+          <p:cNvSpPr txBox="1"/>
+          <p:nvPr/>
+        </p:nvSpPr>
+        <p:spPr>
+          <a:xfrm>
+            <a:off x="5800540" y="3751869"/>
+            <a:ext cx="968400" cy="244914"/>
+          </a:xfrm>
+          <a:prstGeom prst="rect">
+            <a:avLst/>
+          </a:prstGeom>
+          <a:noFill/>
+        </p:spPr>
+        <p:txBody>
+          <a:bodyPr wrap="none" rtlCol="0" anchor="ctr">
+            <a:noAutofit/>
+          </a:bodyPr>
+          <a:lstStyle/>
+          <a:p>
+            <a:pPr algn="ctr"/>
+            <a:r>
+              <a:rPr kumimoji="1" lang="en-US" altLang="ja-JP" sz="1200" dirty="0">
+                <a:solidFill>
+                  <a:schemeClr val="tx1">
+                    <a:lumMod val="75000"/>
+                    <a:lumOff val="25000"/>
+                  </a:schemeClr>
+                </a:solidFill>
+              </a:rPr>
+              <a:t>(mapping table)</a:t>
+            </a:r>
+            <a:endParaRPr kumimoji="1" lang="ja-JP" altLang="en-US" sz="1200">
+              <a:solidFill>
+                <a:schemeClr val="tx1">
+                  <a:lumMod val="75000"/>
+                  <a:lumOff val="25000"/>
+                </a:schemeClr>
+              </a:solidFill>
+            </a:endParaRPr>
+          </a:p>
+        </p:txBody>
+      </p:sp>
+      <p:sp>
+        <p:nvSpPr>
+          <p:cNvPr id="128" name="テキスト ボックス 127">
+            <a:extLst>
+              <a:ext uri="{FF2B5EF4-FFF2-40B4-BE49-F238E27FC236}">
+                <a16:creationId xmlns:a16="http://schemas.microsoft.com/office/drawing/2014/main" id="{DF465C71-D3D1-B547-93B4-A4BDCE9D161C}"/>
+              </a:ext>
+            </a:extLst>
+          </p:cNvPr>
+          <p:cNvSpPr txBox="1"/>
+          <p:nvPr/>
+        </p:nvSpPr>
+        <p:spPr>
+          <a:xfrm>
+            <a:off x="5800540" y="4699255"/>
+            <a:ext cx="968400" cy="244914"/>
+          </a:xfrm>
+          <a:prstGeom prst="rect">
+            <a:avLst/>
+          </a:prstGeom>
+          <a:noFill/>
+        </p:spPr>
+        <p:txBody>
+          <a:bodyPr wrap="none" rtlCol="0" anchor="ctr">
+            <a:noAutofit/>
+          </a:bodyPr>
+          <a:lstStyle/>
+          <a:p>
+            <a:pPr algn="ctr"/>
+            <a:r>
+              <a:rPr kumimoji="1" lang="en-US" altLang="ja-JP" sz="1200" dirty="0">
+                <a:solidFill>
+                  <a:schemeClr val="tx1">
+                    <a:lumMod val="75000"/>
+                    <a:lumOff val="25000"/>
+                  </a:schemeClr>
+                </a:solidFill>
+              </a:rPr>
+              <a:t>(mapping table)</a:t>
+            </a:r>
+            <a:endParaRPr kumimoji="1" lang="ja-JP" altLang="en-US" sz="1200">
+              <a:solidFill>
+                <a:schemeClr val="tx1">
+                  <a:lumMod val="75000"/>
+                  <a:lumOff val="25000"/>
+                </a:schemeClr>
+              </a:solidFill>
+            </a:endParaRPr>
+          </a:p>
+        </p:txBody>
+      </p:sp>
+      <p:sp>
+        <p:nvSpPr>
+          <p:cNvPr id="51" name="正方形/長方形 50">
+            <a:extLst>
+              <a:ext uri="{FF2B5EF4-FFF2-40B4-BE49-F238E27FC236}">
+                <a16:creationId xmlns:a16="http://schemas.microsoft.com/office/drawing/2014/main" id="{0833E65A-0408-F04B-9C2C-2FC618437D75}"/>
+              </a:ext>
+            </a:extLst>
+          </p:cNvPr>
+          <p:cNvSpPr/>
+          <p:nvPr/>
+        </p:nvSpPr>
+        <p:spPr>
+          <a:xfrm>
+            <a:off x="682323" y="3080775"/>
+            <a:ext cx="4634017" cy="2580472"/>
+          </a:xfrm>
+          <a:prstGeom prst="rect">
+            <a:avLst/>
+          </a:prstGeom>
+          <a:noFill/>
+          <a:ln>
+            <a:solidFill>
+              <a:srgbClr val="FF0000"/>
+            </a:solidFill>
+            <a:prstDash val="dash"/>
+          </a:ln>
+        </p:spPr>
+        <p:style>
+          <a:lnRef idx="2">
+            <a:schemeClr val="accent1">
+              <a:shade val="50000"/>
+            </a:schemeClr>
+          </a:lnRef>
+          <a:fillRef idx="1">
+            <a:schemeClr val="accent1"/>
+          </a:fillRef>
+          <a:effectRef idx="0">
+            <a:schemeClr val="accent1"/>
+          </a:effectRef>
+          <a:fontRef idx="minor">
+            <a:schemeClr val="lt1"/>
+          </a:fontRef>
+        </p:style>
+        <p:txBody>
+          <a:bodyPr wrap="none" lIns="36000" tIns="36000" rIns="36000" bIns="36000" rtlCol="0" anchor="ctr"/>
+          <a:lstStyle/>
+          <a:p>
+            <a:pPr algn="ctr"/>
+            <a:endParaRPr kumimoji="1" lang="ja-JP" altLang="en-US" sz="1200">
+              <a:solidFill>
+                <a:schemeClr val="tx1">
+                  <a:lumMod val="75000"/>
+                  <a:lumOff val="25000"/>
+                </a:schemeClr>
+              </a:solidFill>
+            </a:endParaRPr>
+          </a:p>
+        </p:txBody>
+      </p:sp>
+      <p:sp>
+        <p:nvSpPr>
+          <p:cNvPr id="52" name="テキスト ボックス 51">
+            <a:extLst>
+              <a:ext uri="{FF2B5EF4-FFF2-40B4-BE49-F238E27FC236}">
+                <a16:creationId xmlns:a16="http://schemas.microsoft.com/office/drawing/2014/main" id="{6ED8C9B1-C3D7-7B4C-A5F2-9D0A99EA8B8F}"/>
+              </a:ext>
+            </a:extLst>
+          </p:cNvPr>
+          <p:cNvSpPr txBox="1"/>
+          <p:nvPr/>
+        </p:nvSpPr>
+        <p:spPr>
+          <a:xfrm>
+            <a:off x="2279947" y="5674819"/>
+            <a:ext cx="1383534" cy="276999"/>
+          </a:xfrm>
+          <a:prstGeom prst="rect">
+            <a:avLst/>
+          </a:prstGeom>
+          <a:noFill/>
+        </p:spPr>
+        <p:txBody>
+          <a:bodyPr wrap="square" rtlCol="0">
+            <a:spAutoFit/>
+          </a:bodyPr>
+          <a:lstStyle/>
+          <a:p>
+            <a:pPr algn="ctr"/>
+            <a:r>
+              <a:rPr kumimoji="1" lang="en-US" altLang="ja-JP" sz="1200" dirty="0">
+                <a:solidFill>
+                  <a:srgbClr val="FF0000"/>
+                </a:solidFill>
+              </a:rPr>
+              <a:t>Phase1</a:t>
+            </a:r>
+            <a:endParaRPr kumimoji="1" lang="ja-JP" altLang="en-US" sz="1200">
+              <a:solidFill>
+                <a:srgbClr val="FF0000"/>
+              </a:solidFill>
+            </a:endParaRPr>
+          </a:p>
+        </p:txBody>
+      </p:sp>
+    </p:spTree>
+    <p:extLst>
+      <p:ext uri="{BB962C8B-B14F-4D97-AF65-F5344CB8AC3E}">
+        <p14:creationId xmlns:p14="http://schemas.microsoft.com/office/powerpoint/2010/main" val="77841734"/>
+      </p:ext>
+    </p:extLst>
+  </p:cSld>
+  <p:clrMapOvr>
+    <a:masterClrMapping/>
+  </p:clrMapOvr>
+</p:sld>
+</file>
+
+<file path=ppt/slides/slide3.xml><?xml version="1.0" encoding="utf-8"?>
 <p:sld xmlns:a="http://schemas.openxmlformats.org/drawingml/2006/main" xmlns:r="http://schemas.openxmlformats.org/officeDocument/2006/relationships" xmlns:p="http://schemas.openxmlformats.org/presentationml/2006/main">
   <p:cSld>
     <p:spTree>
@@ -6917,7 +9150,7 @@
           <a:p>
             <a:fld id="{D0280A10-6354-6240-932A-EFE3B18031F6}" type="slidenum">
               <a:rPr kumimoji="1" lang="ja-JP" altLang="en-US" smtClean="0"/>
-              <a:t>2</a:t>
+              <a:t>3</a:t>
             </a:fld>
             <a:endParaRPr kumimoji="1" lang="ja-JP" altLang="en-US"/>
           </a:p>
@@ -9032,7 +11265,7 @@
 </p:sld>
 </file>
 
-<file path=ppt/slides/slide3.xml><?xml version="1.0" encoding="utf-8"?>
+<file path=ppt/slides/slide4.xml><?xml version="1.0" encoding="utf-8"?>
 <p:sld xmlns:a="http://schemas.openxmlformats.org/drawingml/2006/main" xmlns:r="http://schemas.openxmlformats.org/officeDocument/2006/relationships" xmlns:p="http://schemas.openxmlformats.org/presentationml/2006/main">
   <p:cSld>
     <p:spTree>
@@ -9767,7 +12000,7 @@
           <a:p>
             <a:fld id="{D0280A10-6354-6240-932A-EFE3B18031F6}" type="slidenum">
               <a:rPr kumimoji="1" lang="ja-JP" altLang="en-US" smtClean="0"/>
-              <a:t>3</a:t>
+              <a:t>4</a:t>
             </a:fld>
             <a:endParaRPr kumimoji="1" lang="ja-JP" altLang="en-US"/>
           </a:p>

</xml_diff>